<commit_message>
More poster edits and improvements
</commit_message>
<xml_diff>
--- a/SPSP2015/SPSP2015_WIP.pptx
+++ b/SPSP2015/SPSP2015_WIP.pptx
@@ -196,7 +196,7 @@
             <a:fld id="{181F8CD1-110C-4FA6-B5F7-8F4FEDA17C56}" type="datetimeFigureOut">
               <a:rPr lang="en-US" smtClean="0"/>
               <a:pPr/>
-              <a:t>2/23/2015</a:t>
+              <a:t>2/24/2015</a:t>
             </a:fld>
             <a:endParaRPr lang="en-US"/>
           </a:p>
@@ -647,7 +647,7 @@
             <a:fld id="{AEA88D4E-A659-427F-9953-D558FC70E309}" type="datetimeFigureOut">
               <a:rPr lang="en-US" smtClean="0"/>
               <a:pPr/>
-              <a:t>2/23/2015</a:t>
+              <a:t>2/24/2015</a:t>
             </a:fld>
             <a:endParaRPr lang="en-US"/>
           </a:p>
@@ -819,7 +819,7 @@
             <a:fld id="{AEA88D4E-A659-427F-9953-D558FC70E309}" type="datetimeFigureOut">
               <a:rPr lang="en-US" smtClean="0"/>
               <a:pPr/>
-              <a:t>2/23/2015</a:t>
+              <a:t>2/24/2015</a:t>
             </a:fld>
             <a:endParaRPr lang="en-US"/>
           </a:p>
@@ -1001,7 +1001,7 @@
             <a:fld id="{AEA88D4E-A659-427F-9953-D558FC70E309}" type="datetimeFigureOut">
               <a:rPr lang="en-US" smtClean="0"/>
               <a:pPr/>
-              <a:t>2/23/2015</a:t>
+              <a:t>2/24/2015</a:t>
             </a:fld>
             <a:endParaRPr lang="en-US"/>
           </a:p>
@@ -1173,7 +1173,7 @@
             <a:fld id="{AEA88D4E-A659-427F-9953-D558FC70E309}" type="datetimeFigureOut">
               <a:rPr lang="en-US" smtClean="0"/>
               <a:pPr/>
-              <a:t>2/23/2015</a:t>
+              <a:t>2/24/2015</a:t>
             </a:fld>
             <a:endParaRPr lang="en-US"/>
           </a:p>
@@ -1421,7 +1421,7 @@
             <a:fld id="{AEA88D4E-A659-427F-9953-D558FC70E309}" type="datetimeFigureOut">
               <a:rPr lang="en-US" smtClean="0"/>
               <a:pPr/>
-              <a:t>2/23/2015</a:t>
+              <a:t>2/24/2015</a:t>
             </a:fld>
             <a:endParaRPr lang="en-US"/>
           </a:p>
@@ -1711,7 +1711,7 @@
             <a:fld id="{AEA88D4E-A659-427F-9953-D558FC70E309}" type="datetimeFigureOut">
               <a:rPr lang="en-US" smtClean="0"/>
               <a:pPr/>
-              <a:t>2/23/2015</a:t>
+              <a:t>2/24/2015</a:t>
             </a:fld>
             <a:endParaRPr lang="en-US"/>
           </a:p>
@@ -2135,7 +2135,7 @@
             <a:fld id="{AEA88D4E-A659-427F-9953-D558FC70E309}" type="datetimeFigureOut">
               <a:rPr lang="en-US" smtClean="0"/>
               <a:pPr/>
-              <a:t>2/23/2015</a:t>
+              <a:t>2/24/2015</a:t>
             </a:fld>
             <a:endParaRPr lang="en-US"/>
           </a:p>
@@ -2255,7 +2255,7 @@
             <a:fld id="{AEA88D4E-A659-427F-9953-D558FC70E309}" type="datetimeFigureOut">
               <a:rPr lang="en-US" smtClean="0"/>
               <a:pPr/>
-              <a:t>2/23/2015</a:t>
+              <a:t>2/24/2015</a:t>
             </a:fld>
             <a:endParaRPr lang="en-US"/>
           </a:p>
@@ -2352,7 +2352,7 @@
             <a:fld id="{AEA88D4E-A659-427F-9953-D558FC70E309}" type="datetimeFigureOut">
               <a:rPr lang="en-US" smtClean="0"/>
               <a:pPr/>
-              <a:t>2/23/2015</a:t>
+              <a:t>2/24/2015</a:t>
             </a:fld>
             <a:endParaRPr lang="en-US"/>
           </a:p>
@@ -2631,7 +2631,7 @@
             <a:fld id="{AEA88D4E-A659-427F-9953-D558FC70E309}" type="datetimeFigureOut">
               <a:rPr lang="en-US" smtClean="0"/>
               <a:pPr/>
-              <a:t>2/23/2015</a:t>
+              <a:t>2/24/2015</a:t>
             </a:fld>
             <a:endParaRPr lang="en-US"/>
           </a:p>
@@ -2886,7 +2886,7 @@
             <a:fld id="{AEA88D4E-A659-427F-9953-D558FC70E309}" type="datetimeFigureOut">
               <a:rPr lang="en-US" smtClean="0"/>
               <a:pPr/>
-              <a:t>2/23/2015</a:t>
+              <a:t>2/24/2015</a:t>
             </a:fld>
             <a:endParaRPr lang="en-US"/>
           </a:p>
@@ -3101,7 +3101,7 @@
             <a:fld id="{AEA88D4E-A659-427F-9953-D558FC70E309}" type="datetimeFigureOut">
               <a:rPr lang="en-US" smtClean="0"/>
               <a:pPr/>
-              <a:t>2/23/2015</a:t>
+              <a:t>2/24/2015</a:t>
             </a:fld>
             <a:endParaRPr lang="en-US"/>
           </a:p>
@@ -3552,7 +3552,7 @@
                 <a:latin typeface="Rockwell" pitchFamily="18" charset="0"/>
                 <a:cs typeface="Arial" panose="020B0604020202020204" pitchFamily="34" charset="0"/>
               </a:rPr>
-              <a:t>Digit Ratio Measures of Prenatal Testosterone Exposure in Predicting Provoked Aggression</a:t>
+              <a:t>Effects of Video Game Violence, Game Difficulty, and Prenatal Testosterone on Aggressive Behavior</a:t>
             </a:r>
             <a:endParaRPr lang="en-US" sz="9600" b="1" dirty="0">
               <a:latin typeface="Rockwell" pitchFamily="18" charset="0"/>
@@ -3617,7 +3617,21 @@
                 <a:latin typeface="Arial" panose="020B0604020202020204" pitchFamily="34" charset="0"/>
                 <a:cs typeface="Arial" panose="020B0604020202020204" pitchFamily="34" charset="0"/>
               </a:rPr>
-              <a:t>, Bruce D. </a:t>
+              <a:t>, </a:t>
+            </a:r>
+            <a:r>
+              <a:rPr lang="en-US" sz="4800" dirty="0" smtClean="0">
+                <a:latin typeface="Arial" panose="020B0604020202020204" pitchFamily="34" charset="0"/>
+                <a:cs typeface="Arial" panose="020B0604020202020204" pitchFamily="34" charset="0"/>
+              </a:rPr>
+              <a:t>&amp; Bruce </a:t>
+            </a:r>
+            <a:r>
+              <a:rPr lang="en-US" sz="4800" dirty="0" smtClean="0">
+                <a:latin typeface="Arial" panose="020B0604020202020204" pitchFamily="34" charset="0"/>
+                <a:cs typeface="Arial" panose="020B0604020202020204" pitchFamily="34" charset="0"/>
+              </a:rPr>
+              <a:t>D. </a:t>
             </a:r>
             <a:r>
               <a:rPr lang="en-US" sz="4800" dirty="0" err="1" smtClean="0">
@@ -3626,27 +3640,10 @@
               </a:rPr>
               <a:t>Bartholow</a:t>
             </a:r>
-            <a:r>
-              <a:rPr lang="en-US" sz="4800" dirty="0" smtClean="0">
-                <a:latin typeface="Arial" panose="020B0604020202020204" pitchFamily="34" charset="0"/>
-                <a:cs typeface="Arial" panose="020B0604020202020204" pitchFamily="34" charset="0"/>
-              </a:rPr>
-              <a:t>, &amp; Ines </a:t>
-            </a:r>
-            <a:r>
-              <a:rPr lang="en-US" sz="4800" dirty="0" err="1" smtClean="0">
-                <a:latin typeface="Arial" panose="020B0604020202020204" pitchFamily="34" charset="0"/>
-                <a:cs typeface="Arial" panose="020B0604020202020204" pitchFamily="34" charset="0"/>
-              </a:rPr>
-              <a:t>Segert</a:t>
-            </a:r>
-            <a:r>
-              <a:rPr lang="en-US" sz="4800" dirty="0" smtClean="0">
-                <a:latin typeface="Arial" panose="020B0604020202020204" pitchFamily="34" charset="0"/>
-                <a:cs typeface="Arial" panose="020B0604020202020204" pitchFamily="34" charset="0"/>
-              </a:rPr>
-              <a:t> </a:t>
-            </a:r>
+            <a:endParaRPr lang="en-US" sz="4800" dirty="0" smtClean="0">
+              <a:latin typeface="Arial" panose="020B0604020202020204" pitchFamily="34" charset="0"/>
+              <a:cs typeface="Arial" panose="020B0604020202020204" pitchFamily="34" charset="0"/>
+            </a:endParaRPr>
           </a:p>
           <a:p>
             <a:pPr algn="ctr"/>
@@ -3898,8 +3895,8 @@
         </p:nvSpPr>
         <p:spPr>
           <a:xfrm>
-            <a:off x="457200" y="15719018"/>
-            <a:ext cx="13944600" cy="2893100"/>
+            <a:off x="228600" y="15719018"/>
+            <a:ext cx="14439900" cy="2893100"/>
           </a:xfrm>
           <a:prstGeom prst="rect">
             <a:avLst/>
@@ -3947,8 +3944,8 @@
         </p:nvSpPr>
         <p:spPr>
           <a:xfrm>
-            <a:off x="457200" y="28259934"/>
-            <a:ext cx="13944600" cy="4524315"/>
+            <a:off x="228600" y="28856481"/>
+            <a:ext cx="14439900" cy="5663089"/>
           </a:xfrm>
           <a:prstGeom prst="rect">
             <a:avLst/>
@@ -3988,7 +3985,21 @@
                 <a:latin typeface="Helvetica" pitchFamily="34" charset="0"/>
                 <a:cs typeface="Helvetica" pitchFamily="34" charset="0"/>
               </a:rPr>
-              <a:t>Many participants indicated not being deceived, and others’ data are still being entered and analyzed. Thus, the sample size used for current analyses is 157 for 2d4d ratio analyses, 201 for other analyses.</a:t>
+              <a:t>Many participants indicated not being deceived, and others’ data are still being entered and analyzed. Thus, the sample size used for current analyses is </a:t>
+            </a:r>
+            <a:r>
+              <a:rPr lang="en-US" sz="3200" dirty="0">
+                <a:latin typeface="Helvetica" pitchFamily="34" charset="0"/>
+                <a:cs typeface="Helvetica" pitchFamily="34" charset="0"/>
+              </a:rPr>
+              <a:t>253 for primary </a:t>
+            </a:r>
+            <a:r>
+              <a:rPr lang="en-US" sz="3200" dirty="0" smtClean="0">
+                <a:latin typeface="Helvetica" pitchFamily="34" charset="0"/>
+                <a:cs typeface="Helvetica" pitchFamily="34" charset="0"/>
+              </a:rPr>
+              <a:t>analyses, 200 for 2d4d ratio analyses.</a:t>
             </a:r>
           </a:p>
           <a:p>
@@ -4037,7 +4048,28 @@
                 <a:latin typeface="Helvetica" pitchFamily="34" charset="0"/>
                 <a:cs typeface="Helvetica" pitchFamily="34" charset="0"/>
               </a:rPr>
-              <a:t> = .21;</a:t>
+              <a:t> = </a:t>
+            </a:r>
+            <a:r>
+              <a:rPr lang="en-US" sz="2800" dirty="0" smtClean="0">
+                <a:latin typeface="Helvetica" pitchFamily="34" charset="0"/>
+                <a:cs typeface="Helvetica" pitchFamily="34" charset="0"/>
+              </a:rPr>
+              <a:t>.</a:t>
+            </a:r>
+            <a:r>
+              <a:rPr lang="en-US" sz="2800" dirty="0">
+                <a:latin typeface="Helvetica" pitchFamily="34" charset="0"/>
+                <a:cs typeface="Helvetica" pitchFamily="34" charset="0"/>
+              </a:rPr>
+              <a:t>4</a:t>
+            </a:r>
+            <a:r>
+              <a:rPr lang="en-US" sz="2800" dirty="0" smtClean="0">
+                <a:latin typeface="Helvetica" pitchFamily="34" charset="0"/>
+                <a:cs typeface="Helvetica" pitchFamily="34" charset="0"/>
+              </a:rPr>
+              <a:t>;</a:t>
             </a:r>
             <a:r>
               <a:rPr lang="en-US" sz="3200" dirty="0" smtClean="0">
@@ -4059,6 +4091,48 @@
                 <a:cs typeface="Helvetica" pitchFamily="34" charset="0"/>
               </a:rPr>
               <a:t>).</a:t>
+            </a:r>
+          </a:p>
+          <a:p>
+            <a:pPr>
+              <a:spcAft>
+                <a:spcPts val="1200"/>
+              </a:spcAft>
+            </a:pPr>
+            <a:r>
+              <a:rPr lang="en-US" sz="3200" dirty="0" smtClean="0">
+                <a:latin typeface="Helvetica" pitchFamily="34" charset="0"/>
+                <a:cs typeface="Helvetica" pitchFamily="34" charset="0"/>
+              </a:rPr>
+              <a:t>Meta-analysis applies PET-PEESE </a:t>
+            </a:r>
+            <a:r>
+              <a:rPr lang="en-US" sz="3200" dirty="0" err="1" smtClean="0">
+                <a:latin typeface="Helvetica" pitchFamily="34" charset="0"/>
+                <a:cs typeface="Helvetica" pitchFamily="34" charset="0"/>
+              </a:rPr>
+              <a:t>metaregression</a:t>
+            </a:r>
+            <a:r>
+              <a:rPr lang="en-US" sz="3200" dirty="0" smtClean="0">
+                <a:latin typeface="Helvetica" pitchFamily="34" charset="0"/>
+                <a:cs typeface="Helvetica" pitchFamily="34" charset="0"/>
+              </a:rPr>
+              <a:t> (Stanley &amp; </a:t>
+            </a:r>
+            <a:r>
+              <a:rPr lang="en-US" sz="3200" dirty="0" err="1" smtClean="0">
+                <a:latin typeface="Helvetica" pitchFamily="34" charset="0"/>
+                <a:cs typeface="Helvetica" pitchFamily="34" charset="0"/>
+              </a:rPr>
+              <a:t>Doucoliagos</a:t>
+            </a:r>
+            <a:r>
+              <a:rPr lang="en-US" sz="3200" dirty="0" smtClean="0">
+                <a:latin typeface="Helvetica" pitchFamily="34" charset="0"/>
+                <a:cs typeface="Helvetica" pitchFamily="34" charset="0"/>
+              </a:rPr>
+              <a:t>, 2014) to meta-analytic data provided by Anderson et al. (2010).</a:t>
             </a:r>
             <a:endParaRPr lang="en-US" sz="3200" dirty="0">
               <a:latin typeface="Helvetica" pitchFamily="34" charset="0"/>
@@ -4075,8 +4149,8 @@
         </p:nvSpPr>
         <p:spPr>
           <a:xfrm>
-            <a:off x="31318200" y="21952149"/>
-            <a:ext cx="13944600" cy="9618018"/>
+            <a:off x="31122937" y="23505832"/>
+            <a:ext cx="14401800" cy="8212505"/>
           </a:xfrm>
           <a:prstGeom prst="rect">
             <a:avLst/>
@@ -4107,21 +4181,8 @@
           </a:p>
           <a:p>
             <a:pPr>
-              <a:buFont typeface="Arial" pitchFamily="34" charset="0"/>
-              <a:buChar char="•"/>
-            </a:pPr>
-            <a:r>
-              <a:rPr lang="en-US" sz="3600" dirty="0" smtClean="0">
-                <a:latin typeface="Helvetica" pitchFamily="34" charset="0"/>
-                <a:cs typeface="Helvetica" pitchFamily="34" charset="0"/>
-              </a:rPr>
-              <a:t>Results provide some evidence that 2d4d ratio does not predict aggressive behavior, even in the context of provocation. </a:t>
-            </a:r>
-          </a:p>
-          <a:p>
-            <a:pPr marL="1082675" lvl="1" indent="-503238">
               <a:spcAft>
-                <a:spcPts val="600"/>
+                <a:spcPts val="1000"/>
               </a:spcAft>
               <a:buFont typeface="Arial" pitchFamily="34" charset="0"/>
               <a:buChar char="•"/>
@@ -4131,26 +4192,24 @@
                 <a:latin typeface="Helvetica" pitchFamily="34" charset="0"/>
                 <a:cs typeface="Helvetica" pitchFamily="34" charset="0"/>
               </a:rPr>
-              <a:t>Note that setting a larger prior expectation on effect size would increase the evidence’s preference for the null.</a:t>
-            </a:r>
+              <a:t>Effects of violent games seem smaller than </a:t>
+            </a:r>
+            <a:r>
+              <a:rPr lang="en-US" sz="3600" dirty="0" smtClean="0">
+                <a:latin typeface="Helvetica" pitchFamily="34" charset="0"/>
+                <a:cs typeface="Helvetica" pitchFamily="34" charset="0"/>
+              </a:rPr>
+              <a:t>expected, providing evidence for the null hypothesis.</a:t>
+            </a:r>
+            <a:endParaRPr lang="en-US" sz="3600" dirty="0">
+              <a:latin typeface="Helvetica" pitchFamily="34" charset="0"/>
+              <a:cs typeface="Helvetica" pitchFamily="34" charset="0"/>
+            </a:endParaRPr>
           </a:p>
           <a:p>
             <a:pPr>
-              <a:buFont typeface="Arial" pitchFamily="34" charset="0"/>
-              <a:buChar char="•"/>
-            </a:pPr>
-            <a:r>
-              <a:rPr lang="en-US" sz="3600" dirty="0" smtClean="0">
-                <a:latin typeface="Helvetica" pitchFamily="34" charset="0"/>
-                <a:cs typeface="Helvetica" pitchFamily="34" charset="0"/>
-              </a:rPr>
-              <a:t>Results are equivocal with regard to effects of violent and difficult game contents.  </a:t>
-            </a:r>
-          </a:p>
-          <a:p>
-            <a:pPr marL="1082675" lvl="1" indent="-503238">
               <a:spcAft>
-                <a:spcPts val="1200"/>
+                <a:spcPts val="1000"/>
               </a:spcAft>
               <a:buFont typeface="Arial" pitchFamily="34" charset="0"/>
               <a:buChar char="•"/>
@@ -4160,13 +4219,17 @@
                 <a:latin typeface="Helvetica" pitchFamily="34" charset="0"/>
                 <a:cs typeface="Helvetica" pitchFamily="34" charset="0"/>
               </a:rPr>
-              <a:t>Conventional statistics indicate small effects, but only if the interaction is included in the model.  Bayes Factors, on the other hand, concludes support for the null.  </a:t>
-            </a:r>
+              <a:t>2d4d ratio does not predict aggressive behavior, even when subjects are provoked.</a:t>
+            </a:r>
+            <a:endParaRPr lang="en-US" sz="3600" dirty="0" smtClean="0">
+              <a:latin typeface="Helvetica" pitchFamily="34" charset="0"/>
+              <a:cs typeface="Helvetica" pitchFamily="34" charset="0"/>
+            </a:endParaRPr>
           </a:p>
           <a:p>
             <a:pPr>
               <a:spcAft>
-                <a:spcPts val="1200"/>
+                <a:spcPts val="1000"/>
               </a:spcAft>
               <a:buFont typeface="Arial" pitchFamily="34" charset="0"/>
               <a:buChar char="•"/>
@@ -4176,13 +4239,13 @@
                 <a:latin typeface="Helvetica" pitchFamily="34" charset="0"/>
                 <a:cs typeface="Helvetica" pitchFamily="34" charset="0"/>
               </a:rPr>
-              <a:t>It is possible that the effects of violent games on aggression are smaller than typically reported in meta-analysis (r = .21, Anderson et al., 2010), at least when games are very closely matched in structural features and game content other than violence. </a:t>
+              <a:t>Carefully-matched game stimuli may reduce or eliminate previously-reported violent game effects.</a:t>
             </a:r>
           </a:p>
           <a:p>
             <a:pPr>
               <a:spcAft>
-                <a:spcPts val="1200"/>
+                <a:spcPts val="1000"/>
               </a:spcAft>
               <a:buFont typeface="Arial" pitchFamily="34" charset="0"/>
               <a:buChar char="•"/>
@@ -4192,21 +4255,75 @@
                 <a:latin typeface="Helvetica" pitchFamily="34" charset="0"/>
                 <a:cs typeface="Helvetica" pitchFamily="34" charset="0"/>
               </a:rPr>
-              <a:t>The current results are speculative, and final conclusions cannot be drawn until the full sample size is collected.</a:t>
-            </a:r>
-          </a:p>
-        </p:txBody>
-      </p:sp>
-      <p:sp>
-        <p:nvSpPr>
-          <p:cNvPr id="19" name="TextBox 18"/>
+              <a:t>Funnel-plot asymmetry suggests effects overestimated in meta-analysis.</a:t>
+            </a:r>
+          </a:p>
+          <a:p>
+            <a:pPr>
+              <a:spcAft>
+                <a:spcPts val="1000"/>
+              </a:spcAft>
+              <a:buFont typeface="Arial" pitchFamily="34" charset="0"/>
+              <a:buChar char="•"/>
+            </a:pPr>
+            <a:r>
+              <a:rPr lang="en-US" sz="3600" dirty="0" smtClean="0">
+                <a:latin typeface="Helvetica" pitchFamily="34" charset="0"/>
+                <a:cs typeface="Helvetica" pitchFamily="34" charset="0"/>
+              </a:rPr>
+              <a:t>Subjects probably more aware of research hypothesis than researchers suspect. Time for fewer press releases?</a:t>
+            </a:r>
+            <a:endParaRPr lang="en-US" sz="3600" dirty="0" smtClean="0">
+              <a:latin typeface="Helvetica" pitchFamily="34" charset="0"/>
+              <a:cs typeface="Helvetica" pitchFamily="34" charset="0"/>
+            </a:endParaRPr>
+          </a:p>
+          <a:p>
+            <a:pPr>
+              <a:spcAft>
+                <a:spcPts val="1000"/>
+              </a:spcAft>
+              <a:buFont typeface="Arial" pitchFamily="34" charset="0"/>
+              <a:buChar char="•"/>
+            </a:pPr>
+            <a:r>
+              <a:rPr lang="en-US" sz="3600" dirty="0" smtClean="0">
+                <a:latin typeface="Helvetica" pitchFamily="34" charset="0"/>
+                <a:cs typeface="Helvetica" pitchFamily="34" charset="0"/>
+              </a:rPr>
+              <a:t>Current </a:t>
+            </a:r>
+            <a:r>
+              <a:rPr lang="en-US" sz="3600" dirty="0" smtClean="0">
+                <a:latin typeface="Helvetica" pitchFamily="34" charset="0"/>
+                <a:cs typeface="Helvetica" pitchFamily="34" charset="0"/>
+              </a:rPr>
+              <a:t>results are </a:t>
+            </a:r>
+            <a:r>
+              <a:rPr lang="en-US" sz="3600" dirty="0" smtClean="0">
+                <a:latin typeface="Helvetica" pitchFamily="34" charset="0"/>
+                <a:cs typeface="Helvetica" pitchFamily="34" charset="0"/>
+              </a:rPr>
+              <a:t>speculative and may change with increasing sample size or more appropriate modeling of non-normal DV.</a:t>
+            </a:r>
+            <a:endParaRPr lang="en-US" sz="3600" dirty="0" smtClean="0">
+              <a:latin typeface="Helvetica" pitchFamily="34" charset="0"/>
+              <a:cs typeface="Helvetica" pitchFamily="34" charset="0"/>
+            </a:endParaRPr>
+          </a:p>
+        </p:txBody>
+      </p:sp>
+      <p:sp>
+        <p:nvSpPr>
+          <p:cNvPr id="29" name="TextBox 28"/>
           <p:cNvSpPr txBox="1"/>
           <p:nvPr/>
         </p:nvSpPr>
         <p:spPr>
           <a:xfrm>
-            <a:off x="15220950" y="15523309"/>
-            <a:ext cx="15316200" cy="16250603"/>
+            <a:off x="31122937" y="31967002"/>
+            <a:ext cx="14401800" cy="2585323"/>
           </a:xfrm>
           <a:prstGeom prst="rect">
             <a:avLst/>
@@ -4226,768 +4343,357 @@
           </a:bodyPr>
           <a:lstStyle/>
           <a:p>
-            <a:r>
-              <a:rPr lang="en-US" sz="3600" dirty="0" smtClean="0">
-                <a:latin typeface="Helvetica" pitchFamily="34" charset="0"/>
-                <a:cs typeface="Helvetica" pitchFamily="34" charset="0"/>
-              </a:rPr>
-              <a:t>Effects of game contents were also inspected via 2 (Violence) x 2 (Difficulty) ANOVA, which indicated: </a:t>
-            </a:r>
-          </a:p>
-          <a:p>
-            <a:pPr>
-              <a:buFont typeface="Arial" pitchFamily="34" charset="0"/>
-              <a:buChar char="•"/>
-            </a:pPr>
-            <a:r>
-              <a:rPr lang="en-US" sz="3600" dirty="0" smtClean="0">
-                <a:latin typeface="Helvetica" pitchFamily="34" charset="0"/>
-                <a:cs typeface="Helvetica" pitchFamily="34" charset="0"/>
-              </a:rPr>
-              <a:t> A small effect of difficulty, </a:t>
-            </a:r>
-            <a:r>
-              <a:rPr lang="en-US" sz="3600" i="1" dirty="0" smtClean="0">
-                <a:latin typeface="Helvetica" pitchFamily="34" charset="0"/>
-                <a:cs typeface="Helvetica" pitchFamily="34" charset="0"/>
-              </a:rPr>
-              <a:t>t</a:t>
-            </a:r>
-            <a:r>
-              <a:rPr lang="en-US" sz="3600" dirty="0" smtClean="0">
-                <a:latin typeface="Helvetica" pitchFamily="34" charset="0"/>
-                <a:cs typeface="Helvetica" pitchFamily="34" charset="0"/>
-              </a:rPr>
-              <a:t>(197) = 1.99, </a:t>
-            </a:r>
-            <a:r>
-              <a:rPr lang="en-US" sz="3600" i="1" dirty="0" smtClean="0">
-                <a:latin typeface="Helvetica" pitchFamily="34" charset="0"/>
-                <a:cs typeface="Helvetica" pitchFamily="34" charset="0"/>
-              </a:rPr>
-              <a:t>r </a:t>
-            </a:r>
-            <a:r>
-              <a:rPr lang="en-US" sz="3600" dirty="0" smtClean="0">
-                <a:latin typeface="Helvetica" pitchFamily="34" charset="0"/>
-                <a:cs typeface="Helvetica" pitchFamily="34" charset="0"/>
-              </a:rPr>
-              <a:t>= .14, [.00, .27]</a:t>
-            </a:r>
-          </a:p>
-          <a:p>
-            <a:pPr>
-              <a:buFont typeface="Arial" pitchFamily="34" charset="0"/>
-              <a:buChar char="•"/>
-            </a:pPr>
-            <a:r>
-              <a:rPr lang="en-US" sz="3600" dirty="0" smtClean="0">
-                <a:latin typeface="Helvetica" pitchFamily="34" charset="0"/>
-                <a:cs typeface="Helvetica" pitchFamily="34" charset="0"/>
-              </a:rPr>
-              <a:t> A small effect of violence, </a:t>
-            </a:r>
-            <a:r>
-              <a:rPr lang="en-US" sz="3600" i="1" dirty="0" smtClean="0">
-                <a:latin typeface="Helvetica" pitchFamily="34" charset="0"/>
-                <a:cs typeface="Helvetica" pitchFamily="34" charset="0"/>
-              </a:rPr>
-              <a:t>t</a:t>
-            </a:r>
-            <a:r>
-              <a:rPr lang="en-US" sz="3600" dirty="0" smtClean="0">
-                <a:latin typeface="Helvetica" pitchFamily="34" charset="0"/>
-                <a:cs typeface="Helvetica" pitchFamily="34" charset="0"/>
-              </a:rPr>
-              <a:t>(197) = 1.96, </a:t>
-            </a:r>
-            <a:r>
-              <a:rPr lang="en-US" sz="3600" i="1" dirty="0" smtClean="0">
-                <a:latin typeface="Helvetica" pitchFamily="34" charset="0"/>
-                <a:cs typeface="Helvetica" pitchFamily="34" charset="0"/>
-              </a:rPr>
-              <a:t>r</a:t>
-            </a:r>
-            <a:r>
-              <a:rPr lang="en-US" sz="3600" dirty="0" smtClean="0">
-                <a:latin typeface="Helvetica" pitchFamily="34" charset="0"/>
-                <a:cs typeface="Helvetica" pitchFamily="34" charset="0"/>
-              </a:rPr>
-              <a:t> = .14, [.00, .27]</a:t>
-            </a:r>
-          </a:p>
-          <a:p>
-            <a:pPr>
-              <a:buFont typeface="Arial" pitchFamily="34" charset="0"/>
-              <a:buChar char="•"/>
-            </a:pPr>
-            <a:r>
-              <a:rPr lang="en-US" sz="3600" dirty="0" smtClean="0">
-                <a:latin typeface="Helvetica" pitchFamily="34" charset="0"/>
-                <a:cs typeface="Helvetica" pitchFamily="34" charset="0"/>
-              </a:rPr>
-              <a:t> A difficulty*violence interaction, </a:t>
-            </a:r>
-            <a:r>
-              <a:rPr lang="en-US" sz="3600" i="1" dirty="0" smtClean="0">
-                <a:latin typeface="Helvetica" pitchFamily="34" charset="0"/>
-                <a:cs typeface="Helvetica" pitchFamily="34" charset="0"/>
-              </a:rPr>
-              <a:t>t</a:t>
-            </a:r>
-            <a:r>
-              <a:rPr lang="en-US" sz="3600" dirty="0" smtClean="0">
-                <a:latin typeface="Helvetica" pitchFamily="34" charset="0"/>
-                <a:cs typeface="Helvetica" pitchFamily="34" charset="0"/>
-              </a:rPr>
-              <a:t>(197) = -1.77, </a:t>
-            </a:r>
-            <a:r>
-              <a:rPr lang="en-US" sz="3600" i="1" dirty="0" smtClean="0">
-                <a:latin typeface="Helvetica" pitchFamily="34" charset="0"/>
-                <a:cs typeface="Helvetica" pitchFamily="34" charset="0"/>
-              </a:rPr>
-              <a:t>r </a:t>
-            </a:r>
-            <a:r>
-              <a:rPr lang="en-US" sz="3600" dirty="0" smtClean="0">
-                <a:latin typeface="Helvetica" pitchFamily="34" charset="0"/>
-                <a:cs typeface="Helvetica" pitchFamily="34" charset="0"/>
-              </a:rPr>
-              <a:t>= -.13, [-.26, .01]</a:t>
-            </a:r>
-          </a:p>
-          <a:p>
-            <a:pPr>
-              <a:buFont typeface="Arial" pitchFamily="34" charset="0"/>
-              <a:buChar char="•"/>
-            </a:pPr>
-            <a:endParaRPr lang="en-US" sz="3600" dirty="0" smtClean="0">
+            <a:pPr algn="ctr"/>
+            <a:r>
+              <a:rPr lang="en-US" sz="2600" b="1" dirty="0" smtClean="0">
+                <a:latin typeface="Garamond" pitchFamily="18" charset="0"/>
+              </a:rPr>
+              <a:t>References</a:t>
+            </a:r>
+          </a:p>
+          <a:p>
+            <a:r>
+              <a:rPr lang="en-US" sz="1300" dirty="0" smtClean="0">
+                <a:latin typeface="Helvetica" pitchFamily="34" charset="0"/>
+                <a:cs typeface="Helvetica" pitchFamily="34" charset="0"/>
+              </a:rPr>
+              <a:t>Anderson, C.A., Akiko, S., </a:t>
+            </a:r>
+            <a:r>
+              <a:rPr lang="en-US" sz="1300" dirty="0" err="1" smtClean="0">
+                <a:latin typeface="Helvetica" pitchFamily="34" charset="0"/>
+                <a:cs typeface="Helvetica" pitchFamily="34" charset="0"/>
+              </a:rPr>
+              <a:t>Ihori</a:t>
+            </a:r>
+            <a:r>
+              <a:rPr lang="en-US" sz="1300" dirty="0" smtClean="0">
+                <a:latin typeface="Helvetica" pitchFamily="34" charset="0"/>
+                <a:cs typeface="Helvetica" pitchFamily="34" charset="0"/>
+              </a:rPr>
+              <a:t>, N., Swing, E.L., Bushman, B.J., Sakamoto, A., Rothstein, H.R., &amp; </a:t>
+            </a:r>
+            <a:r>
+              <a:rPr lang="en-US" sz="1300" dirty="0" err="1" smtClean="0">
+                <a:latin typeface="Helvetica" pitchFamily="34" charset="0"/>
+                <a:cs typeface="Helvetica" pitchFamily="34" charset="0"/>
+              </a:rPr>
+              <a:t>Saleem</a:t>
+            </a:r>
+            <a:r>
+              <a:rPr lang="en-US" sz="1300" dirty="0" smtClean="0">
+                <a:latin typeface="Helvetica" pitchFamily="34" charset="0"/>
+                <a:cs typeface="Helvetica" pitchFamily="34" charset="0"/>
+              </a:rPr>
+              <a:t>, M. (2010) Violent video game effects on aggression, empathy, and </a:t>
+            </a:r>
+            <a:r>
+              <a:rPr lang="en-US" sz="1300" dirty="0" err="1" smtClean="0">
+                <a:latin typeface="Helvetica" pitchFamily="34" charset="0"/>
+                <a:cs typeface="Helvetica" pitchFamily="34" charset="0"/>
+              </a:rPr>
+              <a:t>prosocial</a:t>
+            </a:r>
+            <a:r>
+              <a:rPr lang="en-US" sz="1300" dirty="0" smtClean="0">
+                <a:latin typeface="Helvetica" pitchFamily="34" charset="0"/>
+                <a:cs typeface="Helvetica" pitchFamily="34" charset="0"/>
+              </a:rPr>
+              <a:t> behavior in Eastern and Western countries: A meta-analytic review. </a:t>
+            </a:r>
+            <a:r>
+              <a:rPr lang="en-US" sz="1300" i="1" dirty="0" smtClean="0">
+                <a:latin typeface="Helvetica" pitchFamily="34" charset="0"/>
+                <a:cs typeface="Helvetica" pitchFamily="34" charset="0"/>
+              </a:rPr>
+              <a:t>Psychological Bulletin, 136, </a:t>
+            </a:r>
+            <a:r>
+              <a:rPr lang="en-US" sz="1300" dirty="0" smtClean="0">
+                <a:latin typeface="Helvetica" pitchFamily="34" charset="0"/>
+                <a:cs typeface="Helvetica" pitchFamily="34" charset="0"/>
+              </a:rPr>
+              <a:t>151-173.</a:t>
+            </a:r>
+          </a:p>
+          <a:p>
+            <a:r>
+              <a:rPr lang="en-US" sz="1300" dirty="0" smtClean="0">
+                <a:latin typeface="Helvetica" pitchFamily="34" charset="0"/>
+                <a:cs typeface="Helvetica" pitchFamily="34" charset="0"/>
+              </a:rPr>
+              <a:t>Adachi, P.J.C., &amp; Willoughby, T. (2011) The effect of violent video games on aggression: Is it more than just the violence? </a:t>
+            </a:r>
+            <a:r>
+              <a:rPr lang="en-US" sz="1300" i="1" dirty="0" smtClean="0">
+                <a:latin typeface="Helvetica" pitchFamily="34" charset="0"/>
+                <a:cs typeface="Helvetica" pitchFamily="34" charset="0"/>
+              </a:rPr>
+              <a:t>Aggression and Violent Behavior, 16, </a:t>
+            </a:r>
+            <a:r>
+              <a:rPr lang="en-US" sz="1300" dirty="0" smtClean="0">
+                <a:latin typeface="Helvetica" pitchFamily="34" charset="0"/>
+                <a:cs typeface="Helvetica" pitchFamily="34" charset="0"/>
+              </a:rPr>
+              <a:t>55-62</a:t>
+            </a:r>
+            <a:r>
+              <a:rPr lang="en-US" sz="1300" dirty="0" smtClean="0">
+                <a:latin typeface="Helvetica" pitchFamily="34" charset="0"/>
+                <a:cs typeface="Helvetica" pitchFamily="34" charset="0"/>
+              </a:rPr>
+              <a:t>.</a:t>
+            </a:r>
+            <a:endParaRPr lang="en-US" sz="1300" dirty="0" smtClean="0">
               <a:latin typeface="Helvetica" pitchFamily="34" charset="0"/>
               <a:cs typeface="Helvetica" pitchFamily="34" charset="0"/>
             </a:endParaRPr>
           </a:p>
           <a:p>
-            <a:pPr>
-              <a:buFont typeface="Arial" pitchFamily="34" charset="0"/>
-              <a:buChar char="•"/>
-            </a:pPr>
-            <a:endParaRPr lang="en-US" sz="3600" dirty="0" smtClean="0">
+            <a:r>
+              <a:rPr lang="en-US" sz="1300" dirty="0" err="1" smtClean="0">
+                <a:latin typeface="Helvetica" pitchFamily="34" charset="0"/>
+                <a:cs typeface="Helvetica" pitchFamily="34" charset="0"/>
+              </a:rPr>
+              <a:t>Hasan</a:t>
+            </a:r>
+            <a:r>
+              <a:rPr lang="en-US" sz="1300" dirty="0" smtClean="0">
+                <a:latin typeface="Helvetica" pitchFamily="34" charset="0"/>
+                <a:cs typeface="Helvetica" pitchFamily="34" charset="0"/>
+              </a:rPr>
+              <a:t>, Y., </a:t>
+            </a:r>
+            <a:r>
+              <a:rPr lang="en-US" sz="1300" dirty="0" err="1" smtClean="0">
+                <a:latin typeface="Helvetica" pitchFamily="34" charset="0"/>
+                <a:cs typeface="Helvetica" pitchFamily="34" charset="0"/>
+              </a:rPr>
+              <a:t>Begue</a:t>
+            </a:r>
+            <a:r>
+              <a:rPr lang="en-US" sz="1300" dirty="0" smtClean="0">
+                <a:latin typeface="Helvetica" pitchFamily="34" charset="0"/>
+                <a:cs typeface="Helvetica" pitchFamily="34" charset="0"/>
+              </a:rPr>
+              <a:t>, L., </a:t>
+            </a:r>
+            <a:r>
+              <a:rPr lang="en-US" sz="1300" dirty="0" err="1" smtClean="0">
+                <a:latin typeface="Helvetica" pitchFamily="34" charset="0"/>
+                <a:cs typeface="Helvetica" pitchFamily="34" charset="0"/>
+              </a:rPr>
+              <a:t>Scharkow</a:t>
+            </a:r>
+            <a:r>
+              <a:rPr lang="en-US" sz="1300" dirty="0" smtClean="0">
+                <a:latin typeface="Helvetica" pitchFamily="34" charset="0"/>
+                <a:cs typeface="Helvetica" pitchFamily="34" charset="0"/>
+              </a:rPr>
+              <a:t>, M., &amp; Bushman, B.J. (2013) The more you play, the more aggressive you become: A long-term experimental study of cumulative violent video game effects on hostile expectations and aggressive behavior. </a:t>
+            </a:r>
+            <a:r>
+              <a:rPr lang="en-US" sz="1300" i="1" dirty="0" smtClean="0">
+                <a:latin typeface="Helvetica" pitchFamily="34" charset="0"/>
+                <a:cs typeface="Helvetica" pitchFamily="34" charset="0"/>
+              </a:rPr>
+              <a:t>Journal of Experimental Social Psychology, 49, </a:t>
+            </a:r>
+            <a:r>
+              <a:rPr lang="en-US" sz="1300" dirty="0" smtClean="0">
+                <a:latin typeface="Helvetica" pitchFamily="34" charset="0"/>
+                <a:cs typeface="Helvetica" pitchFamily="34" charset="0"/>
+              </a:rPr>
+              <a:t>224-227.</a:t>
+            </a:r>
+          </a:p>
+          <a:p>
+            <a:r>
+              <a:rPr lang="en-US" sz="1300" dirty="0" smtClean="0">
+                <a:latin typeface="Helvetica" pitchFamily="34" charset="0"/>
+                <a:cs typeface="Helvetica" pitchFamily="34" charset="0"/>
+              </a:rPr>
+              <a:t>Millet, K. (2011) An </a:t>
+            </a:r>
+            <a:r>
+              <a:rPr lang="en-US" sz="1300" dirty="0" err="1" smtClean="0">
+                <a:latin typeface="Helvetica" pitchFamily="34" charset="0"/>
+                <a:cs typeface="Helvetica" pitchFamily="34" charset="0"/>
+              </a:rPr>
+              <a:t>interactionist</a:t>
+            </a:r>
+            <a:r>
+              <a:rPr lang="en-US" sz="1300" dirty="0" smtClean="0">
+                <a:latin typeface="Helvetica" pitchFamily="34" charset="0"/>
+                <a:cs typeface="Helvetica" pitchFamily="34" charset="0"/>
+              </a:rPr>
+              <a:t> perspective on the relation between 2D:4D and behavior: An overview of (moderated) relationships between 2D:4D and economic decision making. </a:t>
+            </a:r>
+            <a:r>
+              <a:rPr lang="en-US" sz="1300" i="1" dirty="0" smtClean="0">
+                <a:latin typeface="Helvetica" pitchFamily="34" charset="0"/>
+                <a:cs typeface="Helvetica" pitchFamily="34" charset="0"/>
+              </a:rPr>
+              <a:t>Personality and Individual Differences, 51, </a:t>
+            </a:r>
+            <a:r>
+              <a:rPr lang="en-US" sz="1300" dirty="0" smtClean="0">
+                <a:latin typeface="Helvetica" pitchFamily="34" charset="0"/>
+                <a:cs typeface="Helvetica" pitchFamily="34" charset="0"/>
+              </a:rPr>
+              <a:t>397-401.</a:t>
+            </a:r>
+          </a:p>
+          <a:p>
+            <a:r>
+              <a:rPr lang="en-US" sz="1300" dirty="0" smtClean="0">
+                <a:latin typeface="Helvetica" pitchFamily="34" charset="0"/>
+                <a:cs typeface="Helvetica" pitchFamily="34" charset="0"/>
+              </a:rPr>
+              <a:t>Morey, R. D., </a:t>
+            </a:r>
+            <a:r>
+              <a:rPr lang="en-US" sz="1300" dirty="0" err="1" smtClean="0">
+                <a:latin typeface="Helvetica" pitchFamily="34" charset="0"/>
+                <a:cs typeface="Helvetica" pitchFamily="34" charset="0"/>
+              </a:rPr>
+              <a:t>Rouder</a:t>
+            </a:r>
+            <a:r>
+              <a:rPr lang="en-US" sz="1300" dirty="0" smtClean="0">
+                <a:latin typeface="Helvetica" pitchFamily="34" charset="0"/>
+                <a:cs typeface="Helvetica" pitchFamily="34" charset="0"/>
+              </a:rPr>
+              <a:t>, J.N., &amp; </a:t>
+            </a:r>
+            <a:r>
+              <a:rPr lang="en-US" sz="1300" dirty="0" err="1" smtClean="0">
+                <a:latin typeface="Helvetica" pitchFamily="34" charset="0"/>
+                <a:cs typeface="Helvetica" pitchFamily="34" charset="0"/>
+              </a:rPr>
+              <a:t>Jamil</a:t>
+            </a:r>
+            <a:r>
+              <a:rPr lang="en-US" sz="1300" dirty="0" smtClean="0">
+                <a:latin typeface="Helvetica" pitchFamily="34" charset="0"/>
+                <a:cs typeface="Helvetica" pitchFamily="34" charset="0"/>
+              </a:rPr>
+              <a:t>, T. (2014). </a:t>
+            </a:r>
+            <a:r>
+              <a:rPr lang="en-US" sz="1300" dirty="0" err="1" smtClean="0">
+                <a:latin typeface="Helvetica" pitchFamily="34" charset="0"/>
+                <a:cs typeface="Helvetica" pitchFamily="34" charset="0"/>
+              </a:rPr>
+              <a:t>BayesFactor</a:t>
+            </a:r>
+            <a:r>
+              <a:rPr lang="en-US" sz="1300" dirty="0" smtClean="0">
+                <a:latin typeface="Helvetica" pitchFamily="34" charset="0"/>
+                <a:cs typeface="Helvetica" pitchFamily="34" charset="0"/>
+              </a:rPr>
+              <a:t>: Computation of </a:t>
+            </a:r>
+            <a:r>
+              <a:rPr lang="en-US" sz="1300" dirty="0" err="1" smtClean="0">
+                <a:latin typeface="Helvetica" pitchFamily="34" charset="0"/>
+                <a:cs typeface="Helvetica" pitchFamily="34" charset="0"/>
+              </a:rPr>
+              <a:t>Bayes</a:t>
+            </a:r>
+            <a:r>
+              <a:rPr lang="en-US" sz="1300" dirty="0" smtClean="0">
+                <a:latin typeface="Helvetica" pitchFamily="34" charset="0"/>
+                <a:cs typeface="Helvetica" pitchFamily="34" charset="0"/>
+              </a:rPr>
+              <a:t> factors for common designs. R package version 0.9.8. </a:t>
+            </a:r>
+          </a:p>
+          <a:p>
+            <a:r>
+              <a:rPr lang="en-US" sz="1300" dirty="0" err="1" smtClean="0">
+                <a:latin typeface="Helvetica" pitchFamily="34" charset="0"/>
+                <a:cs typeface="Helvetica" pitchFamily="34" charset="0"/>
+              </a:rPr>
+              <a:t>Pryzyblski</a:t>
+            </a:r>
+            <a:r>
+              <a:rPr lang="en-US" sz="1300" dirty="0" smtClean="0">
+                <a:latin typeface="Helvetica" pitchFamily="34" charset="0"/>
+                <a:cs typeface="Helvetica" pitchFamily="34" charset="0"/>
+              </a:rPr>
+              <a:t>, A.K., </a:t>
+            </a:r>
+            <a:r>
+              <a:rPr lang="en-US" sz="1300" dirty="0" err="1" smtClean="0">
+                <a:latin typeface="Helvetica" pitchFamily="34" charset="0"/>
+                <a:cs typeface="Helvetica" pitchFamily="34" charset="0"/>
+              </a:rPr>
+              <a:t>Deci</a:t>
+            </a:r>
+            <a:r>
+              <a:rPr lang="en-US" sz="1300" dirty="0" smtClean="0">
+                <a:latin typeface="Helvetica" pitchFamily="34" charset="0"/>
+                <a:cs typeface="Helvetica" pitchFamily="34" charset="0"/>
+              </a:rPr>
+              <a:t>, E.L., Rigby, C.S., &amp; Ryan, R.M. (2014) Competence-impeding electronic games and players’ aggressive feelings, thoughts, and behaviors. </a:t>
+            </a:r>
+            <a:r>
+              <a:rPr lang="en-US" sz="1300" i="1" dirty="0" smtClean="0">
+                <a:latin typeface="Helvetica" pitchFamily="34" charset="0"/>
+                <a:cs typeface="Helvetica" pitchFamily="34" charset="0"/>
+              </a:rPr>
+              <a:t>JPSP, 106, </a:t>
+            </a:r>
+            <a:r>
+              <a:rPr lang="en-US" sz="1300" dirty="0" smtClean="0">
+                <a:latin typeface="Helvetica" pitchFamily="34" charset="0"/>
+                <a:cs typeface="Helvetica" pitchFamily="34" charset="0"/>
+              </a:rPr>
+              <a:t>441-457.</a:t>
+            </a:r>
+          </a:p>
+          <a:p>
+            <a:r>
+              <a:rPr lang="en-US" sz="1300" dirty="0" smtClean="0">
+                <a:latin typeface="Helvetica" pitchFamily="34" charset="0"/>
+                <a:cs typeface="Helvetica" pitchFamily="34" charset="0"/>
+              </a:rPr>
+              <a:t>Stanley, T. D., &amp; </a:t>
+            </a:r>
+            <a:r>
+              <a:rPr lang="en-US" sz="1300" dirty="0" err="1" smtClean="0">
+                <a:latin typeface="Helvetica" pitchFamily="34" charset="0"/>
+                <a:cs typeface="Helvetica" pitchFamily="34" charset="0"/>
+              </a:rPr>
+              <a:t>Doucouliagos</a:t>
+            </a:r>
+            <a:r>
+              <a:rPr lang="en-US" sz="1300" dirty="0" smtClean="0">
+                <a:latin typeface="Helvetica" pitchFamily="34" charset="0"/>
+                <a:cs typeface="Helvetica" pitchFamily="34" charset="0"/>
+              </a:rPr>
+              <a:t>, H. (2014). Meta-regression approximations to reduce publication selection bias. </a:t>
+            </a:r>
+            <a:r>
+              <a:rPr lang="en-US" sz="1300" i="1" dirty="0" smtClean="0">
+                <a:latin typeface="Helvetica" pitchFamily="34" charset="0"/>
+                <a:cs typeface="Helvetica" pitchFamily="34" charset="0"/>
+              </a:rPr>
+              <a:t>Research Synthesis Methods, 5, </a:t>
+            </a:r>
+            <a:r>
+              <a:rPr lang="en-US" sz="1300" dirty="0" smtClean="0">
+                <a:latin typeface="Helvetica" pitchFamily="34" charset="0"/>
+                <a:cs typeface="Helvetica" pitchFamily="34" charset="0"/>
+              </a:rPr>
+              <a:t>60-78.</a:t>
+            </a:r>
+            <a:endParaRPr lang="en-US" sz="1300" dirty="0" smtClean="0">
               <a:latin typeface="Helvetica" pitchFamily="34" charset="0"/>
               <a:cs typeface="Helvetica" pitchFamily="34" charset="0"/>
             </a:endParaRPr>
-          </a:p>
-          <a:p>
-            <a:pPr>
-              <a:buFont typeface="Arial" pitchFamily="34" charset="0"/>
-              <a:buChar char="•"/>
-            </a:pPr>
-            <a:endParaRPr lang="en-US" sz="3600" dirty="0" smtClean="0">
-              <a:latin typeface="Helvetica" pitchFamily="34" charset="0"/>
-              <a:cs typeface="Helvetica" pitchFamily="34" charset="0"/>
-            </a:endParaRPr>
-          </a:p>
-          <a:p>
-            <a:pPr>
-              <a:buFont typeface="Arial" pitchFamily="34" charset="0"/>
-              <a:buChar char="•"/>
-            </a:pPr>
-            <a:endParaRPr lang="en-US" sz="3600" dirty="0" smtClean="0">
-              <a:latin typeface="Helvetica" pitchFamily="34" charset="0"/>
-              <a:cs typeface="Helvetica" pitchFamily="34" charset="0"/>
-            </a:endParaRPr>
-          </a:p>
-          <a:p>
-            <a:pPr>
-              <a:buFont typeface="Arial" pitchFamily="34" charset="0"/>
-              <a:buChar char="•"/>
-            </a:pPr>
-            <a:endParaRPr lang="en-US" sz="3600" dirty="0" smtClean="0">
-              <a:latin typeface="Helvetica" pitchFamily="34" charset="0"/>
-              <a:cs typeface="Helvetica" pitchFamily="34" charset="0"/>
-            </a:endParaRPr>
-          </a:p>
-          <a:p>
-            <a:pPr>
-              <a:buFont typeface="Arial" pitchFamily="34" charset="0"/>
-              <a:buChar char="•"/>
-            </a:pPr>
-            <a:endParaRPr lang="en-US" sz="3600" dirty="0" smtClean="0">
-              <a:latin typeface="Helvetica" pitchFamily="34" charset="0"/>
-              <a:cs typeface="Helvetica" pitchFamily="34" charset="0"/>
-            </a:endParaRPr>
-          </a:p>
-          <a:p>
-            <a:pPr>
-              <a:buFont typeface="Arial" pitchFamily="34" charset="0"/>
-              <a:buChar char="•"/>
-            </a:pPr>
-            <a:endParaRPr lang="en-US" sz="3600" dirty="0" smtClean="0">
-              <a:latin typeface="Helvetica" pitchFamily="34" charset="0"/>
-              <a:cs typeface="Helvetica" pitchFamily="34" charset="0"/>
-            </a:endParaRPr>
-          </a:p>
-          <a:p>
-            <a:pPr>
-              <a:buFont typeface="Arial" pitchFamily="34" charset="0"/>
-              <a:buChar char="•"/>
-            </a:pPr>
-            <a:endParaRPr lang="en-US" sz="3600" dirty="0" smtClean="0">
-              <a:latin typeface="Helvetica" pitchFamily="34" charset="0"/>
-              <a:cs typeface="Helvetica" pitchFamily="34" charset="0"/>
-            </a:endParaRPr>
-          </a:p>
-          <a:p>
-            <a:pPr>
-              <a:buFont typeface="Arial" pitchFamily="34" charset="0"/>
-              <a:buChar char="•"/>
-            </a:pPr>
-            <a:endParaRPr lang="en-US" sz="3600" dirty="0" smtClean="0">
-              <a:latin typeface="Helvetica" pitchFamily="34" charset="0"/>
-              <a:cs typeface="Helvetica" pitchFamily="34" charset="0"/>
-            </a:endParaRPr>
-          </a:p>
-          <a:p>
-            <a:pPr>
-              <a:buFont typeface="Arial" pitchFamily="34" charset="0"/>
-              <a:buChar char="•"/>
-            </a:pPr>
-            <a:endParaRPr lang="en-US" sz="3600" dirty="0" smtClean="0">
-              <a:latin typeface="Helvetica" pitchFamily="34" charset="0"/>
-              <a:cs typeface="Helvetica" pitchFamily="34" charset="0"/>
-            </a:endParaRPr>
-          </a:p>
-          <a:p>
-            <a:pPr>
-              <a:buFont typeface="Arial" pitchFamily="34" charset="0"/>
-              <a:buChar char="•"/>
-            </a:pPr>
-            <a:endParaRPr lang="en-US" sz="3600" dirty="0" smtClean="0">
-              <a:latin typeface="Helvetica" pitchFamily="34" charset="0"/>
-              <a:cs typeface="Helvetica" pitchFamily="34" charset="0"/>
-            </a:endParaRPr>
-          </a:p>
-          <a:p>
-            <a:pPr>
-              <a:buFont typeface="Arial" pitchFamily="34" charset="0"/>
-              <a:buChar char="•"/>
-            </a:pPr>
-            <a:endParaRPr lang="en-US" sz="3600" dirty="0" smtClean="0">
-              <a:latin typeface="Helvetica" pitchFamily="34" charset="0"/>
-              <a:cs typeface="Helvetica" pitchFamily="34" charset="0"/>
-            </a:endParaRPr>
-          </a:p>
-          <a:p>
-            <a:pPr>
-              <a:buFont typeface="Arial" pitchFamily="34" charset="0"/>
-              <a:buChar char="•"/>
-            </a:pPr>
-            <a:endParaRPr lang="en-US" sz="3600" dirty="0" smtClean="0">
-              <a:latin typeface="Helvetica" pitchFamily="34" charset="0"/>
-              <a:cs typeface="Helvetica" pitchFamily="34" charset="0"/>
-            </a:endParaRPr>
-          </a:p>
-          <a:p>
-            <a:pPr>
-              <a:buFont typeface="Arial" pitchFamily="34" charset="0"/>
-              <a:buChar char="•"/>
-            </a:pPr>
-            <a:endParaRPr lang="en-US" sz="3600" dirty="0" smtClean="0">
-              <a:latin typeface="Helvetica" pitchFamily="34" charset="0"/>
-              <a:cs typeface="Helvetica" pitchFamily="34" charset="0"/>
-            </a:endParaRPr>
-          </a:p>
-          <a:p>
-            <a:pPr>
-              <a:buFont typeface="Arial" pitchFamily="34" charset="0"/>
-              <a:buChar char="•"/>
-            </a:pPr>
-            <a:endParaRPr lang="en-US" sz="3600" dirty="0" smtClean="0">
-              <a:latin typeface="Helvetica" pitchFamily="34" charset="0"/>
-              <a:cs typeface="Helvetica" pitchFamily="34" charset="0"/>
-            </a:endParaRPr>
-          </a:p>
-          <a:p>
-            <a:pPr>
-              <a:buFont typeface="Arial" pitchFamily="34" charset="0"/>
-              <a:buChar char="•"/>
-            </a:pPr>
-            <a:endParaRPr lang="en-US" sz="3600" dirty="0" smtClean="0">
-              <a:latin typeface="Helvetica" pitchFamily="34" charset="0"/>
-              <a:cs typeface="Helvetica" pitchFamily="34" charset="0"/>
-            </a:endParaRPr>
-          </a:p>
-          <a:p>
-            <a:pPr>
-              <a:buFont typeface="Arial" pitchFamily="34" charset="0"/>
-              <a:buChar char="•"/>
-            </a:pPr>
-            <a:endParaRPr lang="en-US" sz="3600" dirty="0" smtClean="0">
-              <a:latin typeface="Helvetica" pitchFamily="34" charset="0"/>
-              <a:cs typeface="Helvetica" pitchFamily="34" charset="0"/>
-            </a:endParaRPr>
-          </a:p>
-          <a:p>
-            <a:r>
-              <a:rPr lang="en-US" sz="3600" dirty="0" smtClean="0">
-                <a:latin typeface="Helvetica" pitchFamily="34" charset="0"/>
-                <a:cs typeface="Helvetica" pitchFamily="34" charset="0"/>
-              </a:rPr>
-              <a:t>However, </a:t>
-            </a:r>
-            <a:r>
-              <a:rPr lang="en-US" sz="3600" dirty="0" err="1" smtClean="0">
-                <a:latin typeface="Helvetica" pitchFamily="34" charset="0"/>
-                <a:cs typeface="Helvetica" pitchFamily="34" charset="0"/>
-              </a:rPr>
-              <a:t>Bayes</a:t>
-            </a:r>
-            <a:r>
-              <a:rPr lang="en-US" sz="3600" dirty="0" smtClean="0">
-                <a:latin typeface="Helvetica" pitchFamily="34" charset="0"/>
-                <a:cs typeface="Helvetica" pitchFamily="34" charset="0"/>
-              </a:rPr>
-              <a:t> Factors model comparisons favored the null hypothesis over each of the more complex models:  </a:t>
-            </a:r>
-          </a:p>
-          <a:p>
-            <a:pPr>
-              <a:buFont typeface="Arial" pitchFamily="34" charset="0"/>
-              <a:buChar char="•"/>
-            </a:pPr>
-            <a:r>
-              <a:rPr lang="en-US" sz="3600" dirty="0" smtClean="0">
-                <a:latin typeface="Helvetica" pitchFamily="34" charset="0"/>
-                <a:cs typeface="Helvetica" pitchFamily="34" charset="0"/>
-              </a:rPr>
-              <a:t> </a:t>
-            </a:r>
-            <a:r>
-              <a:rPr lang="en-US" sz="3600" dirty="0" smtClean="0">
-                <a:latin typeface="Helvetica" pitchFamily="34" charset="0"/>
-                <a:cs typeface="Helvetica" pitchFamily="34" charset="0"/>
-              </a:rPr>
-              <a:t>3.18 </a:t>
-            </a:r>
-            <a:r>
-              <a:rPr lang="en-US" sz="3600" dirty="0" smtClean="0">
-                <a:latin typeface="Helvetica" pitchFamily="34" charset="0"/>
-                <a:cs typeface="Helvetica" pitchFamily="34" charset="0"/>
-              </a:rPr>
-              <a:t>: 1 against a violence-only model</a:t>
-            </a:r>
-          </a:p>
-          <a:p>
-            <a:pPr>
-              <a:buFont typeface="Arial" pitchFamily="34" charset="0"/>
-              <a:buChar char="•"/>
-            </a:pPr>
-            <a:r>
-              <a:rPr lang="en-US" sz="3600" dirty="0" smtClean="0">
-                <a:latin typeface="Helvetica" pitchFamily="34" charset="0"/>
-                <a:cs typeface="Helvetica" pitchFamily="34" charset="0"/>
-              </a:rPr>
-              <a:t> </a:t>
-            </a:r>
-            <a:r>
-              <a:rPr lang="en-US" sz="3600" dirty="0" smtClean="0">
-                <a:latin typeface="Helvetica" pitchFamily="34" charset="0"/>
-                <a:cs typeface="Helvetica" pitchFamily="34" charset="0"/>
-              </a:rPr>
-              <a:t>4.16 </a:t>
-            </a:r>
-            <a:r>
-              <a:rPr lang="en-US" sz="3600" dirty="0" smtClean="0">
-                <a:latin typeface="Helvetica" pitchFamily="34" charset="0"/>
-                <a:cs typeface="Helvetica" pitchFamily="34" charset="0"/>
-              </a:rPr>
-              <a:t>: 1 against a difficulty-only model</a:t>
-            </a:r>
-          </a:p>
-          <a:p>
-            <a:pPr>
-              <a:buFont typeface="Arial" pitchFamily="34" charset="0"/>
-              <a:buChar char="•"/>
-            </a:pPr>
-            <a:r>
-              <a:rPr lang="en-US" sz="3600" dirty="0" smtClean="0">
-                <a:latin typeface="Helvetica" pitchFamily="34" charset="0"/>
-                <a:cs typeface="Helvetica" pitchFamily="34" charset="0"/>
-              </a:rPr>
-              <a:t> </a:t>
-            </a:r>
-            <a:r>
-              <a:rPr lang="en-US" sz="3600" dirty="0" smtClean="0">
-                <a:latin typeface="Helvetica" pitchFamily="34" charset="0"/>
-                <a:cs typeface="Helvetica" pitchFamily="34" charset="0"/>
-              </a:rPr>
-              <a:t>14.1 </a:t>
-            </a:r>
-            <a:r>
-              <a:rPr lang="en-US" sz="3600" dirty="0" smtClean="0">
-                <a:latin typeface="Helvetica" pitchFamily="34" charset="0"/>
-                <a:cs typeface="Helvetica" pitchFamily="34" charset="0"/>
-              </a:rPr>
-              <a:t>: 1 against additive effects of violence and difficulty, and</a:t>
-            </a:r>
-          </a:p>
-          <a:p>
-            <a:pPr>
-              <a:buFont typeface="Arial" pitchFamily="34" charset="0"/>
-              <a:buChar char="•"/>
-            </a:pPr>
-            <a:r>
-              <a:rPr lang="en-US" sz="3600" smtClean="0">
-                <a:latin typeface="Helvetica" pitchFamily="34" charset="0"/>
-                <a:cs typeface="Helvetica" pitchFamily="34" charset="0"/>
-              </a:rPr>
-              <a:t> </a:t>
-            </a:r>
-            <a:r>
-              <a:rPr lang="en-US" sz="3600" smtClean="0">
-                <a:latin typeface="Helvetica" pitchFamily="34" charset="0"/>
-                <a:cs typeface="Helvetica" pitchFamily="34" charset="0"/>
-              </a:rPr>
-              <a:t>4.16 </a:t>
-            </a:r>
-            <a:r>
-              <a:rPr lang="en-US" sz="3600" dirty="0" smtClean="0">
-                <a:latin typeface="Helvetica" pitchFamily="34" charset="0"/>
-                <a:cs typeface="Helvetica" pitchFamily="34" charset="0"/>
-              </a:rPr>
-              <a:t>: 1 against the full model with interactive effects of violence and difficulty.  </a:t>
-            </a:r>
-          </a:p>
-        </p:txBody>
-      </p:sp>
-      <p:sp>
-        <p:nvSpPr>
-          <p:cNvPr id="29" name="TextBox 28"/>
-          <p:cNvSpPr txBox="1"/>
-          <p:nvPr/>
-        </p:nvSpPr>
-        <p:spPr>
-          <a:xfrm>
-            <a:off x="31318200" y="32167058"/>
-            <a:ext cx="13944600" cy="2385268"/>
-          </a:xfrm>
-          <a:prstGeom prst="rect">
-            <a:avLst/>
-          </a:prstGeom>
-          <a:solidFill>
-            <a:schemeClr val="bg1"/>
-          </a:solidFill>
-          <a:ln w="76200">
-            <a:solidFill>
-              <a:schemeClr val="tx1"/>
-            </a:solidFill>
-          </a:ln>
-        </p:spPr>
-        <p:txBody>
-          <a:bodyPr wrap="square" lIns="182880" tIns="91440" rIns="182880" bIns="91440" rtlCol="0">
-            <a:spAutoFit/>
-          </a:bodyPr>
-          <a:lstStyle/>
-          <a:p>
-            <a:pPr algn="ctr"/>
-            <a:r>
-              <a:rPr lang="en-US" sz="2600" b="1" dirty="0" smtClean="0">
-                <a:latin typeface="Garamond" pitchFamily="18" charset="0"/>
-              </a:rPr>
-              <a:t>References</a:t>
-            </a:r>
-          </a:p>
-          <a:p>
-            <a:r>
-              <a:rPr lang="en-US" sz="1300" dirty="0" smtClean="0">
-                <a:latin typeface="Helvetica" pitchFamily="34" charset="0"/>
-                <a:cs typeface="Helvetica" pitchFamily="34" charset="0"/>
-              </a:rPr>
-              <a:t>Anderson, C.A., Akiko, S., </a:t>
-            </a:r>
-            <a:r>
-              <a:rPr lang="en-US" sz="1300" dirty="0" err="1" smtClean="0">
-                <a:latin typeface="Helvetica" pitchFamily="34" charset="0"/>
-                <a:cs typeface="Helvetica" pitchFamily="34" charset="0"/>
-              </a:rPr>
-              <a:t>Ihori</a:t>
-            </a:r>
-            <a:r>
-              <a:rPr lang="en-US" sz="1300" dirty="0" smtClean="0">
-                <a:latin typeface="Helvetica" pitchFamily="34" charset="0"/>
-                <a:cs typeface="Helvetica" pitchFamily="34" charset="0"/>
-              </a:rPr>
-              <a:t>, N., Swing, E.L., Bushman, B.J., Sakamoto, A., Rothstein, H.R., &amp; </a:t>
-            </a:r>
-            <a:r>
-              <a:rPr lang="en-US" sz="1300" dirty="0" err="1" smtClean="0">
-                <a:latin typeface="Helvetica" pitchFamily="34" charset="0"/>
-                <a:cs typeface="Helvetica" pitchFamily="34" charset="0"/>
-              </a:rPr>
-              <a:t>Saleem</a:t>
-            </a:r>
-            <a:r>
-              <a:rPr lang="en-US" sz="1300" dirty="0" smtClean="0">
-                <a:latin typeface="Helvetica" pitchFamily="34" charset="0"/>
-                <a:cs typeface="Helvetica" pitchFamily="34" charset="0"/>
-              </a:rPr>
-              <a:t>, M. (2010) Violent video game effects on aggression, empathy, and </a:t>
-            </a:r>
-            <a:r>
-              <a:rPr lang="en-US" sz="1300" dirty="0" err="1" smtClean="0">
-                <a:latin typeface="Helvetica" pitchFamily="34" charset="0"/>
-                <a:cs typeface="Helvetica" pitchFamily="34" charset="0"/>
-              </a:rPr>
-              <a:t>prosocial</a:t>
-            </a:r>
-            <a:r>
-              <a:rPr lang="en-US" sz="1300" dirty="0" smtClean="0">
-                <a:latin typeface="Helvetica" pitchFamily="34" charset="0"/>
-                <a:cs typeface="Helvetica" pitchFamily="34" charset="0"/>
-              </a:rPr>
-              <a:t> behavior in Eastern and Western countries: A meta-analytic review. </a:t>
-            </a:r>
-            <a:r>
-              <a:rPr lang="en-US" sz="1300" i="1" dirty="0" smtClean="0">
-                <a:latin typeface="Helvetica" pitchFamily="34" charset="0"/>
-                <a:cs typeface="Helvetica" pitchFamily="34" charset="0"/>
-              </a:rPr>
-              <a:t>Psychological Bulletin, 136, </a:t>
-            </a:r>
-            <a:r>
-              <a:rPr lang="en-US" sz="1300" dirty="0" smtClean="0">
-                <a:latin typeface="Helvetica" pitchFamily="34" charset="0"/>
-                <a:cs typeface="Helvetica" pitchFamily="34" charset="0"/>
-              </a:rPr>
-              <a:t>151-173.</a:t>
-            </a:r>
-          </a:p>
-          <a:p>
-            <a:r>
-              <a:rPr lang="en-US" sz="1300" dirty="0" smtClean="0">
-                <a:latin typeface="Helvetica" pitchFamily="34" charset="0"/>
-                <a:cs typeface="Helvetica" pitchFamily="34" charset="0"/>
-              </a:rPr>
-              <a:t>Adachi, P.J.C., &amp; Willoughby, T. (2011) The effect of violent video games on aggression: Is it more than just the violence? </a:t>
-            </a:r>
-            <a:r>
-              <a:rPr lang="en-US" sz="1300" i="1" dirty="0" smtClean="0">
-                <a:latin typeface="Helvetica" pitchFamily="34" charset="0"/>
-                <a:cs typeface="Helvetica" pitchFamily="34" charset="0"/>
-              </a:rPr>
-              <a:t>Aggression and Violent Behavior, 16, </a:t>
-            </a:r>
-            <a:r>
-              <a:rPr lang="en-US" sz="1300" dirty="0" smtClean="0">
-                <a:latin typeface="Helvetica" pitchFamily="34" charset="0"/>
-                <a:cs typeface="Helvetica" pitchFamily="34" charset="0"/>
-              </a:rPr>
-              <a:t>55-62.</a:t>
-            </a:r>
-          </a:p>
-          <a:p>
-            <a:r>
-              <a:rPr lang="en-US" sz="1300" dirty="0" err="1" smtClean="0">
-                <a:latin typeface="Helvetica" pitchFamily="34" charset="0"/>
-                <a:cs typeface="Helvetica" pitchFamily="34" charset="0"/>
-              </a:rPr>
-              <a:t>Hasan</a:t>
-            </a:r>
-            <a:r>
-              <a:rPr lang="en-US" sz="1300" dirty="0" smtClean="0">
-                <a:latin typeface="Helvetica" pitchFamily="34" charset="0"/>
-                <a:cs typeface="Helvetica" pitchFamily="34" charset="0"/>
-              </a:rPr>
-              <a:t>, Y., </a:t>
-            </a:r>
-            <a:r>
-              <a:rPr lang="en-US" sz="1300" dirty="0" err="1" smtClean="0">
-                <a:latin typeface="Helvetica" pitchFamily="34" charset="0"/>
-                <a:cs typeface="Helvetica" pitchFamily="34" charset="0"/>
-              </a:rPr>
-              <a:t>Begue</a:t>
-            </a:r>
-            <a:r>
-              <a:rPr lang="en-US" sz="1300" dirty="0" smtClean="0">
-                <a:latin typeface="Helvetica" pitchFamily="34" charset="0"/>
-                <a:cs typeface="Helvetica" pitchFamily="34" charset="0"/>
-              </a:rPr>
-              <a:t>, L., </a:t>
-            </a:r>
-            <a:r>
-              <a:rPr lang="en-US" sz="1300" dirty="0" err="1" smtClean="0">
-                <a:latin typeface="Helvetica" pitchFamily="34" charset="0"/>
-                <a:cs typeface="Helvetica" pitchFamily="34" charset="0"/>
-              </a:rPr>
-              <a:t>Scharkow</a:t>
-            </a:r>
-            <a:r>
-              <a:rPr lang="en-US" sz="1300" dirty="0" smtClean="0">
-                <a:latin typeface="Helvetica" pitchFamily="34" charset="0"/>
-                <a:cs typeface="Helvetica" pitchFamily="34" charset="0"/>
-              </a:rPr>
-              <a:t>, M., &amp; Bushman, B.J. (2013) The more you play, the more aggressive you become: A long-term experimental study of cumulative violent video game effects on hostile expectations and aggressive behavior. </a:t>
-            </a:r>
-            <a:r>
-              <a:rPr lang="en-US" sz="1300" i="1" dirty="0" smtClean="0">
-                <a:latin typeface="Helvetica" pitchFamily="34" charset="0"/>
-                <a:cs typeface="Helvetica" pitchFamily="34" charset="0"/>
-              </a:rPr>
-              <a:t>Journal of Experimental Social Psychology, 49, </a:t>
-            </a:r>
-            <a:r>
-              <a:rPr lang="en-US" sz="1300" dirty="0" smtClean="0">
-                <a:latin typeface="Helvetica" pitchFamily="34" charset="0"/>
-                <a:cs typeface="Helvetica" pitchFamily="34" charset="0"/>
-              </a:rPr>
-              <a:t>224-227.</a:t>
-            </a:r>
-          </a:p>
-          <a:p>
-            <a:r>
-              <a:rPr lang="en-US" sz="1300" dirty="0" smtClean="0">
-                <a:latin typeface="Helvetica" pitchFamily="34" charset="0"/>
-                <a:cs typeface="Helvetica" pitchFamily="34" charset="0"/>
-              </a:rPr>
-              <a:t>Millet, K. (2011) An </a:t>
-            </a:r>
-            <a:r>
-              <a:rPr lang="en-US" sz="1300" dirty="0" err="1" smtClean="0">
-                <a:latin typeface="Helvetica" pitchFamily="34" charset="0"/>
-                <a:cs typeface="Helvetica" pitchFamily="34" charset="0"/>
-              </a:rPr>
-              <a:t>interactionist</a:t>
-            </a:r>
-            <a:r>
-              <a:rPr lang="en-US" sz="1300" dirty="0" smtClean="0">
-                <a:latin typeface="Helvetica" pitchFamily="34" charset="0"/>
-                <a:cs typeface="Helvetica" pitchFamily="34" charset="0"/>
-              </a:rPr>
-              <a:t> perspective on the relation between 2D:4D and behavior: An overview of (moderated) relationships between 2D:4D and economic decision making. </a:t>
-            </a:r>
-            <a:r>
-              <a:rPr lang="en-US" sz="1300" i="1" dirty="0" smtClean="0">
-                <a:latin typeface="Helvetica" pitchFamily="34" charset="0"/>
-                <a:cs typeface="Helvetica" pitchFamily="34" charset="0"/>
-              </a:rPr>
-              <a:t>Personality and Individual Differences, 51, </a:t>
-            </a:r>
-            <a:r>
-              <a:rPr lang="en-US" sz="1300" dirty="0" smtClean="0">
-                <a:latin typeface="Helvetica" pitchFamily="34" charset="0"/>
-                <a:cs typeface="Helvetica" pitchFamily="34" charset="0"/>
-              </a:rPr>
-              <a:t>397-401.</a:t>
-            </a:r>
-          </a:p>
-          <a:p>
-            <a:r>
-              <a:rPr lang="en-US" sz="1300" dirty="0" smtClean="0">
-                <a:latin typeface="Helvetica" pitchFamily="34" charset="0"/>
-                <a:cs typeface="Helvetica" pitchFamily="34" charset="0"/>
-              </a:rPr>
-              <a:t>Morey, R. D., </a:t>
-            </a:r>
-            <a:r>
-              <a:rPr lang="en-US" sz="1300" dirty="0" err="1" smtClean="0">
-                <a:latin typeface="Helvetica" pitchFamily="34" charset="0"/>
-                <a:cs typeface="Helvetica" pitchFamily="34" charset="0"/>
-              </a:rPr>
-              <a:t>Rouder</a:t>
-            </a:r>
-            <a:r>
-              <a:rPr lang="en-US" sz="1300" dirty="0" smtClean="0">
-                <a:latin typeface="Helvetica" pitchFamily="34" charset="0"/>
-                <a:cs typeface="Helvetica" pitchFamily="34" charset="0"/>
-              </a:rPr>
-              <a:t>, J.N., &amp; </a:t>
-            </a:r>
-            <a:r>
-              <a:rPr lang="en-US" sz="1300" dirty="0" err="1" smtClean="0">
-                <a:latin typeface="Helvetica" pitchFamily="34" charset="0"/>
-                <a:cs typeface="Helvetica" pitchFamily="34" charset="0"/>
-              </a:rPr>
-              <a:t>Jamil</a:t>
-            </a:r>
-            <a:r>
-              <a:rPr lang="en-US" sz="1300" dirty="0" smtClean="0">
-                <a:latin typeface="Helvetica" pitchFamily="34" charset="0"/>
-                <a:cs typeface="Helvetica" pitchFamily="34" charset="0"/>
-              </a:rPr>
-              <a:t>, T. (2014). </a:t>
-            </a:r>
-            <a:r>
-              <a:rPr lang="en-US" sz="1300" dirty="0" err="1" smtClean="0">
-                <a:latin typeface="Helvetica" pitchFamily="34" charset="0"/>
-                <a:cs typeface="Helvetica" pitchFamily="34" charset="0"/>
-              </a:rPr>
-              <a:t>BayesFactor</a:t>
-            </a:r>
-            <a:r>
-              <a:rPr lang="en-US" sz="1300" dirty="0" smtClean="0">
-                <a:latin typeface="Helvetica" pitchFamily="34" charset="0"/>
-                <a:cs typeface="Helvetica" pitchFamily="34" charset="0"/>
-              </a:rPr>
-              <a:t>: Computation of </a:t>
-            </a:r>
-            <a:r>
-              <a:rPr lang="en-US" sz="1300" dirty="0" err="1" smtClean="0">
-                <a:latin typeface="Helvetica" pitchFamily="34" charset="0"/>
-                <a:cs typeface="Helvetica" pitchFamily="34" charset="0"/>
-              </a:rPr>
-              <a:t>Bayes</a:t>
-            </a:r>
-            <a:r>
-              <a:rPr lang="en-US" sz="1300" dirty="0" smtClean="0">
-                <a:latin typeface="Helvetica" pitchFamily="34" charset="0"/>
-                <a:cs typeface="Helvetica" pitchFamily="34" charset="0"/>
-              </a:rPr>
-              <a:t> factors for common designs. R package version 0.9.8. </a:t>
-            </a:r>
-          </a:p>
-          <a:p>
-            <a:r>
-              <a:rPr lang="en-US" sz="1300" dirty="0" err="1" smtClean="0">
-                <a:latin typeface="Helvetica" pitchFamily="34" charset="0"/>
-                <a:cs typeface="Helvetica" pitchFamily="34" charset="0"/>
-              </a:rPr>
-              <a:t>Pryzyblski</a:t>
-            </a:r>
-            <a:r>
-              <a:rPr lang="en-US" sz="1300" dirty="0" smtClean="0">
-                <a:latin typeface="Helvetica" pitchFamily="34" charset="0"/>
-                <a:cs typeface="Helvetica" pitchFamily="34" charset="0"/>
-              </a:rPr>
-              <a:t>, A.K., </a:t>
-            </a:r>
-            <a:r>
-              <a:rPr lang="en-US" sz="1300" dirty="0" err="1" smtClean="0">
-                <a:latin typeface="Helvetica" pitchFamily="34" charset="0"/>
-                <a:cs typeface="Helvetica" pitchFamily="34" charset="0"/>
-              </a:rPr>
-              <a:t>Deci</a:t>
-            </a:r>
-            <a:r>
-              <a:rPr lang="en-US" sz="1300" dirty="0" smtClean="0">
-                <a:latin typeface="Helvetica" pitchFamily="34" charset="0"/>
-                <a:cs typeface="Helvetica" pitchFamily="34" charset="0"/>
-              </a:rPr>
-              <a:t>, E.L., Rigby, C.S., &amp; Ryan, R.M. (2014) Competence-impeding electronic games and players’ aggressive feelings, thoughts, and behaviors. </a:t>
-            </a:r>
-            <a:r>
-              <a:rPr lang="en-US" sz="1300" i="1" dirty="0" smtClean="0">
-                <a:latin typeface="Helvetica" pitchFamily="34" charset="0"/>
-                <a:cs typeface="Helvetica" pitchFamily="34" charset="0"/>
-              </a:rPr>
-              <a:t>JPSP, 106, </a:t>
-            </a:r>
-            <a:r>
-              <a:rPr lang="en-US" sz="1300" dirty="0" smtClean="0">
-                <a:latin typeface="Helvetica" pitchFamily="34" charset="0"/>
-                <a:cs typeface="Helvetica" pitchFamily="34" charset="0"/>
-              </a:rPr>
-              <a:t>441-457</a:t>
-            </a:r>
           </a:p>
         </p:txBody>
       </p:sp>
@@ -5031,8 +4737,8 @@
         </p:nvSpPr>
         <p:spPr>
           <a:xfrm>
-            <a:off x="457200" y="5181600"/>
-            <a:ext cx="13944600" cy="10556736"/>
+            <a:off x="266700" y="5181600"/>
+            <a:ext cx="14401800" cy="10172015"/>
           </a:xfrm>
           <a:prstGeom prst="rect">
             <a:avLst/>
@@ -5074,63 +4780,28 @@
                 <a:latin typeface="Helvetica" pitchFamily="34" charset="0"/>
                 <a:cs typeface="Helvetica" pitchFamily="34" charset="0"/>
               </a:rPr>
-              <a:t>The ratio of lengths of index and ring fingers  (2d4d ratio) is thought to measure prenatal testosterone exposure</a:t>
+              <a:t>Decades </a:t>
             </a:r>
             <a:r>
               <a:rPr lang="en-US" sz="3200" dirty="0">
                 <a:latin typeface="Helvetica" pitchFamily="34" charset="0"/>
                 <a:cs typeface="Helvetica" pitchFamily="34" charset="0"/>
               </a:rPr>
-              <a:t> </a:t>
-            </a:r>
-            <a:r>
-              <a:rPr lang="en-US" sz="2000" dirty="0">
-                <a:latin typeface="Helvetica" pitchFamily="34" charset="0"/>
-                <a:cs typeface="Helvetica" pitchFamily="34" charset="0"/>
-              </a:rPr>
-              <a:t>(</a:t>
-            </a:r>
-            <a:r>
-              <a:rPr lang="en-US" sz="2000" dirty="0" err="1">
-                <a:latin typeface="Helvetica" pitchFamily="34" charset="0"/>
-                <a:cs typeface="Helvetica" pitchFamily="34" charset="0"/>
-              </a:rPr>
-              <a:t>Lutchmaya</a:t>
-            </a:r>
-            <a:r>
-              <a:rPr lang="en-US" sz="2000" dirty="0">
-                <a:latin typeface="Helvetica" pitchFamily="34" charset="0"/>
-                <a:cs typeface="Helvetica" pitchFamily="34" charset="0"/>
-              </a:rPr>
-              <a:t> et al., </a:t>
-            </a:r>
-            <a:r>
-              <a:rPr lang="en-US" sz="2000" dirty="0" smtClean="0">
-                <a:latin typeface="Helvetica" pitchFamily="34" charset="0"/>
-                <a:cs typeface="Helvetica" pitchFamily="34" charset="0"/>
-              </a:rPr>
-              <a:t>2004; </a:t>
-            </a:r>
-            <a:r>
-              <a:rPr lang="en-US" sz="2000" dirty="0">
-                <a:latin typeface="Helvetica" pitchFamily="34" charset="0"/>
-                <a:cs typeface="Helvetica" pitchFamily="34" charset="0"/>
-              </a:rPr>
-              <a:t>Manning </a:t>
-            </a:r>
-            <a:r>
-              <a:rPr lang="en-US" sz="2000" dirty="0" smtClean="0">
-                <a:latin typeface="Helvetica" pitchFamily="34" charset="0"/>
-                <a:cs typeface="Helvetica" pitchFamily="34" charset="0"/>
-              </a:rPr>
-              <a:t>et al., 1998)</a:t>
-            </a:r>
-            <a:r>
-              <a:rPr lang="en-US" sz="3200" dirty="0" smtClean="0">
-                <a:latin typeface="Helvetica" pitchFamily="34" charset="0"/>
-                <a:cs typeface="Helvetica" pitchFamily="34" charset="0"/>
-              </a:rPr>
-              <a:t>.</a:t>
+              <a:t>of research have indicated a modest but reliable causal relationship between violent video games and increased aggressive behavior </a:t>
+            </a:r>
+            <a:r>
+              <a:rPr lang="en-US" sz="2800" dirty="0">
+                <a:latin typeface="Helvetica" pitchFamily="34" charset="0"/>
+                <a:cs typeface="Helvetica" pitchFamily="34" charset="0"/>
+              </a:rPr>
+              <a:t>(see Anderson et al., 2010)</a:t>
+            </a:r>
+            <a:r>
+              <a:rPr lang="en-US" sz="3200" dirty="0">
+                <a:latin typeface="Helvetica" pitchFamily="34" charset="0"/>
+                <a:cs typeface="Helvetica" pitchFamily="34" charset="0"/>
+              </a:rPr>
+              <a:t>. </a:t>
             </a:r>
           </a:p>
           <a:p>
@@ -5142,25 +4813,25 @@
               <a:buChar char="•"/>
             </a:pPr>
             <a:r>
-              <a:rPr lang="en-US" sz="3200" dirty="0" smtClean="0">
-                <a:latin typeface="Helvetica" pitchFamily="34" charset="0"/>
-                <a:cs typeface="Helvetica" pitchFamily="34" charset="0"/>
-              </a:rPr>
-              <a:t>While greater testosterone exposure would be expected to predict more aggressive behavior, the literature of 2d4d effects on aggressive behavior has been mixed. It has been suggested that 2d4d ratio may only be associated with aggression in response to provocation </a:t>
-            </a:r>
-            <a:r>
-              <a:rPr lang="en-US" sz="2800" dirty="0" smtClean="0">
-                <a:latin typeface="Helvetica" pitchFamily="34" charset="0"/>
-                <a:cs typeface="Helvetica" pitchFamily="34" charset="0"/>
-              </a:rPr>
-              <a:t>(Millet, 2011)</a:t>
-            </a:r>
-            <a:r>
-              <a:rPr lang="en-US" sz="3200" dirty="0" smtClean="0">
-                <a:latin typeface="Helvetica" pitchFamily="34" charset="0"/>
-                <a:cs typeface="Helvetica" pitchFamily="34" charset="0"/>
-              </a:rPr>
-              <a:t>.</a:t>
+              <a:rPr lang="en-US" sz="3200" dirty="0">
+                <a:latin typeface="Helvetica" pitchFamily="34" charset="0"/>
+                <a:cs typeface="Helvetica" pitchFamily="34" charset="0"/>
+              </a:rPr>
+              <a:t>However, prior research has often lacked appropriate controls, comparing violent and nonviolent video games that differ in numerous ways (e.g., comparing racing games against shooter games; </a:t>
+            </a:r>
+            <a:r>
+              <a:rPr lang="en-US" sz="2800" dirty="0">
+                <a:latin typeface="Helvetica" pitchFamily="34" charset="0"/>
+                <a:cs typeface="Helvetica" pitchFamily="34" charset="0"/>
+              </a:rPr>
+              <a:t>Hasan et al., 2013</a:t>
+            </a:r>
+            <a:r>
+              <a:rPr lang="en-US" sz="3200" dirty="0">
+                <a:latin typeface="Helvetica" pitchFamily="34" charset="0"/>
+                <a:cs typeface="Helvetica" pitchFamily="34" charset="0"/>
+              </a:rPr>
+              <a:t>). </a:t>
             </a:r>
           </a:p>
           <a:p>
@@ -5172,25 +4843,39 @@
               <a:buChar char="•"/>
             </a:pPr>
             <a:r>
-              <a:rPr lang="en-US" sz="3200" dirty="0" smtClean="0">
-                <a:latin typeface="Helvetica" pitchFamily="34" charset="0"/>
-                <a:cs typeface="Helvetica" pitchFamily="34" charset="0"/>
-              </a:rPr>
-              <a:t>Additionally, decades of research have indicated a modest but reliable causal relationship between violent video games and increased aggressive behavior </a:t>
-            </a:r>
-            <a:r>
-              <a:rPr lang="en-US" sz="2800" dirty="0" smtClean="0">
-                <a:latin typeface="Helvetica" pitchFamily="34" charset="0"/>
-                <a:cs typeface="Helvetica" pitchFamily="34" charset="0"/>
-              </a:rPr>
-              <a:t>(see Anderson et al., 2010)</a:t>
-            </a:r>
-            <a:r>
-              <a:rPr lang="en-US" sz="3200" dirty="0" smtClean="0">
-                <a:latin typeface="Helvetica" pitchFamily="34" charset="0"/>
-                <a:cs typeface="Helvetica" pitchFamily="34" charset="0"/>
-              </a:rPr>
-              <a:t>. </a:t>
+              <a:rPr lang="en-US" sz="3200" dirty="0">
+                <a:latin typeface="Helvetica" pitchFamily="34" charset="0"/>
+                <a:cs typeface="Helvetica" pitchFamily="34" charset="0"/>
+              </a:rPr>
+              <a:t>It has been suggested that this practice introduces confounds, such as changes in difficulty, which may be responsible for observed effects on aggressive behavior </a:t>
+            </a:r>
+            <a:r>
+              <a:rPr lang="en-US" sz="2800" dirty="0">
+                <a:latin typeface="Helvetica" pitchFamily="34" charset="0"/>
+                <a:cs typeface="Helvetica" pitchFamily="34" charset="0"/>
+              </a:rPr>
+              <a:t>(Adachi &amp; Willoughby, 2011; </a:t>
+            </a:r>
+            <a:r>
+              <a:rPr lang="en-US" sz="2800" dirty="0" err="1">
+                <a:latin typeface="Helvetica" pitchFamily="34" charset="0"/>
+                <a:cs typeface="Helvetica" pitchFamily="34" charset="0"/>
+              </a:rPr>
+              <a:t>Przybylski</a:t>
+            </a:r>
+            <a:r>
+              <a:rPr lang="en-US" sz="2800" dirty="0">
+                <a:latin typeface="Helvetica" pitchFamily="34" charset="0"/>
+                <a:cs typeface="Helvetica" pitchFamily="34" charset="0"/>
+              </a:rPr>
+              <a:t> et al., 2013)</a:t>
+            </a:r>
+            <a:r>
+              <a:rPr lang="en-US" sz="3200" dirty="0">
+                <a:latin typeface="Helvetica" pitchFamily="34" charset="0"/>
+                <a:cs typeface="Helvetica" pitchFamily="34" charset="0"/>
+              </a:rPr>
+              <a:t>.</a:t>
             </a:r>
           </a:p>
           <a:p>
@@ -5206,33 +4891,64 @@
                 <a:latin typeface="Helvetica" pitchFamily="34" charset="0"/>
                 <a:cs typeface="Helvetica" pitchFamily="34" charset="0"/>
               </a:rPr>
-              <a:t>However, prior research has often lacked appropriate controls, comparing violent and nonviolent video games that differ in numerous ways (e.g., comparing racing games against shooter games; </a:t>
-            </a:r>
-            <a:r>
-              <a:rPr lang="en-US" sz="2800" dirty="0" smtClean="0">
-                <a:latin typeface="Helvetica" pitchFamily="34" charset="0"/>
-                <a:cs typeface="Helvetica" pitchFamily="34" charset="0"/>
-              </a:rPr>
-              <a:t>Hasan et al., 2013</a:t>
+              <a:t>The ratio of lengths of index and ring fingers  (2d4d ratio) is thought to measure prenatal testosterone exposure</a:t>
+            </a:r>
+            <a:r>
+              <a:rPr lang="en-US" sz="3200" dirty="0">
+                <a:latin typeface="Helvetica" pitchFamily="34" charset="0"/>
+                <a:cs typeface="Helvetica" pitchFamily="34" charset="0"/>
+              </a:rPr>
+              <a:t> </a:t>
+            </a:r>
+            <a:r>
+              <a:rPr lang="en-US" sz="2000" dirty="0">
+                <a:latin typeface="Helvetica" pitchFamily="34" charset="0"/>
+                <a:cs typeface="Helvetica" pitchFamily="34" charset="0"/>
+              </a:rPr>
+              <a:t>(</a:t>
+            </a:r>
+            <a:r>
+              <a:rPr lang="en-US" sz="2000" dirty="0" err="1">
+                <a:latin typeface="Helvetica" pitchFamily="34" charset="0"/>
+                <a:cs typeface="Helvetica" pitchFamily="34" charset="0"/>
+              </a:rPr>
+              <a:t>Lutchmaya</a:t>
+            </a:r>
+            <a:r>
+              <a:rPr lang="en-US" sz="2000" dirty="0">
+                <a:latin typeface="Helvetica" pitchFamily="34" charset="0"/>
+                <a:cs typeface="Helvetica" pitchFamily="34" charset="0"/>
+              </a:rPr>
+              <a:t> et al., </a:t>
+            </a:r>
+            <a:r>
+              <a:rPr lang="en-US" sz="2000" dirty="0" smtClean="0">
+                <a:latin typeface="Helvetica" pitchFamily="34" charset="0"/>
+                <a:cs typeface="Helvetica" pitchFamily="34" charset="0"/>
+              </a:rPr>
+              <a:t>2004; </a:t>
+            </a:r>
+            <a:r>
+              <a:rPr lang="en-US" sz="2000" dirty="0">
+                <a:latin typeface="Helvetica" pitchFamily="34" charset="0"/>
+                <a:cs typeface="Helvetica" pitchFamily="34" charset="0"/>
+              </a:rPr>
+              <a:t>Manning </a:t>
+            </a:r>
+            <a:r>
+              <a:rPr lang="en-US" sz="2000" dirty="0" smtClean="0">
+                <a:latin typeface="Helvetica" pitchFamily="34" charset="0"/>
+                <a:cs typeface="Helvetica" pitchFamily="34" charset="0"/>
+              </a:rPr>
+              <a:t>et al., 1998)</a:t>
             </a:r>
             <a:r>
               <a:rPr lang="en-US" sz="3200" dirty="0" smtClean="0">
                 <a:latin typeface="Helvetica" pitchFamily="34" charset="0"/>
                 <a:cs typeface="Helvetica" pitchFamily="34" charset="0"/>
               </a:rPr>
-              <a:t>).</a:t>
-            </a:r>
-            <a:r>
-              <a:rPr lang="en-US" sz="3200" dirty="0">
-                <a:latin typeface="Helvetica" pitchFamily="34" charset="0"/>
-                <a:cs typeface="Helvetica" pitchFamily="34" charset="0"/>
-              </a:rPr>
-              <a:t> </a:t>
-            </a:r>
-            <a:endParaRPr lang="en-US" sz="3200" dirty="0" smtClean="0">
-              <a:latin typeface="Helvetica" pitchFamily="34" charset="0"/>
-              <a:cs typeface="Helvetica" pitchFamily="34" charset="0"/>
-            </a:endParaRPr>
+              <a:t>.</a:t>
+            </a:r>
           </a:p>
           <a:p>
             <a:pPr>
@@ -5247,21 +4963,21 @@
                 <a:latin typeface="Helvetica" pitchFamily="34" charset="0"/>
                 <a:cs typeface="Helvetica" pitchFamily="34" charset="0"/>
               </a:rPr>
-              <a:t>It has been suggested that this practice introduces confounds, such as changes in difficulty, which may be responsible for observed effects on aggressive behavior (Adachi &amp; Willoughby, 2011; </a:t>
-            </a:r>
-            <a:r>
-              <a:rPr lang="en-US" sz="3200" dirty="0" err="1" smtClean="0">
-                <a:latin typeface="Helvetica" pitchFamily="34" charset="0"/>
-                <a:cs typeface="Helvetica" pitchFamily="34" charset="0"/>
-              </a:rPr>
-              <a:t>Przybylski</a:t>
+              <a:t>While greater testosterone exposure would be expected to predict more aggressive behavior, the literature of 2d4d effects on aggressive behavior has been mixed. It has been suggested that 2d4d ratio may only be associated with aggression in response to provocation </a:t>
+            </a:r>
+            <a:r>
+              <a:rPr lang="en-US" sz="2800" dirty="0" smtClean="0">
+                <a:latin typeface="Helvetica" pitchFamily="34" charset="0"/>
+                <a:cs typeface="Helvetica" pitchFamily="34" charset="0"/>
+              </a:rPr>
+              <a:t>(Millet, 2011)</a:t>
             </a:r>
             <a:r>
               <a:rPr lang="en-US" sz="3200" dirty="0" smtClean="0">
                 <a:latin typeface="Helvetica" pitchFamily="34" charset="0"/>
                 <a:cs typeface="Helvetica" pitchFamily="34" charset="0"/>
               </a:rPr>
-              <a:t> et al., 2013).</a:t>
+              <a:t>.</a:t>
             </a:r>
           </a:p>
           <a:p>
@@ -5290,8 +5006,8 @@
         </p:nvSpPr>
         <p:spPr>
           <a:xfrm>
-            <a:off x="457200" y="18612118"/>
-            <a:ext cx="13944600" cy="9720610"/>
+            <a:off x="228600" y="18869412"/>
+            <a:ext cx="14439900" cy="9720610"/>
           </a:xfrm>
           <a:prstGeom prst="rect">
             <a:avLst/>
@@ -5333,7 +5049,7 @@
                 <a:latin typeface="Helvetica" pitchFamily="34" charset="0"/>
                 <a:cs typeface="Helvetica" pitchFamily="34" charset="0"/>
               </a:rPr>
-              <a:t>Participants to date are 308 male undergraduates participating for partial course credit (preregistered final n=450). </a:t>
+              <a:t>Participants to date are 380 male undergraduates participating for partial course credit (preregistered final n=450). </a:t>
             </a:r>
           </a:p>
           <a:p>
@@ -5594,367 +5310,6 @@
           </a:p>
         </p:txBody>
       </p:sp>
-      <p:grpSp>
-        <p:nvGrpSpPr>
-          <p:cNvPr id="44" name="Group 43"/>
-          <p:cNvGrpSpPr/>
-          <p:nvPr/>
-        </p:nvGrpSpPr>
-        <p:grpSpPr>
-          <a:xfrm>
-            <a:off x="-2095499" y="13409385"/>
-            <a:ext cx="15316200" cy="10180260"/>
-            <a:chOff x="15201900" y="13411200"/>
-            <a:chExt cx="15316200" cy="10180260"/>
-          </a:xfrm>
-        </p:grpSpPr>
-        <p:pic>
-          <p:nvPicPr>
-            <p:cNvPr id="1026" name="Picture 2" descr="C:\Dissertation\Analysis_02012014\R2d4d_scatter.png"/>
-            <p:cNvPicPr>
-              <a:picLocks noChangeAspect="1" noChangeArrowheads="1"/>
-            </p:cNvPicPr>
-            <p:nvPr/>
-          </p:nvPicPr>
-          <p:blipFill>
-            <a:blip r:embed="rId5" cstate="print"/>
-            <a:srcRect/>
-            <a:stretch>
-              <a:fillRect/>
-            </a:stretch>
-          </p:blipFill>
-          <p:spPr bwMode="auto">
-            <a:xfrm>
-              <a:off x="15240000" y="13411200"/>
-              <a:ext cx="15240000" cy="8572500"/>
-            </a:xfrm>
-            <a:prstGeom prst="rect">
-              <a:avLst/>
-            </a:prstGeom>
-            <a:noFill/>
-            <a:ln w="76200">
-              <a:solidFill>
-                <a:schemeClr val="tx1"/>
-              </a:solidFill>
-            </a:ln>
-          </p:spPr>
-        </p:pic>
-        <p:sp>
-          <p:nvSpPr>
-            <p:cNvPr id="35" name="TextBox 34"/>
-            <p:cNvSpPr txBox="1"/>
-            <p:nvPr/>
-          </p:nvSpPr>
-          <p:spPr>
-            <a:xfrm>
-              <a:off x="15201900" y="22021800"/>
-              <a:ext cx="15316200" cy="1569660"/>
-            </a:xfrm>
-            <a:prstGeom prst="rect">
-              <a:avLst/>
-            </a:prstGeom>
-            <a:ln/>
-          </p:spPr>
-          <p:style>
-            <a:lnRef idx="1">
-              <a:schemeClr val="accent1"/>
-            </a:lnRef>
-            <a:fillRef idx="2">
-              <a:schemeClr val="accent1"/>
-            </a:fillRef>
-            <a:effectRef idx="1">
-              <a:schemeClr val="accent1"/>
-            </a:effectRef>
-            <a:fontRef idx="minor">
-              <a:schemeClr val="dk1"/>
-            </a:fontRef>
-          </p:style>
-          <p:txBody>
-            <a:bodyPr wrap="square" rtlCol="0">
-              <a:spAutoFit/>
-            </a:bodyPr>
-            <a:lstStyle/>
-            <a:p>
-              <a:r>
-                <a:rPr lang="en-US" sz="3200" i="1" dirty="0" smtClean="0">
-                  <a:latin typeface="Helvetica" pitchFamily="34" charset="0"/>
-                  <a:cs typeface="Helvetica" pitchFamily="34" charset="0"/>
-                </a:rPr>
-                <a:t>Figure 1. </a:t>
-              </a:r>
-              <a:r>
-                <a:rPr lang="en-US" sz="3200" dirty="0" smtClean="0">
-                  <a:latin typeface="Helvetica" pitchFamily="34" charset="0"/>
-                  <a:cs typeface="Helvetica" pitchFamily="34" charset="0"/>
-                </a:rPr>
-                <a:t>Right-hand 2d4d ratio did not influence aggressive behavior, t(155) = 1.36,  </a:t>
-              </a:r>
-              <a:r>
-                <a:rPr lang="en-US" sz="3200" i="1" dirty="0" smtClean="0">
-                  <a:latin typeface="Helvetica" pitchFamily="34" charset="0"/>
-                  <a:cs typeface="Helvetica" pitchFamily="34" charset="0"/>
-                </a:rPr>
-                <a:t>p </a:t>
-              </a:r>
-              <a:r>
-                <a:rPr lang="en-US" sz="3200" dirty="0" smtClean="0">
-                  <a:latin typeface="Helvetica" pitchFamily="34" charset="0"/>
-                  <a:cs typeface="Helvetica" pitchFamily="34" charset="0"/>
-                </a:rPr>
-                <a:t>= .175, </a:t>
-              </a:r>
-              <a:r>
-                <a:rPr lang="en-US" sz="3200" i="1" dirty="0" smtClean="0">
-                  <a:latin typeface="Helvetica" pitchFamily="34" charset="0"/>
-                  <a:cs typeface="Helvetica" pitchFamily="34" charset="0"/>
-                </a:rPr>
-                <a:t>r</a:t>
-              </a:r>
-              <a:r>
-                <a:rPr lang="en-US" sz="3200" dirty="0" smtClean="0">
-                  <a:latin typeface="Helvetica" pitchFamily="34" charset="0"/>
-                  <a:cs typeface="Helvetica" pitchFamily="34" charset="0"/>
-                </a:rPr>
-                <a:t> = .11, 95% CI [-.05, .26], </a:t>
-              </a:r>
-              <a:r>
-                <a:rPr lang="en-US" sz="3200" dirty="0" err="1" smtClean="0">
-                  <a:latin typeface="Helvetica" pitchFamily="34" charset="0"/>
-                  <a:cs typeface="Helvetica" pitchFamily="34" charset="0"/>
-                </a:rPr>
-                <a:t>Bayes</a:t>
-              </a:r>
-              <a:r>
-                <a:rPr lang="en-US" sz="3200" dirty="0" smtClean="0">
-                  <a:latin typeface="Helvetica" pitchFamily="34" charset="0"/>
-                  <a:cs typeface="Helvetica" pitchFamily="34" charset="0"/>
-                </a:rPr>
-                <a:t> Factor = 2.48 : 1 in favor of null.  Higher-order interactions of right 2d4d and game contents were not supported by the data.</a:t>
-              </a:r>
-              <a:endParaRPr lang="en-US" sz="3200" dirty="0">
-                <a:latin typeface="Helvetica" pitchFamily="34" charset="0"/>
-                <a:cs typeface="Helvetica" pitchFamily="34" charset="0"/>
-              </a:endParaRPr>
-            </a:p>
-          </p:txBody>
-        </p:sp>
-      </p:grpSp>
-      <p:grpSp>
-        <p:nvGrpSpPr>
-          <p:cNvPr id="43" name="Group 42"/>
-          <p:cNvGrpSpPr/>
-          <p:nvPr/>
-        </p:nvGrpSpPr>
-        <p:grpSpPr>
-          <a:xfrm>
-            <a:off x="-2133600" y="19659600"/>
-            <a:ext cx="15316201" cy="10142160"/>
-            <a:chOff x="15201899" y="24079200"/>
-            <a:chExt cx="15316201" cy="10142160"/>
-          </a:xfrm>
-        </p:grpSpPr>
-        <p:pic>
-          <p:nvPicPr>
-            <p:cNvPr id="1027" name="Picture 3" descr="C:\Dissertation\Analysis_02012014\L2d4d_scatter.png"/>
-            <p:cNvPicPr>
-              <a:picLocks noChangeAspect="1" noChangeArrowheads="1"/>
-            </p:cNvPicPr>
-            <p:nvPr/>
-          </p:nvPicPr>
-          <p:blipFill>
-            <a:blip r:embed="rId6" cstate="print"/>
-            <a:srcRect/>
-            <a:stretch>
-              <a:fillRect/>
-            </a:stretch>
-          </p:blipFill>
-          <p:spPr bwMode="auto">
-            <a:xfrm>
-              <a:off x="15240000" y="24079200"/>
-              <a:ext cx="15240000" cy="8572500"/>
-            </a:xfrm>
-            <a:prstGeom prst="rect">
-              <a:avLst/>
-            </a:prstGeom>
-            <a:noFill/>
-            <a:ln w="76200">
-              <a:solidFill>
-                <a:schemeClr val="tx1"/>
-              </a:solidFill>
-            </a:ln>
-          </p:spPr>
-        </p:pic>
-        <p:sp>
-          <p:nvSpPr>
-            <p:cNvPr id="36" name="TextBox 35"/>
-            <p:cNvSpPr txBox="1"/>
-            <p:nvPr/>
-          </p:nvSpPr>
-          <p:spPr>
-            <a:xfrm>
-              <a:off x="15201899" y="32651700"/>
-              <a:ext cx="15316201" cy="1569660"/>
-            </a:xfrm>
-            <a:prstGeom prst="rect">
-              <a:avLst/>
-            </a:prstGeom>
-            <a:ln/>
-          </p:spPr>
-          <p:style>
-            <a:lnRef idx="1">
-              <a:schemeClr val="accent1"/>
-            </a:lnRef>
-            <a:fillRef idx="2">
-              <a:schemeClr val="accent1"/>
-            </a:fillRef>
-            <a:effectRef idx="1">
-              <a:schemeClr val="accent1"/>
-            </a:effectRef>
-            <a:fontRef idx="minor">
-              <a:schemeClr val="dk1"/>
-            </a:fontRef>
-          </p:style>
-          <p:txBody>
-            <a:bodyPr wrap="square" rtlCol="0">
-              <a:spAutoFit/>
-            </a:bodyPr>
-            <a:lstStyle/>
-            <a:p>
-              <a:r>
-                <a:rPr lang="en-US" sz="3200" i="1" dirty="0" smtClean="0">
-                  <a:latin typeface="Helvetica" pitchFamily="34" charset="0"/>
-                  <a:cs typeface="Helvetica" pitchFamily="34" charset="0"/>
-                </a:rPr>
-                <a:t>Figure 2. </a:t>
-              </a:r>
-              <a:r>
-                <a:rPr lang="en-US" sz="3200" dirty="0" smtClean="0">
-                  <a:latin typeface="Helvetica" pitchFamily="34" charset="0"/>
-                  <a:cs typeface="Helvetica" pitchFamily="34" charset="0"/>
-                </a:rPr>
-                <a:t>Left-hand 2d4d ratio did not influence aggressive behavior, t(155) = 1.09,  </a:t>
-              </a:r>
-              <a:r>
-                <a:rPr lang="en-US" sz="3200" i="1" dirty="0" smtClean="0">
-                  <a:latin typeface="Helvetica" pitchFamily="34" charset="0"/>
-                  <a:cs typeface="Helvetica" pitchFamily="34" charset="0"/>
-                </a:rPr>
-                <a:t>p </a:t>
-              </a:r>
-              <a:r>
-                <a:rPr lang="en-US" sz="3200" dirty="0" smtClean="0">
-                  <a:latin typeface="Helvetica" pitchFamily="34" charset="0"/>
-                  <a:cs typeface="Helvetica" pitchFamily="34" charset="0"/>
-                </a:rPr>
-                <a:t>= .277, </a:t>
-              </a:r>
-              <a:r>
-                <a:rPr lang="en-US" sz="3200" i="1" dirty="0" smtClean="0">
-                  <a:latin typeface="Helvetica" pitchFamily="34" charset="0"/>
-                  <a:cs typeface="Helvetica" pitchFamily="34" charset="0"/>
-                </a:rPr>
-                <a:t>r</a:t>
-              </a:r>
-              <a:r>
-                <a:rPr lang="en-US" sz="3200" dirty="0" smtClean="0">
-                  <a:latin typeface="Helvetica" pitchFamily="34" charset="0"/>
-                  <a:cs typeface="Helvetica" pitchFamily="34" charset="0"/>
-                </a:rPr>
-                <a:t> = .09, 95% CI [-.07, .24], </a:t>
-              </a:r>
-              <a:r>
-                <a:rPr lang="en-US" sz="3200" dirty="0" err="1" smtClean="0">
-                  <a:latin typeface="Helvetica" pitchFamily="34" charset="0"/>
-                  <a:cs typeface="Helvetica" pitchFamily="34" charset="0"/>
-                </a:rPr>
-                <a:t>Bayes</a:t>
-              </a:r>
-              <a:r>
-                <a:rPr lang="en-US" sz="3200" dirty="0" smtClean="0">
-                  <a:latin typeface="Helvetica" pitchFamily="34" charset="0"/>
-                  <a:cs typeface="Helvetica" pitchFamily="34" charset="0"/>
-                </a:rPr>
-                <a:t> Factor = 3.36 : 1 in favor of null. Higher-order interactions of left 2d4d and game contents were not supported by the data.</a:t>
-              </a:r>
-              <a:endParaRPr lang="en-US" sz="3200" dirty="0">
-                <a:latin typeface="Helvetica" pitchFamily="34" charset="0"/>
-                <a:cs typeface="Helvetica" pitchFamily="34" charset="0"/>
-              </a:endParaRPr>
-            </a:p>
-          </p:txBody>
-        </p:sp>
-      </p:grpSp>
-      <p:sp>
-        <p:nvSpPr>
-          <p:cNvPr id="27" name="TextBox 26"/>
-          <p:cNvSpPr txBox="1"/>
-          <p:nvPr/>
-        </p:nvSpPr>
-        <p:spPr>
-          <a:xfrm>
-            <a:off x="15449550" y="25774877"/>
-            <a:ext cx="12363450" cy="615553"/>
-          </a:xfrm>
-          <a:prstGeom prst="rect">
-            <a:avLst/>
-          </a:prstGeom>
-          <a:ln/>
-        </p:spPr>
-        <p:style>
-          <a:lnRef idx="1">
-            <a:schemeClr val="accent1"/>
-          </a:lnRef>
-          <a:fillRef idx="2">
-            <a:schemeClr val="accent1"/>
-          </a:fillRef>
-          <a:effectRef idx="1">
-            <a:schemeClr val="accent1"/>
-          </a:effectRef>
-          <a:fontRef idx="minor">
-            <a:schemeClr val="dk1"/>
-          </a:fontRef>
-        </p:style>
-        <p:txBody>
-          <a:bodyPr wrap="square" rtlCol="0">
-            <a:spAutoFit/>
-          </a:bodyPr>
-          <a:lstStyle/>
-          <a:p>
-            <a:r>
-              <a:rPr lang="en-US" sz="3400" i="1" dirty="0" smtClean="0">
-                <a:latin typeface="Helvetica" pitchFamily="34" charset="0"/>
-                <a:cs typeface="Helvetica" pitchFamily="34" charset="0"/>
-              </a:rPr>
-              <a:t>Figure 3. </a:t>
-            </a:r>
-            <a:r>
-              <a:rPr lang="en-US" sz="3400" dirty="0" smtClean="0">
-                <a:latin typeface="Helvetica" pitchFamily="34" charset="0"/>
-                <a:cs typeface="Helvetica" pitchFamily="34" charset="0"/>
-              </a:rPr>
-              <a:t>Histogram of </a:t>
-            </a:r>
-            <a:r>
-              <a:rPr lang="en-US" sz="3400" dirty="0" err="1" smtClean="0">
-                <a:latin typeface="Helvetica" pitchFamily="34" charset="0"/>
-                <a:cs typeface="Helvetica" pitchFamily="34" charset="0"/>
-              </a:rPr>
-              <a:t>coldpressor</a:t>
-            </a:r>
-            <a:r>
-              <a:rPr lang="en-US" sz="3400" dirty="0" smtClean="0">
-                <a:latin typeface="Helvetica" pitchFamily="34" charset="0"/>
-                <a:cs typeface="Helvetica" pitchFamily="34" charset="0"/>
-              </a:rPr>
-              <a:t> assignment per condition.</a:t>
-            </a:r>
-            <a:endParaRPr lang="en-US" sz="3400" dirty="0">
-              <a:latin typeface="Helvetica" pitchFamily="34" charset="0"/>
-              <a:cs typeface="Helvetica" pitchFamily="34" charset="0"/>
-            </a:endParaRPr>
-          </a:p>
-        </p:txBody>
-      </p:sp>
       <p:sp>
         <p:nvSpPr>
           <p:cNvPr id="41" name="TextBox 40"/>
@@ -5963,8 +5318,8 @@
         </p:nvSpPr>
         <p:spPr>
           <a:xfrm>
-            <a:off x="15220950" y="12192000"/>
-            <a:ext cx="15316200" cy="3293209"/>
+            <a:off x="15201900" y="12191998"/>
+            <a:ext cx="15316200" cy="22360327"/>
           </a:xfrm>
           <a:prstGeom prst="rect">
             <a:avLst/>
@@ -5980,7 +5335,7 @@
         </p:spPr>
         <p:txBody>
           <a:bodyPr wrap="square" rtlCol="0">
-            <a:spAutoFit/>
+            <a:noAutofit/>
           </a:bodyPr>
           <a:lstStyle/>
           <a:p>
@@ -5994,63 +5349,205 @@
             </a:r>
           </a:p>
           <a:p>
-            <a:pPr lvl="0"/>
+            <a:pPr algn="ctr"/>
+            <a:endParaRPr lang="en-US" sz="4800" b="1" dirty="0">
+              <a:latin typeface="Garamond" pitchFamily="18" charset="0"/>
+              <a:cs typeface="Helvetica" pitchFamily="34" charset="0"/>
+            </a:endParaRPr>
+          </a:p>
+          <a:p>
+            <a:pPr algn="ctr"/>
+            <a:endParaRPr lang="en-US" sz="4800" b="1" dirty="0" smtClean="0">
+              <a:latin typeface="Garamond" pitchFamily="18" charset="0"/>
+              <a:cs typeface="Helvetica" pitchFamily="34" charset="0"/>
+            </a:endParaRPr>
+          </a:p>
+          <a:p>
+            <a:pPr algn="ctr"/>
+            <a:endParaRPr lang="en-US" sz="4800" b="1" dirty="0">
+              <a:latin typeface="Garamond" pitchFamily="18" charset="0"/>
+              <a:cs typeface="Helvetica" pitchFamily="34" charset="0"/>
+            </a:endParaRPr>
+          </a:p>
+          <a:p>
+            <a:pPr algn="ctr"/>
+            <a:endParaRPr lang="en-US" sz="4800" b="1" dirty="0" smtClean="0">
+              <a:latin typeface="Garamond" pitchFamily="18" charset="0"/>
+              <a:cs typeface="Helvetica" pitchFamily="34" charset="0"/>
+            </a:endParaRPr>
+          </a:p>
+          <a:p>
+            <a:pPr algn="ctr"/>
+            <a:endParaRPr lang="en-US" sz="4800" b="1" dirty="0">
+              <a:latin typeface="Garamond" pitchFamily="18" charset="0"/>
+              <a:cs typeface="Helvetica" pitchFamily="34" charset="0"/>
+            </a:endParaRPr>
+          </a:p>
+          <a:p>
+            <a:pPr algn="ctr"/>
+            <a:endParaRPr lang="en-US" sz="4800" b="1" dirty="0" smtClean="0">
+              <a:latin typeface="Garamond" pitchFamily="18" charset="0"/>
+              <a:cs typeface="Helvetica" pitchFamily="34" charset="0"/>
+            </a:endParaRPr>
+          </a:p>
+          <a:p>
+            <a:pPr algn="ctr"/>
+            <a:endParaRPr lang="en-US" sz="4800" b="1" dirty="0">
+              <a:latin typeface="Garamond" pitchFamily="18" charset="0"/>
+              <a:cs typeface="Helvetica" pitchFamily="34" charset="0"/>
+            </a:endParaRPr>
+          </a:p>
+          <a:p>
+            <a:pPr algn="ctr"/>
+            <a:endParaRPr lang="en-US" sz="4800" b="1" dirty="0" smtClean="0">
+              <a:latin typeface="Garamond" pitchFamily="18" charset="0"/>
+              <a:cs typeface="Helvetica" pitchFamily="34" charset="0"/>
+            </a:endParaRPr>
+          </a:p>
+          <a:p>
+            <a:pPr algn="ctr"/>
+            <a:endParaRPr lang="en-US" sz="4800" b="1" dirty="0" smtClean="0">
+              <a:latin typeface="Garamond" pitchFamily="18" charset="0"/>
+              <a:cs typeface="Helvetica" pitchFamily="34" charset="0"/>
+            </a:endParaRPr>
+          </a:p>
+          <a:p>
+            <a:pPr algn="ctr"/>
+            <a:endParaRPr lang="en-US" sz="4800" b="1" dirty="0">
+              <a:latin typeface="Garamond" pitchFamily="18" charset="0"/>
+              <a:cs typeface="Helvetica" pitchFamily="34" charset="0"/>
+            </a:endParaRPr>
+          </a:p>
+          <a:p>
+            <a:pPr marL="91440"/>
             <a:r>
               <a:rPr lang="en-US" sz="3200" dirty="0" smtClean="0">
-                <a:solidFill>
-                  <a:prstClr val="black"/>
-                </a:solidFill>
-                <a:latin typeface="Helvetica" pitchFamily="34" charset="0"/>
-                <a:cs typeface="Helvetica" pitchFamily="34" charset="0"/>
-              </a:rPr>
-              <a:t>Neither right-hand nor left-hand 2d4d ratio predicted provoked aggression. </a:t>
-            </a:r>
-          </a:p>
-          <a:p>
-            <a:pPr marL="457200" lvl="0" indent="-457200">
-              <a:buFont typeface="Arial" panose="020B0604020202020204" pitchFamily="34" charset="0"/>
+                <a:latin typeface="Helvetica" pitchFamily="34" charset="0"/>
+                <a:cs typeface="Helvetica" pitchFamily="34" charset="0"/>
+              </a:rPr>
+              <a:t>Bayes </a:t>
+            </a:r>
+            <a:r>
+              <a:rPr lang="en-US" sz="3200" dirty="0">
+                <a:latin typeface="Helvetica" pitchFamily="34" charset="0"/>
+                <a:cs typeface="Helvetica" pitchFamily="34" charset="0"/>
+              </a:rPr>
+              <a:t>Factors model comparisons favored the null </a:t>
+            </a:r>
+            <a:r>
+              <a:rPr lang="en-US" sz="3200" dirty="0" smtClean="0">
+                <a:latin typeface="Helvetica" pitchFamily="34" charset="0"/>
+                <a:cs typeface="Helvetica" pitchFamily="34" charset="0"/>
+              </a:rPr>
+              <a:t>hypothesis:  </a:t>
+            </a:r>
+            <a:endParaRPr lang="en-US" sz="3200" dirty="0">
+              <a:latin typeface="Helvetica" pitchFamily="34" charset="0"/>
+              <a:cs typeface="Helvetica" pitchFamily="34" charset="0"/>
+            </a:endParaRPr>
+          </a:p>
+          <a:p>
+            <a:pPr marL="91440">
+              <a:buFont typeface="Arial" pitchFamily="34" charset="0"/>
               <a:buChar char="•"/>
             </a:pPr>
             <a:r>
-              <a:rPr lang="en-US" sz="3200" dirty="0" smtClean="0">
-                <a:solidFill>
-                  <a:prstClr val="black"/>
-                </a:solidFill>
-                <a:latin typeface="Helvetica" pitchFamily="34" charset="0"/>
-                <a:cs typeface="Helvetica" pitchFamily="34" charset="0"/>
-              </a:rPr>
-              <a:t>If anything, estimated effect sizes indicated lower 2d4d ratio was associated with </a:t>
-            </a:r>
-            <a:r>
-              <a:rPr lang="en-US" sz="3200" i="1" dirty="0" smtClean="0">
-                <a:solidFill>
-                  <a:prstClr val="black"/>
-                </a:solidFill>
-                <a:latin typeface="Helvetica" pitchFamily="34" charset="0"/>
-                <a:cs typeface="Helvetica" pitchFamily="34" charset="0"/>
-              </a:rPr>
-              <a:t>less</a:t>
-            </a:r>
-            <a:r>
-              <a:rPr lang="en-US" sz="3200" dirty="0" smtClean="0">
-                <a:solidFill>
-                  <a:prstClr val="black"/>
-                </a:solidFill>
-                <a:latin typeface="Helvetica" pitchFamily="34" charset="0"/>
-                <a:cs typeface="Helvetica" pitchFamily="34" charset="0"/>
-              </a:rPr>
-              <a:t> aggressive behavior (</a:t>
-            </a:r>
-            <a:r>
-              <a:rPr lang="en-US" sz="3200" i="1" dirty="0" smtClean="0">
-                <a:solidFill>
-                  <a:prstClr val="black"/>
-                </a:solidFill>
-                <a:latin typeface="Helvetica" pitchFamily="34" charset="0"/>
-                <a:cs typeface="Helvetica" pitchFamily="34" charset="0"/>
-              </a:rPr>
-              <a:t>Figures 1 &amp; 2).</a:t>
-            </a:r>
+              <a:rPr lang="en-US" sz="3200" dirty="0">
+                <a:latin typeface="Helvetica" pitchFamily="34" charset="0"/>
+                <a:cs typeface="Helvetica" pitchFamily="34" charset="0"/>
+              </a:rPr>
+              <a:t> 3.18 : 1 against a violence-only model</a:t>
+            </a:r>
+          </a:p>
+          <a:p>
+            <a:pPr marL="91440">
+              <a:buFont typeface="Arial" pitchFamily="34" charset="0"/>
+              <a:buChar char="•"/>
+            </a:pPr>
+            <a:r>
+              <a:rPr lang="en-US" sz="3200" dirty="0">
+                <a:latin typeface="Helvetica" pitchFamily="34" charset="0"/>
+                <a:cs typeface="Helvetica" pitchFamily="34" charset="0"/>
+              </a:rPr>
+              <a:t> 4.16 : 1 against a difficulty-only model</a:t>
+            </a:r>
+          </a:p>
+          <a:p>
+            <a:pPr marL="91440">
+              <a:buFont typeface="Arial" pitchFamily="34" charset="0"/>
+              <a:buChar char="•"/>
+            </a:pPr>
+            <a:r>
+              <a:rPr lang="en-US" sz="3200" dirty="0">
+                <a:latin typeface="Helvetica" pitchFamily="34" charset="0"/>
+                <a:cs typeface="Helvetica" pitchFamily="34" charset="0"/>
+              </a:rPr>
+              <a:t> 14.1 : 1 against additive effects of violence and difficulty, and</a:t>
+            </a:r>
+          </a:p>
+          <a:p>
+            <a:pPr marL="91440">
+              <a:buFont typeface="Arial" pitchFamily="34" charset="0"/>
+              <a:buChar char="•"/>
+            </a:pPr>
+            <a:r>
+              <a:rPr lang="en-US" sz="3200" dirty="0">
+                <a:latin typeface="Helvetica" pitchFamily="34" charset="0"/>
+                <a:cs typeface="Helvetica" pitchFamily="34" charset="0"/>
+              </a:rPr>
+              <a:t> 4.16 : 1 against the full model with interactive effects of violence and difficulty.  </a:t>
+            </a:r>
+          </a:p>
+          <a:p>
+            <a:endParaRPr lang="en-US" sz="4800" b="1" dirty="0" smtClean="0">
+              <a:latin typeface="Garamond" pitchFamily="18" charset="0"/>
+              <a:cs typeface="Helvetica" pitchFamily="34" charset="0"/>
+            </a:endParaRPr>
+          </a:p>
+          <a:p>
+            <a:endParaRPr lang="en-US" sz="4800" b="1" dirty="0">
+              <a:latin typeface="Garamond" pitchFamily="18" charset="0"/>
+              <a:cs typeface="Helvetica" pitchFamily="34" charset="0"/>
+            </a:endParaRPr>
+          </a:p>
+          <a:p>
+            <a:endParaRPr lang="en-US" sz="4800" b="1" dirty="0" smtClean="0">
+              <a:latin typeface="Garamond" pitchFamily="18" charset="0"/>
+              <a:cs typeface="Helvetica" pitchFamily="34" charset="0"/>
+            </a:endParaRPr>
+          </a:p>
+          <a:p>
+            <a:endParaRPr lang="en-US" sz="4800" b="1" dirty="0">
+              <a:latin typeface="Garamond" pitchFamily="18" charset="0"/>
+              <a:cs typeface="Helvetica" pitchFamily="34" charset="0"/>
+            </a:endParaRPr>
+          </a:p>
+          <a:p>
+            <a:endParaRPr lang="en-US" sz="4800" b="1" dirty="0" smtClean="0">
+              <a:latin typeface="Garamond" pitchFamily="18" charset="0"/>
+              <a:cs typeface="Helvetica" pitchFamily="34" charset="0"/>
+            </a:endParaRPr>
+          </a:p>
+          <a:p>
+            <a:endParaRPr lang="en-US" sz="4800" b="1" dirty="0">
+              <a:latin typeface="Garamond" pitchFamily="18" charset="0"/>
+              <a:cs typeface="Helvetica" pitchFamily="34" charset="0"/>
+            </a:endParaRPr>
+          </a:p>
+          <a:p>
+            <a:endParaRPr lang="en-US" sz="4800" b="1" dirty="0" smtClean="0">
+              <a:latin typeface="Garamond" pitchFamily="18" charset="0"/>
+              <a:cs typeface="Helvetica" pitchFamily="34" charset="0"/>
+            </a:endParaRPr>
+          </a:p>
+          <a:p>
+            <a:endParaRPr lang="en-US" sz="4800" b="1" dirty="0" smtClean="0">
+              <a:latin typeface="Garamond" pitchFamily="18" charset="0"/>
+              <a:cs typeface="Helvetica" pitchFamily="34" charset="0"/>
+            </a:endParaRPr>
+          </a:p>
+          <a:p>
+            <a:pPr lvl="0"/>
             <a:endParaRPr lang="en-US" sz="3200" dirty="0" smtClean="0">
               <a:solidFill>
                 <a:prstClr val="black"/>
@@ -6060,19 +5557,112 @@
             </a:endParaRPr>
           </a:p>
           <a:p>
+            <a:pPr lvl="0"/>
+            <a:endParaRPr lang="en-US" sz="3200" dirty="0">
+              <a:solidFill>
+                <a:prstClr val="black"/>
+              </a:solidFill>
+              <a:latin typeface="Helvetica" pitchFamily="34" charset="0"/>
+              <a:cs typeface="Helvetica" pitchFamily="34" charset="0"/>
+            </a:endParaRPr>
+          </a:p>
+          <a:p>
+            <a:pPr lvl="0"/>
+            <a:endParaRPr lang="en-US" sz="3200" dirty="0" smtClean="0">
+              <a:solidFill>
+                <a:prstClr val="black"/>
+              </a:solidFill>
+              <a:latin typeface="Helvetica" pitchFamily="34" charset="0"/>
+              <a:cs typeface="Helvetica" pitchFamily="34" charset="0"/>
+            </a:endParaRPr>
+          </a:p>
+          <a:p>
+            <a:pPr lvl="0"/>
+            <a:endParaRPr lang="en-US" sz="3200" dirty="0" smtClean="0">
+              <a:solidFill>
+                <a:prstClr val="black"/>
+              </a:solidFill>
+              <a:latin typeface="Helvetica" pitchFamily="34" charset="0"/>
+              <a:cs typeface="Helvetica" pitchFamily="34" charset="0"/>
+            </a:endParaRPr>
+          </a:p>
+          <a:p>
+            <a:pPr lvl="0"/>
+            <a:endParaRPr lang="en-US" sz="3200" dirty="0">
+              <a:solidFill>
+                <a:prstClr val="black"/>
+              </a:solidFill>
+              <a:latin typeface="Helvetica" pitchFamily="34" charset="0"/>
+              <a:cs typeface="Helvetica" pitchFamily="34" charset="0"/>
+            </a:endParaRPr>
+          </a:p>
+          <a:p>
+            <a:pPr lvl="0"/>
+            <a:endParaRPr lang="en-US" sz="3200" dirty="0">
+              <a:solidFill>
+                <a:prstClr val="black"/>
+              </a:solidFill>
+              <a:latin typeface="Helvetica" pitchFamily="34" charset="0"/>
+              <a:cs typeface="Helvetica" pitchFamily="34" charset="0"/>
+            </a:endParaRPr>
+          </a:p>
+          <a:p>
+            <a:pPr lvl="0"/>
+            <a:r>
+              <a:rPr lang="en-US" sz="3200" dirty="0" smtClean="0">
+                <a:solidFill>
+                  <a:prstClr val="black"/>
+                </a:solidFill>
+                <a:latin typeface="Helvetica" pitchFamily="34" charset="0"/>
+                <a:cs typeface="Helvetica" pitchFamily="34" charset="0"/>
+              </a:rPr>
+              <a:t>Neither </a:t>
+            </a:r>
+            <a:r>
+              <a:rPr lang="en-US" sz="3200" dirty="0">
+                <a:solidFill>
+                  <a:prstClr val="black"/>
+                </a:solidFill>
+                <a:latin typeface="Helvetica" pitchFamily="34" charset="0"/>
+                <a:cs typeface="Helvetica" pitchFamily="34" charset="0"/>
+              </a:rPr>
+              <a:t>right-hand nor left-hand 2d4d ratio predicted provoked aggression. </a:t>
+            </a:r>
+          </a:p>
+          <a:p>
             <a:pPr marL="457200" lvl="0" indent="-457200">
               <a:buFont typeface="Arial" panose="020B0604020202020204" pitchFamily="34" charset="0"/>
               <a:buChar char="•"/>
             </a:pPr>
             <a:r>
-              <a:rPr lang="en-US" sz="3200" dirty="0" err="1" smtClean="0">
+              <a:rPr lang="en-US" sz="3200" dirty="0">
                 <a:solidFill>
                   <a:prstClr val="black"/>
                 </a:solidFill>
                 <a:latin typeface="Helvetica" pitchFamily="34" charset="0"/>
                 <a:cs typeface="Helvetica" pitchFamily="34" charset="0"/>
               </a:rPr>
-              <a:t>Bayes</a:t>
+              <a:t>If anything, estimated effect sizes indicated lower 2d4d ratio was associated with </a:t>
+            </a:r>
+            <a:r>
+              <a:rPr lang="en-US" sz="3200" i="1" dirty="0">
+                <a:solidFill>
+                  <a:prstClr val="black"/>
+                </a:solidFill>
+                <a:latin typeface="Helvetica" pitchFamily="34" charset="0"/>
+                <a:cs typeface="Helvetica" pitchFamily="34" charset="0"/>
+              </a:rPr>
+              <a:t>less</a:t>
+            </a:r>
+            <a:r>
+              <a:rPr lang="en-US" sz="3200" dirty="0">
+                <a:solidFill>
+                  <a:prstClr val="black"/>
+                </a:solidFill>
+                <a:latin typeface="Helvetica" pitchFamily="34" charset="0"/>
+                <a:cs typeface="Helvetica" pitchFamily="34" charset="0"/>
+              </a:rPr>
+              <a:t> aggressive </a:t>
             </a:r>
             <a:r>
               <a:rPr lang="en-US" sz="3200" dirty="0" smtClean="0">
@@ -6082,11 +5672,126 @@
                 <a:latin typeface="Helvetica" pitchFamily="34" charset="0"/>
                 <a:cs typeface="Helvetica" pitchFamily="34" charset="0"/>
               </a:rPr>
-              <a:t> Factors gave evidence of 2.4 : 1 and 3.4 : 1 for the null, left and right 2d4d, respectively.</a:t>
-            </a:r>
+              <a:t>behavior.</a:t>
+            </a:r>
+            <a:endParaRPr lang="en-US" sz="3200" dirty="0">
+              <a:solidFill>
+                <a:prstClr val="black"/>
+              </a:solidFill>
+              <a:latin typeface="Helvetica" pitchFamily="34" charset="0"/>
+              <a:cs typeface="Helvetica" pitchFamily="34" charset="0"/>
+            </a:endParaRPr>
+          </a:p>
+          <a:p>
+            <a:pPr marL="457200" lvl="0" indent="-457200">
+              <a:buFont typeface="Arial" panose="020B0604020202020204" pitchFamily="34" charset="0"/>
+              <a:buChar char="•"/>
+            </a:pPr>
+            <a:r>
+              <a:rPr lang="en-US" sz="3200" dirty="0">
+                <a:solidFill>
+                  <a:prstClr val="black"/>
+                </a:solidFill>
+                <a:latin typeface="Helvetica" pitchFamily="34" charset="0"/>
+                <a:cs typeface="Helvetica" pitchFamily="34" charset="0"/>
+              </a:rPr>
+              <a:t>Bayes Factors gave evidence of </a:t>
+            </a:r>
+            <a:r>
+              <a:rPr lang="en-US" sz="3200" dirty="0" smtClean="0">
+                <a:solidFill>
+                  <a:prstClr val="black"/>
+                </a:solidFill>
+                <a:latin typeface="Helvetica" pitchFamily="34" charset="0"/>
+                <a:cs typeface="Helvetica" pitchFamily="34" charset="0"/>
+              </a:rPr>
+              <a:t>6.0 </a:t>
+            </a:r>
+            <a:r>
+              <a:rPr lang="en-US" sz="3200" dirty="0">
+                <a:solidFill>
+                  <a:prstClr val="black"/>
+                </a:solidFill>
+                <a:latin typeface="Helvetica" pitchFamily="34" charset="0"/>
+                <a:cs typeface="Helvetica" pitchFamily="34" charset="0"/>
+              </a:rPr>
+              <a:t>: 1 and </a:t>
+            </a:r>
+            <a:r>
+              <a:rPr lang="en-US" sz="3200" dirty="0" smtClean="0">
+                <a:solidFill>
+                  <a:prstClr val="black"/>
+                </a:solidFill>
+                <a:latin typeface="Helvetica" pitchFamily="34" charset="0"/>
+                <a:cs typeface="Helvetica" pitchFamily="34" charset="0"/>
+              </a:rPr>
+              <a:t>3.2 </a:t>
+            </a:r>
+            <a:r>
+              <a:rPr lang="en-US" sz="3200" dirty="0">
+                <a:solidFill>
+                  <a:prstClr val="black"/>
+                </a:solidFill>
+                <a:latin typeface="Helvetica" pitchFamily="34" charset="0"/>
+                <a:cs typeface="Helvetica" pitchFamily="34" charset="0"/>
+              </a:rPr>
+              <a:t>: 1 for the null, left and right </a:t>
+            </a:r>
+            <a:r>
+              <a:rPr lang="en-US" sz="3200" dirty="0" smtClean="0">
+                <a:solidFill>
+                  <a:prstClr val="black"/>
+                </a:solidFill>
+                <a:latin typeface="Helvetica" pitchFamily="34" charset="0"/>
+                <a:cs typeface="Helvetica" pitchFamily="34" charset="0"/>
+              </a:rPr>
+              <a:t>2d4d</a:t>
+            </a:r>
+            <a:r>
+              <a:rPr lang="en-US" sz="3200" dirty="0" smtClean="0">
+                <a:solidFill>
+                  <a:prstClr val="black"/>
+                </a:solidFill>
+                <a:latin typeface="Helvetica" pitchFamily="34" charset="0"/>
+                <a:cs typeface="Helvetica" pitchFamily="34" charset="0"/>
+              </a:rPr>
+              <a:t>.</a:t>
+            </a:r>
+          </a:p>
+          <a:p>
+            <a:pPr marL="457200" lvl="0" indent="-457200">
+              <a:buFont typeface="Arial" panose="020B0604020202020204" pitchFamily="34" charset="0"/>
+              <a:buChar char="•"/>
+            </a:pPr>
+            <a:r>
+              <a:rPr lang="en-US" sz="3200" dirty="0" smtClean="0">
+                <a:solidFill>
+                  <a:prstClr val="black"/>
+                </a:solidFill>
+                <a:latin typeface="Helvetica" pitchFamily="34" charset="0"/>
+                <a:cs typeface="Helvetica" pitchFamily="34" charset="0"/>
+              </a:rPr>
+              <a:t>Higher-order interactions of 2d4d and game contents were not supported by data.</a:t>
+            </a:r>
+            <a:endParaRPr lang="en-US" sz="3200" b="1" dirty="0">
+              <a:solidFill>
+                <a:prstClr val="black"/>
+              </a:solidFill>
+              <a:latin typeface="Helvetica" pitchFamily="34" charset="0"/>
+              <a:cs typeface="Helvetica" pitchFamily="34" charset="0"/>
+            </a:endParaRPr>
+          </a:p>
+          <a:p>
+            <a:pPr lvl="0"/>
             <a:endParaRPr lang="en-US" sz="3200" b="1" dirty="0">
               <a:latin typeface="Garamond" pitchFamily="18" charset="0"/>
               <a:cs typeface="Helvetica" pitchFamily="34" charset="0"/>
+            </a:endParaRPr>
+          </a:p>
+          <a:p>
+            <a:endParaRPr lang="en-US" sz="3200" dirty="0" smtClean="0">
+              <a:latin typeface="Helvetica" panose="020B0604020202020204" pitchFamily="34" charset="0"/>
+              <a:cs typeface="Helvetica" panose="020B0604020202020204" pitchFamily="34" charset="0"/>
             </a:endParaRPr>
           </a:p>
         </p:txBody>
@@ -6100,7 +5805,7 @@
           <p:nvPr/>
         </p:nvPicPr>
         <p:blipFill>
-          <a:blip r:embed="rId7" cstate="print"/>
+          <a:blip r:embed="rId5" cstate="print"/>
           <a:srcRect/>
           <a:stretch>
             <a:fillRect/>
@@ -6133,8 +5838,8 @@
         </p:nvSpPr>
         <p:spPr>
           <a:xfrm>
-            <a:off x="30203775" y="5181600"/>
-            <a:ext cx="15316200" cy="13634502"/>
+            <a:off x="31122937" y="5181600"/>
+            <a:ext cx="14401800" cy="17681764"/>
           </a:xfrm>
           <a:prstGeom prst="rect">
             <a:avLst/>
@@ -6159,12 +5864,54 @@
           <a:p>
             <a:pPr algn="ctr"/>
             <a:r>
-              <a:rPr lang="en-US" sz="4800" b="1" dirty="0" smtClean="0">
+              <a:rPr lang="en-US" sz="4600" b="1" dirty="0" smtClean="0">
                 <a:latin typeface="Garamond" pitchFamily="18" charset="0"/>
                 <a:cs typeface="Helvetica" pitchFamily="34" charset="0"/>
               </a:rPr>
-              <a:t>Small-Study Effects in Previous Research</a:t>
-            </a:r>
+              <a:t>Small-Study Effects in Previous </a:t>
+            </a:r>
+            <a:r>
+              <a:rPr lang="en-US" sz="4600" b="1" dirty="0" smtClean="0">
+                <a:latin typeface="Garamond" pitchFamily="18" charset="0"/>
+                <a:cs typeface="Helvetica" pitchFamily="34" charset="0"/>
+              </a:rPr>
+              <a:t>Experimental Research</a:t>
+            </a:r>
+          </a:p>
+          <a:p>
+            <a:pPr algn="ctr"/>
+            <a:endParaRPr lang="en-US" sz="4800" b="1" dirty="0">
+              <a:latin typeface="Garamond" pitchFamily="18" charset="0"/>
+              <a:cs typeface="Helvetica" pitchFamily="34" charset="0"/>
+            </a:endParaRPr>
+          </a:p>
+          <a:p>
+            <a:pPr algn="ctr"/>
+            <a:endParaRPr lang="en-US" sz="4800" b="1" dirty="0" smtClean="0">
+              <a:latin typeface="Garamond" pitchFamily="18" charset="0"/>
+              <a:cs typeface="Helvetica" pitchFamily="34" charset="0"/>
+            </a:endParaRPr>
+          </a:p>
+          <a:p>
+            <a:pPr algn="ctr"/>
+            <a:endParaRPr lang="en-US" sz="4800" b="1" dirty="0">
+              <a:latin typeface="Garamond" pitchFamily="18" charset="0"/>
+              <a:cs typeface="Helvetica" pitchFamily="34" charset="0"/>
+            </a:endParaRPr>
+          </a:p>
+          <a:p>
+            <a:pPr algn="ctr"/>
+            <a:endParaRPr lang="en-US" sz="4800" b="1" dirty="0" smtClean="0">
+              <a:latin typeface="Garamond" pitchFamily="18" charset="0"/>
+              <a:cs typeface="Helvetica" pitchFamily="34" charset="0"/>
+            </a:endParaRPr>
+          </a:p>
+          <a:p>
+            <a:pPr algn="ctr"/>
+            <a:endParaRPr lang="en-US" sz="4800" b="1" dirty="0" smtClean="0">
+              <a:latin typeface="Garamond" pitchFamily="18" charset="0"/>
+              <a:cs typeface="Helvetica" pitchFamily="34" charset="0"/>
+            </a:endParaRPr>
           </a:p>
           <a:p>
             <a:pPr algn="ctr"/>
@@ -6245,100 +5992,16 @@
           </a:p>
           <a:p>
             <a:pPr algn="ctr"/>
+            <a:endParaRPr lang="en-US" sz="3200" b="1" dirty="0" smtClean="0">
+              <a:latin typeface="Garamond" pitchFamily="18" charset="0"/>
+              <a:cs typeface="Helvetica" pitchFamily="34" charset="0"/>
+            </a:endParaRPr>
+          </a:p>
+          <a:p>
+            <a:pPr algn="ctr"/>
             <a:endParaRPr lang="en-US" sz="3200" b="1" dirty="0">
               <a:latin typeface="Garamond" pitchFamily="18" charset="0"/>
               <a:cs typeface="Helvetica" pitchFamily="34" charset="0"/>
-            </a:endParaRPr>
-          </a:p>
-          <a:p>
-            <a:pPr marL="457200" indent="-457200">
-              <a:buFont typeface="Arial" panose="020B0604020202020204" pitchFamily="34" charset="0"/>
-              <a:buChar char="•"/>
-            </a:pPr>
-            <a:r>
-              <a:rPr lang="en-US" sz="3200" dirty="0" smtClean="0">
-                <a:latin typeface="Helvetica" panose="020B0604020202020204" pitchFamily="34" charset="0"/>
-                <a:cs typeface="Helvetica" panose="020B0604020202020204" pitchFamily="34" charset="0"/>
-              </a:rPr>
-              <a:t>While previous meta-analytic efforts have been hailed as decisive, inspection of the funnel plots reveals substantial asymmetry in experimental research, suggesting publication or selection bias.</a:t>
-            </a:r>
-          </a:p>
-          <a:p>
-            <a:pPr marL="457200" indent="-457200">
-              <a:buFont typeface="Arial" panose="020B0604020202020204" pitchFamily="34" charset="0"/>
-              <a:buChar char="•"/>
-            </a:pPr>
-            <a:r>
-              <a:rPr lang="en-US" sz="3200" dirty="0" smtClean="0">
-                <a:latin typeface="Helvetica" panose="020B0604020202020204" pitchFamily="34" charset="0"/>
-                <a:cs typeface="Helvetica" panose="020B0604020202020204" pitchFamily="34" charset="0"/>
-              </a:rPr>
-              <a:t>PET-PEESE adjustment for publication bias suggests smaller effects: </a:t>
-            </a:r>
-            <a:r>
-              <a:rPr lang="en-US" sz="3200" i="1" dirty="0" smtClean="0">
-                <a:latin typeface="Helvetica" panose="020B0604020202020204" pitchFamily="34" charset="0"/>
-                <a:cs typeface="Helvetica" panose="020B0604020202020204" pitchFamily="34" charset="0"/>
-              </a:rPr>
-              <a:t>r </a:t>
-            </a:r>
-            <a:r>
-              <a:rPr lang="en-US" sz="3200" dirty="0" smtClean="0">
-                <a:latin typeface="Helvetica" panose="020B0604020202020204" pitchFamily="34" charset="0"/>
-                <a:cs typeface="Helvetica" panose="020B0604020202020204" pitchFamily="34" charset="0"/>
-              </a:rPr>
-              <a:t>= .16, .11, and .00 for aggressive behavior, cognitions, and affect, respectively.</a:t>
-            </a:r>
-          </a:p>
-          <a:p>
-            <a:pPr marL="457200" indent="-457200">
-              <a:buFont typeface="Arial" panose="020B0604020202020204" pitchFamily="34" charset="0"/>
-              <a:buChar char="•"/>
-            </a:pPr>
-            <a:r>
-              <a:rPr lang="en-US" sz="3200" dirty="0" smtClean="0">
-                <a:latin typeface="Helvetica" panose="020B0604020202020204" pitchFamily="34" charset="0"/>
-                <a:cs typeface="Helvetica" panose="020B0604020202020204" pitchFamily="34" charset="0"/>
-              </a:rPr>
-              <a:t>Contrary to findings of Anderson et al. (2010), “best-practices” studies seem to reflect greater bias, not larger true effect.</a:t>
-            </a:r>
-          </a:p>
-          <a:p>
-            <a:pPr marL="457200" indent="-457200">
-              <a:buFont typeface="Arial" panose="020B0604020202020204" pitchFamily="34" charset="0"/>
-              <a:buChar char="•"/>
-            </a:pPr>
-            <a:r>
-              <a:rPr lang="en-US" sz="3200" dirty="0" smtClean="0">
-                <a:latin typeface="Helvetica" panose="020B0604020202020204" pitchFamily="34" charset="0"/>
-                <a:cs typeface="Helvetica" panose="020B0604020202020204" pitchFamily="34" charset="0"/>
-              </a:rPr>
-              <a:t>Previous research has done poor job of controlling for confounds (e.g. matching stimuli on basis of </a:t>
-            </a:r>
-            <a:r>
-              <a:rPr lang="en-US" sz="3200" i="1" dirty="0" smtClean="0">
-                <a:latin typeface="Helvetica" panose="020B0604020202020204" pitchFamily="34" charset="0"/>
-                <a:cs typeface="Helvetica" panose="020B0604020202020204" pitchFamily="34" charset="0"/>
-              </a:rPr>
-              <a:t>p </a:t>
-            </a:r>
-            <a:r>
-              <a:rPr lang="en-US" sz="3200" dirty="0" smtClean="0">
-                <a:latin typeface="Helvetica" panose="020B0604020202020204" pitchFamily="34" charset="0"/>
-                <a:cs typeface="Helvetica" panose="020B0604020202020204" pitchFamily="34" charset="0"/>
-              </a:rPr>
-              <a:t>&gt; .05</a:t>
-            </a:r>
-            <a:r>
-              <a:rPr lang="en-US" sz="3200" i="1" dirty="0" smtClean="0">
-                <a:latin typeface="Helvetica" panose="020B0604020202020204" pitchFamily="34" charset="0"/>
-                <a:cs typeface="Helvetica" panose="020B0604020202020204" pitchFamily="34" charset="0"/>
-              </a:rPr>
-              <a:t>, </a:t>
-            </a:r>
-            <a:endParaRPr lang="en-US" sz="3200" dirty="0">
-              <a:latin typeface="Helvetica" panose="020B0604020202020204" pitchFamily="34" charset="0"/>
-              <a:cs typeface="Helvetica" panose="020B0604020202020204" pitchFamily="34" charset="0"/>
             </a:endParaRPr>
           </a:p>
           <a:p>
@@ -6357,20 +6020,193 @@
           </a:p>
           <a:p>
             <a:pPr algn="ctr"/>
-            <a:endParaRPr lang="en-US" sz="3200" b="1" dirty="0" smtClean="0">
-              <a:latin typeface="Garamond" pitchFamily="18" charset="0"/>
-              <a:cs typeface="Helvetica" pitchFamily="34" charset="0"/>
-            </a:endParaRPr>
-          </a:p>
-          <a:p>
-            <a:pPr algn="ctr"/>
             <a:endParaRPr lang="en-US" sz="3200" b="1" dirty="0">
               <a:latin typeface="Garamond" pitchFamily="18" charset="0"/>
               <a:cs typeface="Helvetica" pitchFamily="34" charset="0"/>
             </a:endParaRPr>
           </a:p>
           <a:p>
-            <a:pPr algn="ctr"/>
+            <a:pPr marL="457200" indent="-457200">
+              <a:spcAft>
+                <a:spcPts val="1000"/>
+              </a:spcAft>
+              <a:buFont typeface="Arial" panose="020B0604020202020204" pitchFamily="34" charset="0"/>
+              <a:buChar char="•"/>
+            </a:pPr>
+            <a:r>
+              <a:rPr lang="en-US" sz="3200" dirty="0" smtClean="0">
+                <a:latin typeface="Helvetica" panose="020B0604020202020204" pitchFamily="34" charset="0"/>
+                <a:cs typeface="Helvetica" panose="020B0604020202020204" pitchFamily="34" charset="0"/>
+              </a:rPr>
+              <a:t>While previous meta-analytic efforts have been hailed as decisive, inspection of the funnel plots reveals substantial asymmetry in experimental research, suggesting publication or selection bias.</a:t>
+            </a:r>
+          </a:p>
+          <a:p>
+            <a:pPr marL="457200" indent="-457200">
+              <a:spcAft>
+                <a:spcPts val="1000"/>
+              </a:spcAft>
+              <a:buFont typeface="Arial" panose="020B0604020202020204" pitchFamily="34" charset="0"/>
+              <a:buChar char="•"/>
+            </a:pPr>
+            <a:r>
+              <a:rPr lang="en-US" sz="3200" dirty="0" smtClean="0">
+                <a:latin typeface="Helvetica" panose="020B0604020202020204" pitchFamily="34" charset="0"/>
+                <a:cs typeface="Helvetica" panose="020B0604020202020204" pitchFamily="34" charset="0"/>
+              </a:rPr>
+              <a:t>PET-PEESE adjustment for publication bias suggests smaller effects: </a:t>
+            </a:r>
+            <a:r>
+              <a:rPr lang="en-US" sz="3200" i="1" dirty="0" smtClean="0">
+                <a:latin typeface="Helvetica" panose="020B0604020202020204" pitchFamily="34" charset="0"/>
+                <a:cs typeface="Helvetica" panose="020B0604020202020204" pitchFamily="34" charset="0"/>
+              </a:rPr>
+              <a:t>r </a:t>
+            </a:r>
+            <a:r>
+              <a:rPr lang="en-US" sz="3200" dirty="0" smtClean="0">
+                <a:latin typeface="Helvetica" panose="020B0604020202020204" pitchFamily="34" charset="0"/>
+                <a:cs typeface="Helvetica" panose="020B0604020202020204" pitchFamily="34" charset="0"/>
+              </a:rPr>
+              <a:t>= </a:t>
+            </a:r>
+            <a:r>
+              <a:rPr lang="en-US" sz="3200" dirty="0" smtClean="0">
+                <a:latin typeface="Helvetica" panose="020B0604020202020204" pitchFamily="34" charset="0"/>
+                <a:cs typeface="Helvetica" panose="020B0604020202020204" pitchFamily="34" charset="0"/>
+              </a:rPr>
+              <a:t>.00, .10, and .16 </a:t>
+            </a:r>
+            <a:r>
+              <a:rPr lang="en-US" sz="3200" dirty="0" smtClean="0">
+                <a:latin typeface="Helvetica" panose="020B0604020202020204" pitchFamily="34" charset="0"/>
+                <a:cs typeface="Helvetica" panose="020B0604020202020204" pitchFamily="34" charset="0"/>
+              </a:rPr>
+              <a:t>for aggressive </a:t>
+            </a:r>
+            <a:r>
+              <a:rPr lang="en-US" sz="3200" dirty="0" smtClean="0">
+                <a:latin typeface="Helvetica" panose="020B0604020202020204" pitchFamily="34" charset="0"/>
+                <a:cs typeface="Helvetica" panose="020B0604020202020204" pitchFamily="34" charset="0"/>
+              </a:rPr>
+              <a:t>affect, cognitions, and affect, </a:t>
+            </a:r>
+            <a:r>
+              <a:rPr lang="en-US" sz="3200" dirty="0" smtClean="0">
+                <a:latin typeface="Helvetica" panose="020B0604020202020204" pitchFamily="34" charset="0"/>
+                <a:cs typeface="Helvetica" panose="020B0604020202020204" pitchFamily="34" charset="0"/>
+              </a:rPr>
+              <a:t>respectively.</a:t>
+            </a:r>
+          </a:p>
+          <a:p>
+            <a:pPr marL="457200" indent="-457200">
+              <a:spcAft>
+                <a:spcPts val="1000"/>
+              </a:spcAft>
+              <a:buFont typeface="Arial" panose="020B0604020202020204" pitchFamily="34" charset="0"/>
+              <a:buChar char="•"/>
+            </a:pPr>
+            <a:r>
+              <a:rPr lang="en-US" sz="3200" dirty="0" smtClean="0">
+                <a:latin typeface="Helvetica" panose="020B0604020202020204" pitchFamily="34" charset="0"/>
+                <a:cs typeface="Helvetica" panose="020B0604020202020204" pitchFamily="34" charset="0"/>
+              </a:rPr>
+              <a:t>Contrary to findings of Anderson et al. (2010), “best-practices” studies seem to reflect greater bias, not larger true effect.</a:t>
+            </a:r>
+          </a:p>
+          <a:p>
+            <a:pPr marL="457200" indent="-457200">
+              <a:spcAft>
+                <a:spcPts val="1000"/>
+              </a:spcAft>
+              <a:buFont typeface="Arial" panose="020B0604020202020204" pitchFamily="34" charset="0"/>
+              <a:buChar char="•"/>
+            </a:pPr>
+            <a:r>
+              <a:rPr lang="en-US" sz="3200" dirty="0" smtClean="0">
+                <a:latin typeface="Helvetica" panose="020B0604020202020204" pitchFamily="34" charset="0"/>
+                <a:cs typeface="Helvetica" panose="020B0604020202020204" pitchFamily="34" charset="0"/>
+              </a:rPr>
+              <a:t>Previous research has done poor job of controlling for confounds (e.g. matching stimuli on basis of </a:t>
+            </a:r>
+            <a:r>
+              <a:rPr lang="en-US" sz="3200" i="1" dirty="0" smtClean="0">
+                <a:latin typeface="Helvetica" panose="020B0604020202020204" pitchFamily="34" charset="0"/>
+                <a:cs typeface="Helvetica" panose="020B0604020202020204" pitchFamily="34" charset="0"/>
+              </a:rPr>
+              <a:t>p </a:t>
+            </a:r>
+            <a:r>
+              <a:rPr lang="en-US" sz="3200" dirty="0" smtClean="0">
+                <a:latin typeface="Helvetica" panose="020B0604020202020204" pitchFamily="34" charset="0"/>
+                <a:cs typeface="Helvetica" panose="020B0604020202020204" pitchFamily="34" charset="0"/>
+              </a:rPr>
+              <a:t>&gt; .05</a:t>
+            </a:r>
+            <a:r>
+              <a:rPr lang="en-US" sz="3200" i="1" dirty="0" smtClean="0">
+                <a:latin typeface="Helvetica" panose="020B0604020202020204" pitchFamily="34" charset="0"/>
+                <a:cs typeface="Helvetica" panose="020B0604020202020204" pitchFamily="34" charset="0"/>
+              </a:rPr>
+              <a:t>, </a:t>
+            </a:r>
+            <a:r>
+              <a:rPr lang="en-US" sz="3200" dirty="0" smtClean="0">
+                <a:latin typeface="Helvetica" panose="020B0604020202020204" pitchFamily="34" charset="0"/>
+                <a:cs typeface="Helvetica" panose="020B0604020202020204" pitchFamily="34" charset="0"/>
+              </a:rPr>
+              <a:t>attempting to partial out covariates measured w/ error</a:t>
+            </a:r>
+            <a:r>
+              <a:rPr lang="en-US" sz="3200" dirty="0" smtClean="0">
+                <a:latin typeface="Helvetica" panose="020B0604020202020204" pitchFamily="34" charset="0"/>
+                <a:cs typeface="Helvetica" panose="020B0604020202020204" pitchFamily="34" charset="0"/>
+              </a:rPr>
+              <a:t>) (see </a:t>
+            </a:r>
+            <a:r>
+              <a:rPr lang="en-US" sz="3200" dirty="0" err="1" smtClean="0">
+                <a:latin typeface="Helvetica" panose="020B0604020202020204" pitchFamily="34" charset="0"/>
+                <a:cs typeface="Helvetica" panose="020B0604020202020204" pitchFamily="34" charset="0"/>
+              </a:rPr>
+              <a:t>Hilgard</a:t>
+            </a:r>
+            <a:r>
+              <a:rPr lang="en-US" sz="3200" dirty="0" smtClean="0">
+                <a:latin typeface="Helvetica" panose="020B0604020202020204" pitchFamily="34" charset="0"/>
+                <a:cs typeface="Helvetica" panose="020B0604020202020204" pitchFamily="34" charset="0"/>
+              </a:rPr>
+              <a:t>, </a:t>
+            </a:r>
+            <a:r>
+              <a:rPr lang="en-US" sz="3200" dirty="0" err="1" smtClean="0">
+                <a:latin typeface="Helvetica" panose="020B0604020202020204" pitchFamily="34" charset="0"/>
+                <a:cs typeface="Helvetica" panose="020B0604020202020204" pitchFamily="34" charset="0"/>
+              </a:rPr>
+              <a:t>Engelhardt</a:t>
+            </a:r>
+            <a:r>
+              <a:rPr lang="en-US" sz="3200" dirty="0" smtClean="0">
+                <a:latin typeface="Helvetica" panose="020B0604020202020204" pitchFamily="34" charset="0"/>
+                <a:cs typeface="Helvetica" panose="020B0604020202020204" pitchFamily="34" charset="0"/>
+              </a:rPr>
+              <a:t>, and </a:t>
+            </a:r>
+            <a:r>
+              <a:rPr lang="en-US" sz="3200" dirty="0" err="1" smtClean="0">
+                <a:latin typeface="Helvetica" panose="020B0604020202020204" pitchFamily="34" charset="0"/>
+                <a:cs typeface="Helvetica" panose="020B0604020202020204" pitchFamily="34" charset="0"/>
+              </a:rPr>
+              <a:t>Bartholow</a:t>
+            </a:r>
+            <a:r>
+              <a:rPr lang="en-US" sz="3200" dirty="0" smtClean="0">
+                <a:latin typeface="Helvetica" panose="020B0604020202020204" pitchFamily="34" charset="0"/>
+                <a:cs typeface="Helvetica" panose="020B0604020202020204" pitchFamily="34" charset="0"/>
+              </a:rPr>
+              <a:t>, submitted.)</a:t>
+            </a:r>
             <a:endParaRPr lang="en-US" sz="3200" b="1" dirty="0">
               <a:latin typeface="Garamond" pitchFamily="18" charset="0"/>
               <a:cs typeface="Helvetica" pitchFamily="34" charset="0"/>
@@ -6380,14 +6216,14 @@
       </p:sp>
       <p:pic>
         <p:nvPicPr>
-          <p:cNvPr id="3" name="Picture 2" descr="C:\Users\Joe\Documents\GitHub\Craig_meta\petpeese_plotdump\AggAff_Exp_1.png"/>
+          <p:cNvPr id="17" name="Picture 6" descr="C:\Users\Joe\Documents\GitHub\vg-dissertation\2x2_histograms.png"/>
           <p:cNvPicPr>
             <a:picLocks noChangeAspect="1" noChangeArrowheads="1"/>
           </p:cNvPicPr>
           <p:nvPr/>
         </p:nvPicPr>
         <p:blipFill>
-          <a:blip r:embed="rId8">
+          <a:blip r:embed="rId6">
             <a:extLst>
               <a:ext uri="{28A0092B-C50C-407E-A947-70E740481C1C}">
                 <a14:useLocalDpi xmlns:a14="http://schemas.microsoft.com/office/drawing/2010/main" val="0"/>
@@ -6401,8 +6237,224 @@
         </p:blipFill>
         <p:spPr bwMode="auto">
           <a:xfrm>
-            <a:off x="30413325" y="6400800"/>
-            <a:ext cx="6219825" cy="6219825"/>
+            <a:off x="15354300" y="13063538"/>
+            <a:ext cx="9153822" cy="6102548"/>
+          </a:xfrm>
+          <a:prstGeom prst="rect">
+            <a:avLst/>
+          </a:prstGeom>
+          <a:noFill/>
+          <a:extLst>
+            <a:ext uri="{909E8E84-426E-40DD-AFC4-6F175D3DCCD1}">
+              <a14:hiddenFill xmlns:a14="http://schemas.microsoft.com/office/drawing/2010/main">
+                <a:solidFill>
+                  <a:srgbClr val="FFFFFF"/>
+                </a:solidFill>
+              </a14:hiddenFill>
+            </a:ext>
+          </a:extLst>
+        </p:spPr>
+      </p:pic>
+      <p:sp>
+        <p:nvSpPr>
+          <p:cNvPr id="20" name="TextBox 19"/>
+          <p:cNvSpPr txBox="1"/>
+          <p:nvPr/>
+        </p:nvSpPr>
+        <p:spPr>
+          <a:xfrm>
+            <a:off x="24307800" y="13360212"/>
+            <a:ext cx="6105525" cy="5509200"/>
+          </a:xfrm>
+          <a:prstGeom prst="rect">
+            <a:avLst/>
+          </a:prstGeom>
+          <a:noFill/>
+        </p:spPr>
+        <p:txBody>
+          <a:bodyPr wrap="square" rtlCol="0">
+            <a:spAutoFit/>
+          </a:bodyPr>
+          <a:lstStyle/>
+          <a:p>
+            <a:pPr algn="ctr"/>
+            <a:r>
+              <a:rPr lang="en-US" sz="3200" b="1" dirty="0" smtClean="0">
+                <a:latin typeface="Helvetica" panose="020B0604020202020204" pitchFamily="34" charset="0"/>
+                <a:cs typeface="Helvetica" panose="020B0604020202020204" pitchFamily="34" charset="0"/>
+              </a:rPr>
+              <a:t>2 Game X 2 Difficulty ANOVA</a:t>
+            </a:r>
+          </a:p>
+          <a:p>
+            <a:r>
+              <a:rPr lang="en-US" sz="3200" dirty="0" smtClean="0">
+                <a:latin typeface="Helvetica" panose="020B0604020202020204" pitchFamily="34" charset="0"/>
+                <a:cs typeface="Helvetica" panose="020B0604020202020204" pitchFamily="34" charset="0"/>
+              </a:rPr>
+              <a:t>Violence: t(249) = 2.36,</a:t>
+            </a:r>
+          </a:p>
+          <a:p>
+            <a:pPr indent="-457200"/>
+            <a:r>
+              <a:rPr lang="en-US" sz="3200" dirty="0" smtClean="0">
+                <a:latin typeface="Helvetica" panose="020B0604020202020204" pitchFamily="34" charset="0"/>
+                <a:cs typeface="Helvetica" panose="020B0604020202020204" pitchFamily="34" charset="0"/>
+              </a:rPr>
+              <a:t>            </a:t>
+            </a:r>
+            <a:r>
+              <a:rPr lang="en-US" sz="3200" i="1" dirty="0" smtClean="0">
+                <a:latin typeface="Helvetica" panose="020B0604020202020204" pitchFamily="34" charset="0"/>
+                <a:cs typeface="Helvetica" panose="020B0604020202020204" pitchFamily="34" charset="0"/>
+              </a:rPr>
+              <a:t>r</a:t>
+            </a:r>
+            <a:r>
+              <a:rPr lang="en-US" sz="3200" dirty="0" smtClean="0">
+                <a:latin typeface="Helvetica" panose="020B0604020202020204" pitchFamily="34" charset="0"/>
+                <a:cs typeface="Helvetica" panose="020B0604020202020204" pitchFamily="34" charset="0"/>
+              </a:rPr>
+              <a:t> = .15 (.02, .27)</a:t>
+            </a:r>
+          </a:p>
+          <a:p>
+            <a:pPr indent="-457200"/>
+            <a:r>
+              <a:rPr lang="en-US" sz="3200" dirty="0" smtClean="0">
+                <a:latin typeface="Helvetica" panose="020B0604020202020204" pitchFamily="34" charset="0"/>
+                <a:cs typeface="Helvetica" panose="020B0604020202020204" pitchFamily="34" charset="0"/>
+              </a:rPr>
+              <a:t>Difficulty: t(249) = 2.56,</a:t>
+            </a:r>
+          </a:p>
+          <a:p>
+            <a:pPr indent="-457200"/>
+            <a:r>
+              <a:rPr lang="en-US" sz="3200" i="1" dirty="0" smtClean="0">
+                <a:latin typeface="Helvetica" panose="020B0604020202020204" pitchFamily="34" charset="0"/>
+                <a:cs typeface="Helvetica" panose="020B0604020202020204" pitchFamily="34" charset="0"/>
+              </a:rPr>
+              <a:t>            r</a:t>
+            </a:r>
+            <a:r>
+              <a:rPr lang="en-US" sz="3200" dirty="0" smtClean="0">
+                <a:latin typeface="Helvetica" panose="020B0604020202020204" pitchFamily="34" charset="0"/>
+                <a:cs typeface="Helvetica" panose="020B0604020202020204" pitchFamily="34" charset="0"/>
+              </a:rPr>
+              <a:t>  = .16 (.04, .28)</a:t>
+            </a:r>
+          </a:p>
+          <a:p>
+            <a:pPr indent="-457200"/>
+            <a:r>
+              <a:rPr lang="en-US" sz="3200" dirty="0" smtClean="0">
+                <a:latin typeface="Helvetica" panose="020B0604020202020204" pitchFamily="34" charset="0"/>
+                <a:cs typeface="Helvetica" panose="020B0604020202020204" pitchFamily="34" charset="0"/>
+              </a:rPr>
+              <a:t>Interaction: t(249) = -2.48,</a:t>
+            </a:r>
+          </a:p>
+          <a:p>
+            <a:pPr indent="-457200"/>
+            <a:r>
+              <a:rPr lang="en-US" sz="3200" i="1" dirty="0" smtClean="0">
+                <a:latin typeface="Helvetica" panose="020B0604020202020204" pitchFamily="34" charset="0"/>
+                <a:cs typeface="Helvetica" panose="020B0604020202020204" pitchFamily="34" charset="0"/>
+              </a:rPr>
+              <a:t>            r  </a:t>
+            </a:r>
+            <a:r>
+              <a:rPr lang="en-US" sz="3200" dirty="0" smtClean="0">
+                <a:latin typeface="Helvetica" panose="020B0604020202020204" pitchFamily="34" charset="0"/>
+                <a:cs typeface="Helvetica" panose="020B0604020202020204" pitchFamily="34" charset="0"/>
+              </a:rPr>
+              <a:t>= -.16 (-.27, -.03)</a:t>
+            </a:r>
+          </a:p>
+          <a:p>
+            <a:pPr indent="-457200"/>
+            <a:endParaRPr lang="en-US" sz="3200" i="1" dirty="0" smtClean="0">
+              <a:latin typeface="Helvetica" panose="020B0604020202020204" pitchFamily="34" charset="0"/>
+              <a:cs typeface="Helvetica" panose="020B0604020202020204" pitchFamily="34" charset="0"/>
+            </a:endParaRPr>
+          </a:p>
+          <a:p>
+            <a:pPr indent="-457200"/>
+            <a:r>
+              <a:rPr lang="en-US" sz="3200" dirty="0" smtClean="0">
+                <a:latin typeface="Helvetica" panose="020B0604020202020204" pitchFamily="34" charset="0"/>
+                <a:cs typeface="Helvetica" panose="020B0604020202020204" pitchFamily="34" charset="0"/>
+              </a:rPr>
+              <a:t>Without the interaction term, </a:t>
+            </a:r>
+          </a:p>
+          <a:p>
+            <a:pPr indent="-457200"/>
+            <a:r>
+              <a:rPr lang="en-US" sz="3200" dirty="0">
+                <a:latin typeface="Helvetica" panose="020B0604020202020204" pitchFamily="34" charset="0"/>
+                <a:cs typeface="Helvetica" panose="020B0604020202020204" pitchFamily="34" charset="0"/>
+              </a:rPr>
+              <a:t>m</a:t>
+            </a:r>
+            <a:r>
+              <a:rPr lang="en-US" sz="3200" dirty="0" smtClean="0">
+                <a:latin typeface="Helvetica" panose="020B0604020202020204" pitchFamily="34" charset="0"/>
+                <a:cs typeface="Helvetica" panose="020B0604020202020204" pitchFamily="34" charset="0"/>
+              </a:rPr>
+              <a:t>ain effects shrink dramatically,</a:t>
+            </a:r>
+          </a:p>
+          <a:p>
+            <a:pPr indent="-457200"/>
+            <a:r>
+              <a:rPr lang="en-US" sz="3200" i="1" dirty="0" smtClean="0">
+                <a:latin typeface="Helvetica" panose="020B0604020202020204" pitchFamily="34" charset="0"/>
+                <a:cs typeface="Helvetica" panose="020B0604020202020204" pitchFamily="34" charset="0"/>
+              </a:rPr>
+              <a:t>r </a:t>
+            </a:r>
+            <a:r>
+              <a:rPr lang="en-US" sz="3200" dirty="0" smtClean="0">
+                <a:latin typeface="Helvetica" panose="020B0604020202020204" pitchFamily="34" charset="0"/>
+                <a:cs typeface="Helvetica" panose="020B0604020202020204" pitchFamily="34" charset="0"/>
+              </a:rPr>
+              <a:t>= .05 (-.07, .17), .07 (-.05, .19)</a:t>
+            </a:r>
+            <a:endParaRPr lang="en-US" sz="3200" i="1" dirty="0">
+              <a:latin typeface="Helvetica" panose="020B0604020202020204" pitchFamily="34" charset="0"/>
+              <a:cs typeface="Helvetica" panose="020B0604020202020204" pitchFamily="34" charset="0"/>
+            </a:endParaRPr>
+          </a:p>
+        </p:txBody>
+      </p:sp>
+      <p:pic>
+        <p:nvPicPr>
+          <p:cNvPr id="21" name="Picture 2" descr="C:\Users\Joe\Documents\GitHub\vg-dissertation\r2d4d_x_violence.png"/>
+          <p:cNvPicPr>
+            <a:picLocks noChangeAspect="1" noChangeArrowheads="1"/>
+          </p:cNvPicPr>
+          <p:nvPr/>
+        </p:nvPicPr>
+        <p:blipFill>
+          <a:blip r:embed="rId7" cstate="print">
+            <a:extLst>
+              <a:ext uri="{28A0092B-C50C-407E-A947-70E740481C1C}">
+                <a14:useLocalDpi xmlns:a14="http://schemas.microsoft.com/office/drawing/2010/main" val="0"/>
+              </a:ext>
+            </a:extLst>
+          </a:blip>
+          <a:srcRect/>
+          <a:stretch>
+            <a:fillRect/>
+          </a:stretch>
+        </p:blipFill>
+        <p:spPr bwMode="auto">
+          <a:xfrm>
+            <a:off x="15415382" y="23472423"/>
+            <a:ext cx="7543800" cy="5388429"/>
           </a:xfrm>
           <a:prstGeom prst="rect">
             <a:avLst/>
@@ -6421,7 +6473,284 @@
       </p:pic>
       <p:pic>
         <p:nvPicPr>
-          <p:cNvPr id="15" name="Picture 3" descr="C:\Users\Joe\Documents\GitHub\Craig_meta\petpeese_plotdump\AggBeh_Exp_1.png"/>
+          <p:cNvPr id="23" name="Picture 4" descr="C:\Users\Joe\Documents\GitHub\vg-dissertation\l2d4d_x_2x2.png"/>
+          <p:cNvPicPr>
+            <a:picLocks noChangeAspect="1" noChangeArrowheads="1"/>
+          </p:cNvPicPr>
+          <p:nvPr/>
+        </p:nvPicPr>
+        <p:blipFill>
+          <a:blip r:embed="rId8" cstate="print">
+            <a:extLst>
+              <a:ext uri="{28A0092B-C50C-407E-A947-70E740481C1C}">
+                <a14:useLocalDpi xmlns:a14="http://schemas.microsoft.com/office/drawing/2010/main" val="0"/>
+              </a:ext>
+            </a:extLst>
+          </a:blip>
+          <a:srcRect/>
+          <a:stretch>
+            <a:fillRect/>
+          </a:stretch>
+        </p:blipFill>
+        <p:spPr bwMode="auto">
+          <a:xfrm>
+            <a:off x="22760818" y="23472422"/>
+            <a:ext cx="7543800" cy="5388429"/>
+          </a:xfrm>
+          <a:prstGeom prst="rect">
+            <a:avLst/>
+          </a:prstGeom>
+          <a:noFill/>
+          <a:extLst>
+            <a:ext uri="{909E8E84-426E-40DD-AFC4-6F175D3DCCD1}">
+              <a14:hiddenFill xmlns:a14="http://schemas.microsoft.com/office/drawing/2010/main">
+                <a:solidFill>
+                  <a:srgbClr val="FFFFFF"/>
+                </a:solidFill>
+              </a14:hiddenFill>
+            </a:ext>
+          </a:extLst>
+        </p:spPr>
+      </p:pic>
+      <p:sp>
+        <p:nvSpPr>
+          <p:cNvPr id="27" name="TextBox 26"/>
+          <p:cNvSpPr txBox="1"/>
+          <p:nvPr/>
+        </p:nvSpPr>
+        <p:spPr>
+          <a:xfrm>
+            <a:off x="15552664" y="19156916"/>
+            <a:ext cx="9593336" cy="615553"/>
+          </a:xfrm>
+          <a:prstGeom prst="rect">
+            <a:avLst/>
+          </a:prstGeom>
+          <a:ln/>
+        </p:spPr>
+        <p:style>
+          <a:lnRef idx="1">
+            <a:schemeClr val="accent1"/>
+          </a:lnRef>
+          <a:fillRef idx="2">
+            <a:schemeClr val="accent1"/>
+          </a:fillRef>
+          <a:effectRef idx="1">
+            <a:schemeClr val="accent1"/>
+          </a:effectRef>
+          <a:fontRef idx="minor">
+            <a:schemeClr val="dk1"/>
+          </a:fontRef>
+        </p:style>
+        <p:txBody>
+          <a:bodyPr wrap="square" rtlCol="0">
+            <a:spAutoFit/>
+          </a:bodyPr>
+          <a:lstStyle/>
+          <a:p>
+            <a:r>
+              <a:rPr lang="en-US" sz="3400" i="1" dirty="0" smtClean="0">
+                <a:latin typeface="Helvetica" pitchFamily="34" charset="0"/>
+                <a:cs typeface="Helvetica" pitchFamily="34" charset="0"/>
+              </a:rPr>
+              <a:t>Figure </a:t>
+            </a:r>
+            <a:r>
+              <a:rPr lang="en-US" sz="3400" i="1" dirty="0" smtClean="0">
+                <a:latin typeface="Helvetica" pitchFamily="34" charset="0"/>
+                <a:cs typeface="Helvetica" pitchFamily="34" charset="0"/>
+              </a:rPr>
+              <a:t>1. </a:t>
+            </a:r>
+            <a:r>
+              <a:rPr lang="en-US" sz="3400" dirty="0" smtClean="0">
+                <a:latin typeface="Helvetica" pitchFamily="34" charset="0"/>
+                <a:cs typeface="Helvetica" pitchFamily="34" charset="0"/>
+              </a:rPr>
+              <a:t>Histogram of </a:t>
+            </a:r>
+            <a:r>
+              <a:rPr lang="en-US" sz="3400" dirty="0" smtClean="0">
+                <a:latin typeface="Helvetica" pitchFamily="34" charset="0"/>
+                <a:cs typeface="Helvetica" pitchFamily="34" charset="0"/>
+              </a:rPr>
+              <a:t>aggression per </a:t>
+            </a:r>
+            <a:r>
+              <a:rPr lang="en-US" sz="3400" dirty="0" smtClean="0">
+                <a:latin typeface="Helvetica" pitchFamily="34" charset="0"/>
+                <a:cs typeface="Helvetica" pitchFamily="34" charset="0"/>
+              </a:rPr>
+              <a:t>condition.</a:t>
+            </a:r>
+            <a:endParaRPr lang="en-US" sz="3400" dirty="0">
+              <a:latin typeface="Helvetica" pitchFamily="34" charset="0"/>
+              <a:cs typeface="Helvetica" pitchFamily="34" charset="0"/>
+            </a:endParaRPr>
+          </a:p>
+        </p:txBody>
+      </p:sp>
+      <p:sp>
+        <p:nvSpPr>
+          <p:cNvPr id="35" name="TextBox 34"/>
+          <p:cNvSpPr txBox="1"/>
+          <p:nvPr/>
+        </p:nvSpPr>
+        <p:spPr>
+          <a:xfrm>
+            <a:off x="17522775" y="29123343"/>
+            <a:ext cx="10674451" cy="1569660"/>
+          </a:xfrm>
+          <a:prstGeom prst="rect">
+            <a:avLst/>
+          </a:prstGeom>
+          <a:ln/>
+        </p:spPr>
+        <p:style>
+          <a:lnRef idx="1">
+            <a:schemeClr val="accent1"/>
+          </a:lnRef>
+          <a:fillRef idx="2">
+            <a:schemeClr val="accent1"/>
+          </a:fillRef>
+          <a:effectRef idx="1">
+            <a:schemeClr val="accent1"/>
+          </a:effectRef>
+          <a:fontRef idx="minor">
+            <a:schemeClr val="dk1"/>
+          </a:fontRef>
+        </p:style>
+        <p:txBody>
+          <a:bodyPr wrap="square" rtlCol="0">
+            <a:spAutoFit/>
+          </a:bodyPr>
+          <a:lstStyle/>
+          <a:p>
+            <a:pPr algn="ctr"/>
+            <a:r>
+              <a:rPr lang="en-US" sz="3200" i="1" dirty="0" smtClean="0">
+                <a:latin typeface="Helvetica" pitchFamily="34" charset="0"/>
+                <a:cs typeface="Helvetica" pitchFamily="34" charset="0"/>
+              </a:rPr>
+              <a:t>Figure </a:t>
+            </a:r>
+            <a:r>
+              <a:rPr lang="en-US" sz="3200" i="1" dirty="0" smtClean="0">
+                <a:latin typeface="Helvetica" pitchFamily="34" charset="0"/>
+                <a:cs typeface="Helvetica" pitchFamily="34" charset="0"/>
+              </a:rPr>
+              <a:t>2. </a:t>
+            </a:r>
+            <a:r>
+              <a:rPr lang="en-US" sz="3200" dirty="0" smtClean="0">
+                <a:latin typeface="Helvetica" pitchFamily="34" charset="0"/>
+                <a:cs typeface="Helvetica" pitchFamily="34" charset="0"/>
+              </a:rPr>
+              <a:t>2d4d </a:t>
+            </a:r>
+            <a:r>
+              <a:rPr lang="en-US" sz="3200" dirty="0" smtClean="0">
+                <a:latin typeface="Helvetica" pitchFamily="34" charset="0"/>
+                <a:cs typeface="Helvetica" pitchFamily="34" charset="0"/>
+              </a:rPr>
+              <a:t>ratio did not influence aggressive </a:t>
+            </a:r>
+            <a:r>
+              <a:rPr lang="en-US" sz="3200" dirty="0" smtClean="0">
+                <a:latin typeface="Helvetica" pitchFamily="34" charset="0"/>
+                <a:cs typeface="Helvetica" pitchFamily="34" charset="0"/>
+              </a:rPr>
+              <a:t>behavior</a:t>
+            </a:r>
+            <a:r>
+              <a:rPr lang="en-US" sz="3200" dirty="0" smtClean="0">
+                <a:latin typeface="Helvetica" pitchFamily="34" charset="0"/>
+                <a:cs typeface="Helvetica" pitchFamily="34" charset="0"/>
+              </a:rPr>
+              <a:t>.</a:t>
+            </a:r>
+          </a:p>
+          <a:p>
+            <a:pPr algn="ctr"/>
+            <a:r>
+              <a:rPr lang="en-US" sz="3200" dirty="0">
+                <a:latin typeface="Helvetica" pitchFamily="34" charset="0"/>
+                <a:cs typeface="Helvetica" pitchFamily="34" charset="0"/>
+              </a:rPr>
+              <a:t>Left hand: </a:t>
+            </a:r>
+            <a:r>
+              <a:rPr lang="en-US" sz="3200" i="1" dirty="0">
+                <a:latin typeface="Helvetica" pitchFamily="34" charset="0"/>
+                <a:cs typeface="Helvetica" pitchFamily="34" charset="0"/>
+              </a:rPr>
+              <a:t>t</a:t>
+            </a:r>
+            <a:r>
+              <a:rPr lang="en-US" sz="3200" dirty="0">
+                <a:latin typeface="Helvetica" pitchFamily="34" charset="0"/>
+                <a:cs typeface="Helvetica" pitchFamily="34" charset="0"/>
+              </a:rPr>
+              <a:t>(198) = 0.43, </a:t>
+            </a:r>
+            <a:r>
+              <a:rPr lang="en-US" sz="3200" i="1" dirty="0">
+                <a:latin typeface="Helvetica" pitchFamily="34" charset="0"/>
+                <a:cs typeface="Helvetica" pitchFamily="34" charset="0"/>
+              </a:rPr>
+              <a:t>r</a:t>
+            </a:r>
+            <a:r>
+              <a:rPr lang="en-US" sz="3200" dirty="0">
+                <a:latin typeface="Helvetica" pitchFamily="34" charset="0"/>
+                <a:cs typeface="Helvetica" pitchFamily="34" charset="0"/>
+              </a:rPr>
+              <a:t> = .03 (-.11, .17)</a:t>
+            </a:r>
+          </a:p>
+          <a:p>
+            <a:pPr algn="ctr"/>
+            <a:r>
+              <a:rPr lang="en-US" sz="3200" dirty="0" smtClean="0">
+                <a:latin typeface="Helvetica" pitchFamily="34" charset="0"/>
+                <a:cs typeface="Helvetica" pitchFamily="34" charset="0"/>
+              </a:rPr>
+              <a:t>Right hand: </a:t>
+            </a:r>
+            <a:r>
+              <a:rPr lang="en-US" sz="3200" i="1" dirty="0" smtClean="0">
+                <a:latin typeface="Helvetica" pitchFamily="34" charset="0"/>
+                <a:cs typeface="Helvetica" pitchFamily="34" charset="0"/>
+              </a:rPr>
+              <a:t>t</a:t>
+            </a:r>
+            <a:r>
+              <a:rPr lang="en-US" sz="3200" dirty="0" smtClean="0">
+                <a:latin typeface="Helvetica" pitchFamily="34" charset="0"/>
+                <a:cs typeface="Helvetica" pitchFamily="34" charset="0"/>
+              </a:rPr>
+              <a:t>(198) = 1.22, </a:t>
+            </a:r>
+            <a:r>
+              <a:rPr lang="en-US" sz="3200" i="1" dirty="0" smtClean="0">
+                <a:latin typeface="Helvetica" pitchFamily="34" charset="0"/>
+                <a:cs typeface="Helvetica" pitchFamily="34" charset="0"/>
+              </a:rPr>
+              <a:t>r </a:t>
+            </a:r>
+            <a:r>
+              <a:rPr lang="en-US" sz="3200" dirty="0" smtClean="0">
+                <a:latin typeface="Helvetica" pitchFamily="34" charset="0"/>
+                <a:cs typeface="Helvetica" pitchFamily="34" charset="0"/>
+              </a:rPr>
+              <a:t>= .09 (-.05, .22)</a:t>
+            </a:r>
+          </a:p>
+        </p:txBody>
+      </p:sp>
+      <p:pic>
+        <p:nvPicPr>
+          <p:cNvPr id="19" name="Picture 2" descr="C:\Users\Joe\Documents\GitHub\Craig_meta\temp.png"/>
           <p:cNvPicPr>
             <a:picLocks noChangeAspect="1" noChangeArrowheads="1"/>
           </p:cNvPicPr>
@@ -6442,8 +6771,8 @@
         </p:blipFill>
         <p:spPr bwMode="auto">
           <a:xfrm>
-            <a:off x="35694938" y="6805613"/>
-            <a:ext cx="6219825" cy="6219825"/>
+            <a:off x="31289625" y="6022627"/>
+            <a:ext cx="13996482" cy="9330988"/>
           </a:xfrm>
           <a:prstGeom prst="rect">
             <a:avLst/>
@@ -6460,88 +6789,172 @@
           </a:extLst>
         </p:spPr>
       </p:pic>
-      <p:pic>
-        <p:nvPicPr>
-          <p:cNvPr id="1028" name="Picture 4" descr="C:\Users\Joe\Documents\GitHub\Craig_meta\petpeese_plotdump\AggCog_Exp_1.png"/>
-          <p:cNvPicPr>
-            <a:picLocks noChangeAspect="1" noChangeArrowheads="1"/>
-          </p:cNvPicPr>
+      <p:sp>
+        <p:nvSpPr>
+          <p:cNvPr id="22" name="TextBox 21"/>
+          <p:cNvSpPr txBox="1"/>
           <p:nvPr/>
-        </p:nvPicPr>
-        <p:blipFill>
-          <a:blip r:embed="rId10">
-            <a:extLst>
-              <a:ext uri="{28A0092B-C50C-407E-A947-70E740481C1C}">
-                <a14:useLocalDpi xmlns:a14="http://schemas.microsoft.com/office/drawing/2010/main" val="0"/>
-              </a:ext>
-            </a:extLst>
-          </a:blip>
-          <a:srcRect/>
-          <a:stretch>
-            <a:fillRect/>
-          </a:stretch>
-        </p:blipFill>
-        <p:spPr bwMode="auto">
+        </p:nvSpPr>
+        <p:spPr>
           <a:xfrm>
-            <a:off x="39152513" y="6348413"/>
-            <a:ext cx="6219825" cy="6219825"/>
+            <a:off x="32032575" y="6022627"/>
+            <a:ext cx="3017364" cy="584775"/>
           </a:xfrm>
           <a:prstGeom prst="rect">
             <a:avLst/>
           </a:prstGeom>
           <a:noFill/>
-          <a:extLst>
-            <a:ext uri="{909E8E84-426E-40DD-AFC4-6F175D3DCCD1}">
-              <a14:hiddenFill xmlns:a14="http://schemas.microsoft.com/office/drawing/2010/main">
-                <a:solidFill>
-                  <a:srgbClr val="FFFFFF"/>
-                </a:solidFill>
-              </a14:hiddenFill>
-            </a:ext>
-          </a:extLst>
         </p:spPr>
-      </p:pic>
-      <p:pic>
-        <p:nvPicPr>
-          <p:cNvPr id="17" name="Picture 6" descr="C:\Users\Joe\Documents\GitHub\vg-dissertation\2x2_histograms.png"/>
-          <p:cNvPicPr>
-            <a:picLocks noChangeAspect="1" noChangeArrowheads="1"/>
-          </p:cNvPicPr>
+        <p:txBody>
+          <a:bodyPr wrap="none" rtlCol="0">
+            <a:spAutoFit/>
+          </a:bodyPr>
+          <a:lstStyle/>
+          <a:p>
+            <a:r>
+              <a:rPr lang="en-US" sz="3200" dirty="0" smtClean="0">
+                <a:latin typeface="Garamond" panose="02020404030301010803" pitchFamily="18" charset="0"/>
+              </a:rPr>
+              <a:t>Aggressive Affect</a:t>
+            </a:r>
+            <a:endParaRPr lang="en-US" sz="3200" dirty="0">
+              <a:latin typeface="Garamond" panose="02020404030301010803" pitchFamily="18" charset="0"/>
+            </a:endParaRPr>
+          </a:p>
+        </p:txBody>
+      </p:sp>
+      <p:sp>
+        <p:nvSpPr>
+          <p:cNvPr id="40" name="TextBox 39"/>
+          <p:cNvSpPr txBox="1"/>
           <p:nvPr/>
-        </p:nvPicPr>
-        <p:blipFill>
-          <a:blip r:embed="rId11">
-            <a:extLst>
-              <a:ext uri="{28A0092B-C50C-407E-A947-70E740481C1C}">
-                <a14:useLocalDpi xmlns:a14="http://schemas.microsoft.com/office/drawing/2010/main" val="0"/>
-              </a:ext>
-            </a:extLst>
-          </a:blip>
-          <a:srcRect/>
-          <a:stretch>
-            <a:fillRect/>
-          </a:stretch>
-        </p:blipFill>
-        <p:spPr bwMode="auto">
+        </p:nvSpPr>
+        <p:spPr>
           <a:xfrm>
-            <a:off x="15478125" y="19659600"/>
-            <a:ext cx="9153822" cy="6102548"/>
+            <a:off x="36521003" y="6022626"/>
+            <a:ext cx="3605667" cy="584775"/>
           </a:xfrm>
           <a:prstGeom prst="rect">
             <a:avLst/>
           </a:prstGeom>
           <a:noFill/>
-          <a:extLst>
-            <a:ext uri="{909E8E84-426E-40DD-AFC4-6F175D3DCCD1}">
-              <a14:hiddenFill xmlns:a14="http://schemas.microsoft.com/office/drawing/2010/main">
-                <a:solidFill>
-                  <a:srgbClr val="FFFFFF"/>
-                </a:solidFill>
-              </a14:hiddenFill>
-            </a:ext>
-          </a:extLst>
         </p:spPr>
-      </p:pic>
+        <p:txBody>
+          <a:bodyPr wrap="none" rtlCol="0">
+            <a:spAutoFit/>
+          </a:bodyPr>
+          <a:lstStyle/>
+          <a:p>
+            <a:r>
+              <a:rPr lang="en-US" sz="3200" dirty="0" smtClean="0">
+                <a:latin typeface="Garamond" panose="02020404030301010803" pitchFamily="18" charset="0"/>
+              </a:rPr>
+              <a:t>Aggressive Cognition</a:t>
+            </a:r>
+            <a:endParaRPr lang="en-US" sz="3200" dirty="0">
+              <a:latin typeface="Garamond" panose="02020404030301010803" pitchFamily="18" charset="0"/>
+            </a:endParaRPr>
+          </a:p>
+        </p:txBody>
+      </p:sp>
+      <p:sp>
+        <p:nvSpPr>
+          <p:cNvPr id="45" name="TextBox 44"/>
+          <p:cNvSpPr txBox="1"/>
+          <p:nvPr/>
+        </p:nvSpPr>
+        <p:spPr>
+          <a:xfrm>
+            <a:off x="41224200" y="6010152"/>
+            <a:ext cx="3438377" cy="584775"/>
+          </a:xfrm>
+          <a:prstGeom prst="rect">
+            <a:avLst/>
+          </a:prstGeom>
+          <a:noFill/>
+        </p:spPr>
+        <p:txBody>
+          <a:bodyPr wrap="none" rtlCol="0">
+            <a:spAutoFit/>
+          </a:bodyPr>
+          <a:lstStyle/>
+          <a:p>
+            <a:r>
+              <a:rPr lang="en-US" sz="3200" dirty="0" smtClean="0">
+                <a:latin typeface="Garamond" panose="02020404030301010803" pitchFamily="18" charset="0"/>
+              </a:rPr>
+              <a:t>Aggressive Behavior</a:t>
+            </a:r>
+            <a:endParaRPr lang="en-US" sz="3200" dirty="0">
+              <a:latin typeface="Garamond" panose="02020404030301010803" pitchFamily="18" charset="0"/>
+            </a:endParaRPr>
+          </a:p>
+        </p:txBody>
+      </p:sp>
+      <p:sp>
+        <p:nvSpPr>
+          <p:cNvPr id="46" name="TextBox 45"/>
+          <p:cNvSpPr txBox="1"/>
+          <p:nvPr/>
+        </p:nvSpPr>
+        <p:spPr>
+          <a:xfrm>
+            <a:off x="31289624" y="15411241"/>
+            <a:ext cx="13973175" cy="1661993"/>
+          </a:xfrm>
+          <a:prstGeom prst="rect">
+            <a:avLst/>
+          </a:prstGeom>
+          <a:ln/>
+        </p:spPr>
+        <p:style>
+          <a:lnRef idx="1">
+            <a:schemeClr val="accent1"/>
+          </a:lnRef>
+          <a:fillRef idx="2">
+            <a:schemeClr val="accent1"/>
+          </a:fillRef>
+          <a:effectRef idx="1">
+            <a:schemeClr val="accent1"/>
+          </a:effectRef>
+          <a:fontRef idx="minor">
+            <a:schemeClr val="dk1"/>
+          </a:fontRef>
+        </p:style>
+        <p:txBody>
+          <a:bodyPr wrap="square" rtlCol="0">
+            <a:spAutoFit/>
+          </a:bodyPr>
+          <a:lstStyle/>
+          <a:p>
+            <a:r>
+              <a:rPr lang="en-US" sz="3400" i="1" dirty="0" smtClean="0">
+                <a:latin typeface="Helvetica" pitchFamily="34" charset="0"/>
+                <a:cs typeface="Helvetica" pitchFamily="34" charset="0"/>
+              </a:rPr>
+              <a:t>Figure </a:t>
+            </a:r>
+            <a:r>
+              <a:rPr lang="en-US" sz="3400" i="1" dirty="0" smtClean="0">
+                <a:latin typeface="Helvetica" pitchFamily="34" charset="0"/>
+                <a:cs typeface="Helvetica" pitchFamily="34" charset="0"/>
+              </a:rPr>
+              <a:t>3. </a:t>
+            </a:r>
+            <a:r>
+              <a:rPr lang="en-US" sz="3400" dirty="0" smtClean="0">
+                <a:latin typeface="Helvetica" pitchFamily="34" charset="0"/>
+                <a:cs typeface="Helvetica" pitchFamily="34" charset="0"/>
+              </a:rPr>
+              <a:t>Funnel plots from Anderson et al. (2010) meta-analysis of violent game effects in experimental research. Top row is “best-practices” experiments, bottom row is all experiments.</a:t>
+            </a:r>
+            <a:endParaRPr lang="en-US" sz="3400" dirty="0">
+              <a:latin typeface="Helvetica" pitchFamily="34" charset="0"/>
+              <a:cs typeface="Helvetica" pitchFamily="34" charset="0"/>
+            </a:endParaRPr>
+          </a:p>
+        </p:txBody>
+      </p:sp>
     </p:spTree>
     <p:extLst>
       <p:ext uri="{BB962C8B-B14F-4D97-AF65-F5344CB8AC3E}">

</xml_diff>

<commit_message>
Added pdf of poster
</commit_message>
<xml_diff>
--- a/SPSP2015/SPSP2015_WIP.pptx
+++ b/SPSP2015/SPSP2015_WIP.pptx
@@ -11,7 +11,7 @@
     <p:sldId id="257" r:id="rId2"/>
   </p:sldIdLst>
   <p:sldSz cx="45720000" cy="34747200"/>
-  <p:notesSz cx="6858000" cy="9144000"/>
+  <p:notesSz cx="7023100" cy="9309100"/>
   <p:custDataLst>
     <p:tags r:id="rId4"/>
   </p:custDataLst>
@@ -148,14 +148,14 @@
         <p:spPr>
           <a:xfrm>
             <a:off x="0" y="0"/>
-            <a:ext cx="2971800" cy="457200"/>
+            <a:ext cx="3043343" cy="465455"/>
           </a:xfrm>
           <a:prstGeom prst="rect">
             <a:avLst/>
           </a:prstGeom>
         </p:spPr>
         <p:txBody>
-          <a:bodyPr vert="horz" lIns="91440" tIns="45720" rIns="91440" bIns="45720" rtlCol="0"/>
+          <a:bodyPr vert="horz" lIns="93324" tIns="46662" rIns="93324" bIns="46662" rtlCol="0"/>
           <a:lstStyle>
             <a:lvl1pPr algn="l">
               <a:defRPr sz="1200"/>
@@ -178,15 +178,15 @@
         </p:nvSpPr>
         <p:spPr>
           <a:xfrm>
-            <a:off x="3884613" y="0"/>
-            <a:ext cx="2971800" cy="457200"/>
+            <a:off x="3978132" y="0"/>
+            <a:ext cx="3043343" cy="465455"/>
           </a:xfrm>
           <a:prstGeom prst="rect">
             <a:avLst/>
           </a:prstGeom>
         </p:spPr>
         <p:txBody>
-          <a:bodyPr vert="horz" lIns="91440" tIns="45720" rIns="91440" bIns="45720" rtlCol="0"/>
+          <a:bodyPr vert="horz" lIns="93324" tIns="46662" rIns="93324" bIns="46662" rtlCol="0"/>
           <a:lstStyle>
             <a:lvl1pPr algn="r">
               <a:defRPr sz="1200"/>
@@ -214,8 +214,8 @@
         </p:nvSpPr>
         <p:spPr>
           <a:xfrm>
-            <a:off x="1173163" y="685800"/>
-            <a:ext cx="4511675" cy="3429000"/>
+            <a:off x="1214438" y="698500"/>
+            <a:ext cx="4594225" cy="3490913"/>
           </a:xfrm>
           <a:prstGeom prst="rect">
             <a:avLst/>
@@ -228,7 +228,7 @@
           </a:ln>
         </p:spPr>
         <p:txBody>
-          <a:bodyPr vert="horz" lIns="91440" tIns="45720" rIns="91440" bIns="45720" rtlCol="0" anchor="ctr"/>
+          <a:bodyPr vert="horz" lIns="93324" tIns="46662" rIns="93324" bIns="46662" rtlCol="0" anchor="ctr"/>
           <a:lstStyle/>
           <a:p>
             <a:endParaRPr lang="en-US"/>
@@ -247,15 +247,15 @@
         </p:nvSpPr>
         <p:spPr>
           <a:xfrm>
-            <a:off x="685800" y="4343400"/>
-            <a:ext cx="5486400" cy="4114800"/>
+            <a:off x="702310" y="4421823"/>
+            <a:ext cx="5618480" cy="4189095"/>
           </a:xfrm>
           <a:prstGeom prst="rect">
             <a:avLst/>
           </a:prstGeom>
         </p:spPr>
         <p:txBody>
-          <a:bodyPr vert="horz" lIns="91440" tIns="45720" rIns="91440" bIns="45720" rtlCol="0"/>
+          <a:bodyPr vert="horz" lIns="93324" tIns="46662" rIns="93324" bIns="46662" rtlCol="0"/>
           <a:lstStyle/>
           <a:p>
             <a:pPr lvl="0"/>
@@ -307,15 +307,15 @@
         </p:nvSpPr>
         <p:spPr>
           <a:xfrm>
-            <a:off x="0" y="8685213"/>
-            <a:ext cx="2971800" cy="457200"/>
+            <a:off x="0" y="8842029"/>
+            <a:ext cx="3043343" cy="465455"/>
           </a:xfrm>
           <a:prstGeom prst="rect">
             <a:avLst/>
           </a:prstGeom>
         </p:spPr>
         <p:txBody>
-          <a:bodyPr vert="horz" lIns="91440" tIns="45720" rIns="91440" bIns="45720" rtlCol="0" anchor="b"/>
+          <a:bodyPr vert="horz" lIns="93324" tIns="46662" rIns="93324" bIns="46662" rtlCol="0" anchor="b"/>
           <a:lstStyle>
             <a:lvl1pPr algn="l">
               <a:defRPr sz="1200"/>
@@ -338,15 +338,15 @@
         </p:nvSpPr>
         <p:spPr>
           <a:xfrm>
-            <a:off x="3884613" y="8685213"/>
-            <a:ext cx="2971800" cy="457200"/>
+            <a:off x="3978132" y="8842029"/>
+            <a:ext cx="3043343" cy="465455"/>
           </a:xfrm>
           <a:prstGeom prst="rect">
             <a:avLst/>
           </a:prstGeom>
         </p:spPr>
         <p:txBody>
-          <a:bodyPr vert="horz" lIns="91440" tIns="45720" rIns="91440" bIns="45720" rtlCol="0" anchor="b"/>
+          <a:bodyPr vert="horz" lIns="93324" tIns="46662" rIns="93324" bIns="46662" rtlCol="0" anchor="b"/>
           <a:lstStyle>
             <a:lvl1pPr algn="r">
               <a:defRPr sz="1200"/>
@@ -3617,21 +3617,7 @@
                 <a:latin typeface="Arial" panose="020B0604020202020204" pitchFamily="34" charset="0"/>
                 <a:cs typeface="Arial" panose="020B0604020202020204" pitchFamily="34" charset="0"/>
               </a:rPr>
-              <a:t>, </a:t>
-            </a:r>
-            <a:r>
-              <a:rPr lang="en-US" sz="4800" dirty="0" smtClean="0">
-                <a:latin typeface="Arial" panose="020B0604020202020204" pitchFamily="34" charset="0"/>
-                <a:cs typeface="Arial" panose="020B0604020202020204" pitchFamily="34" charset="0"/>
-              </a:rPr>
-              <a:t>&amp; Bruce </a:t>
-            </a:r>
-            <a:r>
-              <a:rPr lang="en-US" sz="4800" dirty="0" smtClean="0">
-                <a:latin typeface="Arial" panose="020B0604020202020204" pitchFamily="34" charset="0"/>
-                <a:cs typeface="Arial" panose="020B0604020202020204" pitchFamily="34" charset="0"/>
-              </a:rPr>
-              <a:t>D. </a:t>
+              <a:t>, &amp; Bruce D. </a:t>
             </a:r>
             <a:r>
               <a:rPr lang="en-US" sz="4800" dirty="0" err="1" smtClean="0">
@@ -3664,13 +3650,15 @@
       <p:grpSp>
         <p:nvGrpSpPr>
           <p:cNvPr id="38" name="Group 37"/>
-          <p:cNvGrpSpPr/>
+          <p:cNvGrpSpPr>
+            <a:grpSpLocks noChangeAspect="1"/>
+          </p:cNvGrpSpPr>
           <p:nvPr/>
         </p:nvGrpSpPr>
         <p:grpSpPr>
           <a:xfrm>
-            <a:off x="15544800" y="5284820"/>
-            <a:ext cx="13937675" cy="6785747"/>
+            <a:off x="15535239" y="5284820"/>
+            <a:ext cx="14649523" cy="7132320"/>
             <a:chOff x="14572354" y="5029201"/>
             <a:chExt cx="14919862" cy="7263938"/>
           </a:xfrm>
@@ -3895,7 +3883,7 @@
         </p:nvSpPr>
         <p:spPr>
           <a:xfrm>
-            <a:off x="228600" y="15719018"/>
+            <a:off x="228600" y="15650000"/>
             <a:ext cx="14439900" cy="2893100"/>
           </a:xfrm>
           <a:prstGeom prst="rect">
@@ -3931,7 +3919,21 @@
                 <a:latin typeface="Helvetica" pitchFamily="34" charset="0"/>
                 <a:cs typeface="Helvetica" pitchFamily="34" charset="0"/>
               </a:rPr>
-              <a:t>This study tests the effects of video game violence, video game difficulty, and prenatal testosterone on provoked aggressive behavior.  Furthermore, it tests the media effects in an experimental paradigm that does not confound differences in gameplay with differences in violent content.</a:t>
+              <a:t>This study tests the </a:t>
+            </a:r>
+            <a:r>
+              <a:rPr lang="en-US" sz="3200" dirty="0" smtClean="0">
+                <a:latin typeface="Helvetica" pitchFamily="34" charset="0"/>
+                <a:cs typeface="Helvetica" pitchFamily="34" charset="0"/>
+              </a:rPr>
+              <a:t>possibly-interactive effects </a:t>
+            </a:r>
+            <a:r>
+              <a:rPr lang="en-US" sz="3200" dirty="0" smtClean="0">
+                <a:latin typeface="Helvetica" pitchFamily="34" charset="0"/>
+                <a:cs typeface="Helvetica" pitchFamily="34" charset="0"/>
+              </a:rPr>
+              <a:t>of video game violence, video game difficulty, and prenatal testosterone on provoked aggressive behavior.  Furthermore, it tests the media effects in an experimental paradigm that does not confound differences in gameplay with differences in violent content.</a:t>
             </a:r>
           </a:p>
         </p:txBody>
@@ -3985,7 +3987,28 @@
                 <a:latin typeface="Helvetica" pitchFamily="34" charset="0"/>
                 <a:cs typeface="Helvetica" pitchFamily="34" charset="0"/>
               </a:rPr>
-              <a:t>Many participants indicated not being deceived, and others’ data are still being entered and analyzed. Thus, the sample size used for current analyses is </a:t>
+              <a:t>Some </a:t>
+            </a:r>
+            <a:r>
+              <a:rPr lang="en-US" sz="3200" dirty="0" smtClean="0">
+                <a:latin typeface="Helvetica" pitchFamily="34" charset="0"/>
+                <a:cs typeface="Helvetica" pitchFamily="34" charset="0"/>
+              </a:rPr>
+              <a:t>participants indicated not being </a:t>
+            </a:r>
+            <a:r>
+              <a:rPr lang="en-US" sz="3200" dirty="0" smtClean="0">
+                <a:latin typeface="Helvetica" pitchFamily="34" charset="0"/>
+                <a:cs typeface="Helvetica" pitchFamily="34" charset="0"/>
+              </a:rPr>
+              <a:t>deceived (n = 35), </a:t>
+            </a:r>
+            <a:r>
+              <a:rPr lang="en-US" sz="3200" dirty="0" smtClean="0">
+                <a:latin typeface="Helvetica" pitchFamily="34" charset="0"/>
+                <a:cs typeface="Helvetica" pitchFamily="34" charset="0"/>
+              </a:rPr>
+              <a:t>and others’ data are still being entered and analyzed. Thus, the sample size used for current analyses is </a:t>
             </a:r>
             <a:r>
               <a:rPr lang="en-US" sz="3200" dirty="0">
@@ -4048,14 +4071,7 @@
                 <a:latin typeface="Helvetica" pitchFamily="34" charset="0"/>
                 <a:cs typeface="Helvetica" pitchFamily="34" charset="0"/>
               </a:rPr>
-              <a:t> = </a:t>
-            </a:r>
-            <a:r>
-              <a:rPr lang="en-US" sz="2800" dirty="0" smtClean="0">
-                <a:latin typeface="Helvetica" pitchFamily="34" charset="0"/>
-                <a:cs typeface="Helvetica" pitchFamily="34" charset="0"/>
-              </a:rPr>
-              <a:t>.</a:t>
+              <a:t> = .</a:t>
             </a:r>
             <a:r>
               <a:rPr lang="en-US" sz="2800" dirty="0">
@@ -4149,7 +4165,7 @@
         </p:nvSpPr>
         <p:spPr>
           <a:xfrm>
-            <a:off x="31122937" y="23505832"/>
+            <a:off x="31122937" y="23308930"/>
             <a:ext cx="14401800" cy="8212505"/>
           </a:xfrm>
           <a:prstGeom prst="rect">
@@ -4180,7 +4196,7 @@
             </a:r>
           </a:p>
           <a:p>
-            <a:pPr>
+            <a:pPr marL="457200" indent="-457200">
               <a:spcAft>
                 <a:spcPts val="1000"/>
               </a:spcAft>
@@ -4192,14 +4208,7 @@
                 <a:latin typeface="Helvetica" pitchFamily="34" charset="0"/>
                 <a:cs typeface="Helvetica" pitchFamily="34" charset="0"/>
               </a:rPr>
-              <a:t>Effects of violent games seem smaller than </a:t>
-            </a:r>
-            <a:r>
-              <a:rPr lang="en-US" sz="3600" dirty="0" smtClean="0">
-                <a:latin typeface="Helvetica" pitchFamily="34" charset="0"/>
-                <a:cs typeface="Helvetica" pitchFamily="34" charset="0"/>
-              </a:rPr>
-              <a:t>expected, providing evidence for the null hypothesis.</a:t>
+              <a:t>Effects of violent games seem smaller than expected, providing evidence for the null hypothesis.</a:t>
             </a:r>
             <a:endParaRPr lang="en-US" sz="3600" dirty="0">
               <a:latin typeface="Helvetica" pitchFamily="34" charset="0"/>
@@ -4207,7 +4216,7 @@
             </a:endParaRPr>
           </a:p>
           <a:p>
-            <a:pPr>
+            <a:pPr marL="457200" indent="-457200">
               <a:spcAft>
                 <a:spcPts val="1000"/>
               </a:spcAft>
@@ -4219,15 +4228,18 @@
                 <a:latin typeface="Helvetica" pitchFamily="34" charset="0"/>
                 <a:cs typeface="Helvetica" pitchFamily="34" charset="0"/>
               </a:rPr>
-              <a:t>2d4d ratio does not predict aggressive behavior, even when subjects are provoked.</a:t>
-            </a:r>
-            <a:endParaRPr lang="en-US" sz="3600" dirty="0" smtClean="0">
-              <a:latin typeface="Helvetica" pitchFamily="34" charset="0"/>
-              <a:cs typeface="Helvetica" pitchFamily="34" charset="0"/>
-            </a:endParaRPr>
-          </a:p>
-          <a:p>
-            <a:pPr>
+              <a:t>Evidence suggests 2d4d </a:t>
+            </a:r>
+            <a:r>
+              <a:rPr lang="en-US" sz="3600" dirty="0" smtClean="0">
+                <a:latin typeface="Helvetica" pitchFamily="34" charset="0"/>
+                <a:cs typeface="Helvetica" pitchFamily="34" charset="0"/>
+              </a:rPr>
+              <a:t>ratio does not predict aggressive behavior, even when subjects are provoked.</a:t>
+            </a:r>
+          </a:p>
+          <a:p>
+            <a:pPr marL="457200" indent="-457200">
               <a:spcAft>
                 <a:spcPts val="1000"/>
               </a:spcAft>
@@ -4243,7 +4255,7 @@
             </a:r>
           </a:p>
           <a:p>
-            <a:pPr>
+            <a:pPr marL="457200" indent="-457200">
               <a:spcAft>
                 <a:spcPts val="1000"/>
               </a:spcAft>
@@ -4255,11 +4267,36 @@
                 <a:latin typeface="Helvetica" pitchFamily="34" charset="0"/>
                 <a:cs typeface="Helvetica" pitchFamily="34" charset="0"/>
               </a:rPr>
-              <a:t>Funnel-plot asymmetry suggests effects overestimated in meta-analysis.</a:t>
-            </a:r>
-          </a:p>
-          <a:p>
-            <a:pPr>
+              <a:t>Funnel-plot asymmetry suggests effects </a:t>
+            </a:r>
+            <a:r>
+              <a:rPr lang="en-US" sz="3600" dirty="0" smtClean="0">
+                <a:latin typeface="Helvetica" pitchFamily="34" charset="0"/>
+                <a:cs typeface="Helvetica" pitchFamily="34" charset="0"/>
+              </a:rPr>
+              <a:t>have been overestimated </a:t>
+            </a:r>
+            <a:r>
+              <a:rPr lang="en-US" sz="3600" dirty="0" smtClean="0">
+                <a:latin typeface="Helvetica" pitchFamily="34" charset="0"/>
+                <a:cs typeface="Helvetica" pitchFamily="34" charset="0"/>
+              </a:rPr>
+              <a:t>in meta-analysis</a:t>
+            </a:r>
+            <a:r>
+              <a:rPr lang="en-US" sz="3600" dirty="0" smtClean="0">
+                <a:latin typeface="Helvetica" pitchFamily="34" charset="0"/>
+                <a:cs typeface="Helvetica" pitchFamily="34" charset="0"/>
+              </a:rPr>
+              <a:t>. Selection of “best-practices” may introduce bias.</a:t>
+            </a:r>
+            <a:endParaRPr lang="en-US" sz="3600" dirty="0" smtClean="0">
+              <a:latin typeface="Helvetica" pitchFamily="34" charset="0"/>
+              <a:cs typeface="Helvetica" pitchFamily="34" charset="0"/>
+            </a:endParaRPr>
+          </a:p>
+          <a:p>
+            <a:pPr marL="457200" indent="-457200">
               <a:spcAft>
                 <a:spcPts val="1000"/>
               </a:spcAft>
@@ -4271,15 +4308,25 @@
                 <a:latin typeface="Helvetica" pitchFamily="34" charset="0"/>
                 <a:cs typeface="Helvetica" pitchFamily="34" charset="0"/>
               </a:rPr>
-              <a:t>Subjects probably more aware of research hypothesis than researchers suspect. Time for fewer press releases?</a:t>
-            </a:r>
-            <a:endParaRPr lang="en-US" sz="3600" dirty="0" smtClean="0">
-              <a:latin typeface="Helvetica" pitchFamily="34" charset="0"/>
-              <a:cs typeface="Helvetica" pitchFamily="34" charset="0"/>
-            </a:endParaRPr>
-          </a:p>
-          <a:p>
-            <a:pPr>
+              <a:t>Subjects </a:t>
+            </a:r>
+            <a:r>
+              <a:rPr lang="en-US" sz="3600" dirty="0" smtClean="0">
+                <a:latin typeface="Helvetica" pitchFamily="34" charset="0"/>
+                <a:cs typeface="Helvetica" pitchFamily="34" charset="0"/>
+              </a:rPr>
+              <a:t>perhaps </a:t>
+            </a:r>
+            <a:r>
+              <a:rPr lang="en-US" sz="3600" dirty="0" smtClean="0">
+                <a:latin typeface="Helvetica" pitchFamily="34" charset="0"/>
+                <a:cs typeface="Helvetica" pitchFamily="34" charset="0"/>
+              </a:rPr>
+              <a:t>more aware of research hypothesis than researchers suspect. Time for fewer press releases?</a:t>
+            </a:r>
+          </a:p>
+          <a:p>
+            <a:pPr marL="457200" indent="-457200">
               <a:spcAft>
                 <a:spcPts val="1000"/>
               </a:spcAft>
@@ -4291,26 +4338,8 @@
                 <a:latin typeface="Helvetica" pitchFamily="34" charset="0"/>
                 <a:cs typeface="Helvetica" pitchFamily="34" charset="0"/>
               </a:rPr>
-              <a:t>Current </a:t>
-            </a:r>
-            <a:r>
-              <a:rPr lang="en-US" sz="3600" dirty="0" smtClean="0">
-                <a:latin typeface="Helvetica" pitchFamily="34" charset="0"/>
-                <a:cs typeface="Helvetica" pitchFamily="34" charset="0"/>
-              </a:rPr>
-              <a:t>results are </a:t>
-            </a:r>
-            <a:r>
-              <a:rPr lang="en-US" sz="3600" dirty="0" smtClean="0">
-                <a:latin typeface="Helvetica" pitchFamily="34" charset="0"/>
-                <a:cs typeface="Helvetica" pitchFamily="34" charset="0"/>
-              </a:rPr>
-              <a:t>speculative and may change with increasing sample size or more appropriate modeling of non-normal DV.</a:t>
-            </a:r>
-            <a:endParaRPr lang="en-US" sz="3600" dirty="0" smtClean="0">
-              <a:latin typeface="Helvetica" pitchFamily="34" charset="0"/>
-              <a:cs typeface="Helvetica" pitchFamily="34" charset="0"/>
-            </a:endParaRPr>
+              <a:t>Current results are speculative and may change with increasing sample size or more appropriate modeling of non-normal DV.</a:t>
+            </a:r>
           </a:p>
         </p:txBody>
       </p:sp>
@@ -4436,76 +4465,102 @@
                 <a:latin typeface="Helvetica" pitchFamily="34" charset="0"/>
                 <a:cs typeface="Helvetica" pitchFamily="34" charset="0"/>
               </a:rPr>
-              <a:t>55-62</a:t>
+              <a:t>55-62.</a:t>
+            </a:r>
+          </a:p>
+          <a:p>
+            <a:r>
+              <a:rPr lang="en-US" sz="1300" dirty="0" err="1" smtClean="0">
+                <a:latin typeface="Helvetica" pitchFamily="34" charset="0"/>
+                <a:cs typeface="Helvetica" pitchFamily="34" charset="0"/>
+              </a:rPr>
+              <a:t>Hasan</a:t>
             </a:r>
             <a:r>
               <a:rPr lang="en-US" sz="1300" dirty="0" smtClean="0">
                 <a:latin typeface="Helvetica" pitchFamily="34" charset="0"/>
                 <a:cs typeface="Helvetica" pitchFamily="34" charset="0"/>
               </a:rPr>
-              <a:t>.</a:t>
-            </a:r>
-            <a:endParaRPr lang="en-US" sz="1300" dirty="0" smtClean="0">
-              <a:latin typeface="Helvetica" pitchFamily="34" charset="0"/>
-              <a:cs typeface="Helvetica" pitchFamily="34" charset="0"/>
-            </a:endParaRPr>
-          </a:p>
-          <a:p>
+              <a:t>, Y., </a:t>
+            </a:r>
             <a:r>
               <a:rPr lang="en-US" sz="1300" dirty="0" err="1" smtClean="0">
                 <a:latin typeface="Helvetica" pitchFamily="34" charset="0"/>
                 <a:cs typeface="Helvetica" pitchFamily="34" charset="0"/>
               </a:rPr>
-              <a:t>Hasan</a:t>
+              <a:t>Begue</a:t>
             </a:r>
             <a:r>
               <a:rPr lang="en-US" sz="1300" dirty="0" smtClean="0">
                 <a:latin typeface="Helvetica" pitchFamily="34" charset="0"/>
                 <a:cs typeface="Helvetica" pitchFamily="34" charset="0"/>
               </a:rPr>
-              <a:t>, Y., </a:t>
+              <a:t>, L., </a:t>
             </a:r>
             <a:r>
               <a:rPr lang="en-US" sz="1300" dirty="0" err="1" smtClean="0">
                 <a:latin typeface="Helvetica" pitchFamily="34" charset="0"/>
                 <a:cs typeface="Helvetica" pitchFamily="34" charset="0"/>
               </a:rPr>
-              <a:t>Begue</a:t>
+              <a:t>Scharkow</a:t>
             </a:r>
             <a:r>
               <a:rPr lang="en-US" sz="1300" dirty="0" smtClean="0">
                 <a:latin typeface="Helvetica" pitchFamily="34" charset="0"/>
                 <a:cs typeface="Helvetica" pitchFamily="34" charset="0"/>
               </a:rPr>
-              <a:t>, L., </a:t>
+              <a:t>, M., &amp; Bushman, B.J. (2013) The more you play, the more aggressive you become: A long-term experimental study of cumulative violent video game effects on hostile expectations and aggressive behavior. </a:t>
+            </a:r>
+            <a:r>
+              <a:rPr lang="en-US" sz="1300" i="1" dirty="0" smtClean="0">
+                <a:latin typeface="Helvetica" pitchFamily="34" charset="0"/>
+                <a:cs typeface="Helvetica" pitchFamily="34" charset="0"/>
+              </a:rPr>
+              <a:t>Journal of Experimental Social Psychology, 49, </a:t>
+            </a:r>
+            <a:r>
+              <a:rPr lang="en-US" sz="1300" dirty="0" smtClean="0">
+                <a:latin typeface="Helvetica" pitchFamily="34" charset="0"/>
+                <a:cs typeface="Helvetica" pitchFamily="34" charset="0"/>
+              </a:rPr>
+              <a:t>224-227.</a:t>
+            </a:r>
+          </a:p>
+          <a:p>
+            <a:r>
+              <a:rPr lang="en-US" sz="1300" dirty="0" smtClean="0">
+                <a:latin typeface="Helvetica" pitchFamily="34" charset="0"/>
+                <a:cs typeface="Helvetica" pitchFamily="34" charset="0"/>
+              </a:rPr>
+              <a:t>Millet, K. (2011) An </a:t>
             </a:r>
             <a:r>
               <a:rPr lang="en-US" sz="1300" dirty="0" err="1" smtClean="0">
                 <a:latin typeface="Helvetica" pitchFamily="34" charset="0"/>
                 <a:cs typeface="Helvetica" pitchFamily="34" charset="0"/>
               </a:rPr>
-              <a:t>Scharkow</a:t>
+              <a:t>interactionist</a:t>
             </a:r>
             <a:r>
               <a:rPr lang="en-US" sz="1300" dirty="0" smtClean="0">
                 <a:latin typeface="Helvetica" pitchFamily="34" charset="0"/>
                 <a:cs typeface="Helvetica" pitchFamily="34" charset="0"/>
               </a:rPr>
-              <a:t>, M., &amp; Bushman, B.J. (2013) The more you play, the more aggressive you become: A long-term experimental study of cumulative violent video game effects on hostile expectations and aggressive behavior. </a:t>
+              <a:t> perspective on the relation between 2D:4D and behavior: An overview of (moderated) relationships between 2D:4D and economic decision making. </a:t>
             </a:r>
             <a:r>
               <a:rPr lang="en-US" sz="1300" i="1" dirty="0" smtClean="0">
                 <a:latin typeface="Helvetica" pitchFamily="34" charset="0"/>
                 <a:cs typeface="Helvetica" pitchFamily="34" charset="0"/>
               </a:rPr>
-              <a:t>Journal of Experimental Social Psychology, 49, </a:t>
+              <a:t>Personality and Individual Differences, 51, </a:t>
             </a:r>
             <a:r>
               <a:rPr lang="en-US" sz="1300" dirty="0" smtClean="0">
                 <a:latin typeface="Helvetica" pitchFamily="34" charset="0"/>
                 <a:cs typeface="Helvetica" pitchFamily="34" charset="0"/>
               </a:rPr>
-              <a:t>224-227.</a:t>
+              <a:t>397-401.</a:t>
             </a:r>
           </a:p>
           <a:p>
@@ -4514,35 +4569,107 @@
                 <a:latin typeface="Helvetica" pitchFamily="34" charset="0"/>
                 <a:cs typeface="Helvetica" pitchFamily="34" charset="0"/>
               </a:rPr>
-              <a:t>Millet, K. (2011) An </a:t>
+              <a:t>Morey, R. D., </a:t>
             </a:r>
             <a:r>
               <a:rPr lang="en-US" sz="1300" dirty="0" err="1" smtClean="0">
                 <a:latin typeface="Helvetica" pitchFamily="34" charset="0"/>
                 <a:cs typeface="Helvetica" pitchFamily="34" charset="0"/>
               </a:rPr>
-              <a:t>interactionist</a:t>
+              <a:t>Rouder</a:t>
             </a:r>
             <a:r>
               <a:rPr lang="en-US" sz="1300" dirty="0" smtClean="0">
                 <a:latin typeface="Helvetica" pitchFamily="34" charset="0"/>
                 <a:cs typeface="Helvetica" pitchFamily="34" charset="0"/>
               </a:rPr>
-              <a:t> perspective on the relation between 2D:4D and behavior: An overview of (moderated) relationships between 2D:4D and economic decision making. </a:t>
+              <a:t>, J.N., &amp; </a:t>
+            </a:r>
+            <a:r>
+              <a:rPr lang="en-US" sz="1300" dirty="0" err="1" smtClean="0">
+                <a:latin typeface="Helvetica" pitchFamily="34" charset="0"/>
+                <a:cs typeface="Helvetica" pitchFamily="34" charset="0"/>
+              </a:rPr>
+              <a:t>Jamil</a:t>
+            </a:r>
+            <a:r>
+              <a:rPr lang="en-US" sz="1300" dirty="0" smtClean="0">
+                <a:latin typeface="Helvetica" pitchFamily="34" charset="0"/>
+                <a:cs typeface="Helvetica" pitchFamily="34" charset="0"/>
+              </a:rPr>
+              <a:t>, T. (2014). </a:t>
+            </a:r>
+            <a:r>
+              <a:rPr lang="en-US" sz="1300" dirty="0" err="1" smtClean="0">
+                <a:latin typeface="Helvetica" pitchFamily="34" charset="0"/>
+                <a:cs typeface="Helvetica" pitchFamily="34" charset="0"/>
+              </a:rPr>
+              <a:t>BayesFactor</a:t>
+            </a:r>
+            <a:r>
+              <a:rPr lang="en-US" sz="1300" dirty="0" smtClean="0">
+                <a:latin typeface="Helvetica" pitchFamily="34" charset="0"/>
+                <a:cs typeface="Helvetica" pitchFamily="34" charset="0"/>
+              </a:rPr>
+              <a:t>: Computation of </a:t>
+            </a:r>
+            <a:r>
+              <a:rPr lang="en-US" sz="1300" dirty="0" err="1" smtClean="0">
+                <a:latin typeface="Helvetica" pitchFamily="34" charset="0"/>
+                <a:cs typeface="Helvetica" pitchFamily="34" charset="0"/>
+              </a:rPr>
+              <a:t>Bayes</a:t>
+            </a:r>
+            <a:r>
+              <a:rPr lang="en-US" sz="1300" dirty="0" smtClean="0">
+                <a:latin typeface="Helvetica" pitchFamily="34" charset="0"/>
+                <a:cs typeface="Helvetica" pitchFamily="34" charset="0"/>
+              </a:rPr>
+              <a:t> factors for common designs. R package version 0.9.8. </a:t>
+            </a:r>
+          </a:p>
+          <a:p>
+            <a:r>
+              <a:rPr lang="en-US" sz="1300" dirty="0" err="1" smtClean="0">
+                <a:latin typeface="Helvetica" pitchFamily="34" charset="0"/>
+                <a:cs typeface="Helvetica" pitchFamily="34" charset="0"/>
+              </a:rPr>
+              <a:t>Pryzyblski</a:t>
+            </a:r>
+            <a:r>
+              <a:rPr lang="en-US" sz="1300" dirty="0" smtClean="0">
+                <a:latin typeface="Helvetica" pitchFamily="34" charset="0"/>
+                <a:cs typeface="Helvetica" pitchFamily="34" charset="0"/>
+              </a:rPr>
+              <a:t>, A.K., </a:t>
+            </a:r>
+            <a:r>
+              <a:rPr lang="en-US" sz="1300" dirty="0" err="1" smtClean="0">
+                <a:latin typeface="Helvetica" pitchFamily="34" charset="0"/>
+                <a:cs typeface="Helvetica" pitchFamily="34" charset="0"/>
+              </a:rPr>
+              <a:t>Deci</a:t>
+            </a:r>
+            <a:r>
+              <a:rPr lang="en-US" sz="1300" dirty="0" smtClean="0">
+                <a:latin typeface="Helvetica" pitchFamily="34" charset="0"/>
+                <a:cs typeface="Helvetica" pitchFamily="34" charset="0"/>
+              </a:rPr>
+              <a:t>, E.L., Rigby, C.S., &amp; Ryan, R.M. (2014) Competence-impeding electronic games and players’ aggressive feelings, thoughts, and behaviors. </a:t>
             </a:r>
             <a:r>
               <a:rPr lang="en-US" sz="1300" i="1" dirty="0" smtClean="0">
                 <a:latin typeface="Helvetica" pitchFamily="34" charset="0"/>
                 <a:cs typeface="Helvetica" pitchFamily="34" charset="0"/>
               </a:rPr>
-              <a:t>Personality and Individual Differences, 51, </a:t>
+              <a:t>JPSP, 106, </a:t>
             </a:r>
             <a:r>
               <a:rPr lang="en-US" sz="1300" dirty="0" smtClean="0">
                 <a:latin typeface="Helvetica" pitchFamily="34" charset="0"/>
                 <a:cs typeface="Helvetica" pitchFamily="34" charset="0"/>
               </a:rPr>
-              <a:t>397-401.</a:t>
+              <a:t>441-457.</a:t>
             </a:r>
           </a:p>
           <a:p>
@@ -4551,149 +4678,36 @@
                 <a:latin typeface="Helvetica" pitchFamily="34" charset="0"/>
                 <a:cs typeface="Helvetica" pitchFamily="34" charset="0"/>
               </a:rPr>
-              <a:t>Morey, R. D., </a:t>
+              <a:t>Stanley, T. D., &amp; </a:t>
             </a:r>
             <a:r>
               <a:rPr lang="en-US" sz="1300" dirty="0" err="1" smtClean="0">
                 <a:latin typeface="Helvetica" pitchFamily="34" charset="0"/>
                 <a:cs typeface="Helvetica" pitchFamily="34" charset="0"/>
               </a:rPr>
-              <a:t>Rouder</a:t>
+              <a:t>Doucouliagos</a:t>
             </a:r>
             <a:r>
               <a:rPr lang="en-US" sz="1300" dirty="0" smtClean="0">
                 <a:latin typeface="Helvetica" pitchFamily="34" charset="0"/>
                 <a:cs typeface="Helvetica" pitchFamily="34" charset="0"/>
               </a:rPr>
-              <a:t>, J.N., &amp; </a:t>
-            </a:r>
-            <a:r>
-              <a:rPr lang="en-US" sz="1300" dirty="0" err="1" smtClean="0">
-                <a:latin typeface="Helvetica" pitchFamily="34" charset="0"/>
-                <a:cs typeface="Helvetica" pitchFamily="34" charset="0"/>
-              </a:rPr>
-              <a:t>Jamil</a:t>
+              <a:t>, H. (2014). Meta-regression approximations to reduce publication selection bias. </a:t>
+            </a:r>
+            <a:r>
+              <a:rPr lang="en-US" sz="1300" i="1" dirty="0" smtClean="0">
+                <a:latin typeface="Helvetica" pitchFamily="34" charset="0"/>
+                <a:cs typeface="Helvetica" pitchFamily="34" charset="0"/>
+              </a:rPr>
+              <a:t>Research Synthesis Methods, 5, </a:t>
             </a:r>
             <a:r>
               <a:rPr lang="en-US" sz="1300" dirty="0" smtClean="0">
                 <a:latin typeface="Helvetica" pitchFamily="34" charset="0"/>
                 <a:cs typeface="Helvetica" pitchFamily="34" charset="0"/>
               </a:rPr>
-              <a:t>, T. (2014). </a:t>
-            </a:r>
-            <a:r>
-              <a:rPr lang="en-US" sz="1300" dirty="0" err="1" smtClean="0">
-                <a:latin typeface="Helvetica" pitchFamily="34" charset="0"/>
-                <a:cs typeface="Helvetica" pitchFamily="34" charset="0"/>
-              </a:rPr>
-              <a:t>BayesFactor</a:t>
-            </a:r>
-            <a:r>
-              <a:rPr lang="en-US" sz="1300" dirty="0" smtClean="0">
-                <a:latin typeface="Helvetica" pitchFamily="34" charset="0"/>
-                <a:cs typeface="Helvetica" pitchFamily="34" charset="0"/>
-              </a:rPr>
-              <a:t>: Computation of </a:t>
-            </a:r>
-            <a:r>
-              <a:rPr lang="en-US" sz="1300" dirty="0" err="1" smtClean="0">
-                <a:latin typeface="Helvetica" pitchFamily="34" charset="0"/>
-                <a:cs typeface="Helvetica" pitchFamily="34" charset="0"/>
-              </a:rPr>
-              <a:t>Bayes</a:t>
-            </a:r>
-            <a:r>
-              <a:rPr lang="en-US" sz="1300" dirty="0" smtClean="0">
-                <a:latin typeface="Helvetica" pitchFamily="34" charset="0"/>
-                <a:cs typeface="Helvetica" pitchFamily="34" charset="0"/>
-              </a:rPr>
-              <a:t> factors for common designs. R package version 0.9.8. </a:t>
-            </a:r>
-          </a:p>
-          <a:p>
-            <a:r>
-              <a:rPr lang="en-US" sz="1300" dirty="0" err="1" smtClean="0">
-                <a:latin typeface="Helvetica" pitchFamily="34" charset="0"/>
-                <a:cs typeface="Helvetica" pitchFamily="34" charset="0"/>
-              </a:rPr>
-              <a:t>Pryzyblski</a:t>
-            </a:r>
-            <a:r>
-              <a:rPr lang="en-US" sz="1300" dirty="0" smtClean="0">
-                <a:latin typeface="Helvetica" pitchFamily="34" charset="0"/>
-                <a:cs typeface="Helvetica" pitchFamily="34" charset="0"/>
-              </a:rPr>
-              <a:t>, A.K., </a:t>
-            </a:r>
-            <a:r>
-              <a:rPr lang="en-US" sz="1300" dirty="0" err="1" smtClean="0">
-                <a:latin typeface="Helvetica" pitchFamily="34" charset="0"/>
-                <a:cs typeface="Helvetica" pitchFamily="34" charset="0"/>
-              </a:rPr>
-              <a:t>Deci</a:t>
-            </a:r>
-            <a:r>
-              <a:rPr lang="en-US" sz="1300" dirty="0" smtClean="0">
-                <a:latin typeface="Helvetica" pitchFamily="34" charset="0"/>
-                <a:cs typeface="Helvetica" pitchFamily="34" charset="0"/>
-              </a:rPr>
-              <a:t>, E.L., Rigby, C.S., &amp; Ryan, R.M. (2014) Competence-impeding electronic games and players’ aggressive feelings, thoughts, and behaviors. </a:t>
-            </a:r>
-            <a:r>
-              <a:rPr lang="en-US" sz="1300" i="1" dirty="0" smtClean="0">
-                <a:latin typeface="Helvetica" pitchFamily="34" charset="0"/>
-                <a:cs typeface="Helvetica" pitchFamily="34" charset="0"/>
-              </a:rPr>
-              <a:t>JPSP, 106, </a:t>
-            </a:r>
-            <a:r>
-              <a:rPr lang="en-US" sz="1300" dirty="0" smtClean="0">
-                <a:latin typeface="Helvetica" pitchFamily="34" charset="0"/>
-                <a:cs typeface="Helvetica" pitchFamily="34" charset="0"/>
-              </a:rPr>
-              <a:t>441-457.</a:t>
-            </a:r>
-          </a:p>
-          <a:p>
-            <a:r>
-              <a:rPr lang="en-US" sz="1300" dirty="0" smtClean="0">
-                <a:latin typeface="Helvetica" pitchFamily="34" charset="0"/>
-                <a:cs typeface="Helvetica" pitchFamily="34" charset="0"/>
-              </a:rPr>
-              <a:t>Stanley, T. D., &amp; </a:t>
-            </a:r>
-            <a:r>
-              <a:rPr lang="en-US" sz="1300" dirty="0" err="1" smtClean="0">
-                <a:latin typeface="Helvetica" pitchFamily="34" charset="0"/>
-                <a:cs typeface="Helvetica" pitchFamily="34" charset="0"/>
-              </a:rPr>
-              <a:t>Doucouliagos</a:t>
-            </a:r>
-            <a:r>
-              <a:rPr lang="en-US" sz="1300" dirty="0" smtClean="0">
-                <a:latin typeface="Helvetica" pitchFamily="34" charset="0"/>
-                <a:cs typeface="Helvetica" pitchFamily="34" charset="0"/>
-              </a:rPr>
-              <a:t>, H. (2014). Meta-regression approximations to reduce publication selection bias. </a:t>
-            </a:r>
-            <a:r>
-              <a:rPr lang="en-US" sz="1300" i="1" dirty="0" smtClean="0">
-                <a:latin typeface="Helvetica" pitchFamily="34" charset="0"/>
-                <a:cs typeface="Helvetica" pitchFamily="34" charset="0"/>
-              </a:rPr>
-              <a:t>Research Synthesis Methods, 5, </a:t>
-            </a:r>
-            <a:r>
-              <a:rPr lang="en-US" sz="1300" dirty="0" smtClean="0">
-                <a:latin typeface="Helvetica" pitchFamily="34" charset="0"/>
-                <a:cs typeface="Helvetica" pitchFamily="34" charset="0"/>
-              </a:rPr>
               <a:t>60-78.</a:t>
             </a:r>
-            <a:endParaRPr lang="en-US" sz="1300" dirty="0" smtClean="0">
-              <a:latin typeface="Helvetica" pitchFamily="34" charset="0"/>
-              <a:cs typeface="Helvetica" pitchFamily="34" charset="0"/>
-            </a:endParaRPr>
           </a:p>
         </p:txBody>
       </p:sp>
@@ -4768,7 +4782,7 @@
             </a:r>
           </a:p>
           <a:p>
-            <a:pPr>
+            <a:pPr marL="457200" indent="-457200">
               <a:spcAft>
                 <a:spcPts val="600"/>
               </a:spcAft>
@@ -4805,7 +4819,7 @@
             </a:r>
           </a:p>
           <a:p>
-            <a:pPr>
+            <a:pPr marL="457200" indent="-457200">
               <a:spcAft>
                 <a:spcPts val="600"/>
               </a:spcAft>
@@ -4835,7 +4849,7 @@
             </a:r>
           </a:p>
           <a:p>
-            <a:pPr>
+            <a:pPr marL="457200" indent="-457200">
               <a:spcAft>
                 <a:spcPts val="600"/>
               </a:spcAft>
@@ -4879,7 +4893,7 @@
             </a:r>
           </a:p>
           <a:p>
-            <a:pPr>
+            <a:pPr marL="457200" indent="-457200">
               <a:spcAft>
                 <a:spcPts val="600"/>
               </a:spcAft>
@@ -4951,7 +4965,7 @@
             </a:r>
           </a:p>
           <a:p>
-            <a:pPr>
+            <a:pPr marL="457200" indent="-457200">
               <a:spcAft>
                 <a:spcPts val="600"/>
               </a:spcAft>
@@ -4981,7 +4995,7 @@
             </a:r>
           </a:p>
           <a:p>
-            <a:pPr>
+            <a:pPr marL="457200" indent="-457200">
               <a:spcAft>
                 <a:spcPts val="600"/>
               </a:spcAft>
@@ -4993,7 +5007,49 @@
                 <a:latin typeface="Helvetica" pitchFamily="34" charset="0"/>
                 <a:cs typeface="Helvetica" pitchFamily="34" charset="0"/>
               </a:rPr>
-              <a:t>The present research attempts to extend previous findings but in a novel, closely-matched video game paradigm using two modified versions of the same game.</a:t>
+              <a:t>The present research attempts </a:t>
+            </a:r>
+            <a:r>
+              <a:rPr lang="en-US" sz="3200" dirty="0" smtClean="0">
+                <a:latin typeface="Helvetica" pitchFamily="34" charset="0"/>
+                <a:cs typeface="Helvetica" pitchFamily="34" charset="0"/>
+              </a:rPr>
+              <a:t>to test and extend previous </a:t>
+            </a:r>
+            <a:r>
+              <a:rPr lang="en-US" sz="3200" dirty="0" smtClean="0">
+                <a:latin typeface="Helvetica" pitchFamily="34" charset="0"/>
+                <a:cs typeface="Helvetica" pitchFamily="34" charset="0"/>
+              </a:rPr>
+              <a:t>findings </a:t>
+            </a:r>
+            <a:r>
+              <a:rPr lang="en-US" sz="3200" dirty="0" smtClean="0">
+                <a:latin typeface="Helvetica" pitchFamily="34" charset="0"/>
+                <a:cs typeface="Helvetica" pitchFamily="34" charset="0"/>
+              </a:rPr>
+              <a:t>but in </a:t>
+            </a:r>
+            <a:r>
+              <a:rPr lang="en-US" sz="3200" dirty="0" smtClean="0">
+                <a:latin typeface="Helvetica" pitchFamily="34" charset="0"/>
+                <a:cs typeface="Helvetica" pitchFamily="34" charset="0"/>
+              </a:rPr>
+              <a:t>a </a:t>
+            </a:r>
+            <a:r>
+              <a:rPr lang="en-US" sz="3200" dirty="0" smtClean="0">
+                <a:latin typeface="Helvetica" pitchFamily="34" charset="0"/>
+                <a:cs typeface="Helvetica" pitchFamily="34" charset="0"/>
+              </a:rPr>
+              <a:t>novel, closely-matched </a:t>
+            </a:r>
+            <a:r>
+              <a:rPr lang="en-US" sz="3200" dirty="0" smtClean="0">
+                <a:latin typeface="Helvetica" pitchFamily="34" charset="0"/>
+                <a:cs typeface="Helvetica" pitchFamily="34" charset="0"/>
+              </a:rPr>
+              <a:t>video game paradigm using two modified versions of the same game.</a:t>
             </a:r>
           </a:p>
         </p:txBody>
@@ -5006,7 +5062,7 @@
         </p:nvSpPr>
         <p:spPr>
           <a:xfrm>
-            <a:off x="228600" y="18869412"/>
+            <a:off x="228600" y="18839485"/>
             <a:ext cx="14439900" cy="9720610"/>
           </a:xfrm>
           <a:prstGeom prst="rect">
@@ -5318,8 +5374,8 @@
         </p:nvSpPr>
         <p:spPr>
           <a:xfrm>
-            <a:off x="15201900" y="12191998"/>
-            <a:ext cx="15316200" cy="22360327"/>
+            <a:off x="15201900" y="12606723"/>
+            <a:ext cx="15316200" cy="21945602"/>
           </a:xfrm>
           <a:prstGeom prst="rect">
             <a:avLst/>
@@ -5341,7 +5397,7 @@
           <a:p>
             <a:pPr algn="ctr"/>
             <a:r>
-              <a:rPr lang="en-US" sz="4800" b="1" dirty="0" smtClean="0">
+              <a:rPr lang="en-US" sz="5200" b="1" dirty="0" smtClean="0">
                 <a:latin typeface="Garamond" pitchFamily="18" charset="0"/>
                 <a:cs typeface="Helvetica" pitchFamily="34" charset="0"/>
               </a:rPr>
@@ -5607,7 +5663,7 @@
             </a:endParaRPr>
           </a:p>
           <a:p>
-            <a:pPr lvl="0"/>
+            <a:pPr marL="91440" lvl="0"/>
             <a:r>
               <a:rPr lang="en-US" sz="3200" dirty="0" smtClean="0">
                 <a:solidFill>
@@ -5635,6 +5691,16 @@
               <a:buChar char="•"/>
             </a:pPr>
             <a:r>
+              <a:rPr lang="en-US" sz="3200" dirty="0" smtClean="0">
+                <a:solidFill>
+                  <a:prstClr val="black"/>
+                </a:solidFill>
+                <a:latin typeface="Helvetica" pitchFamily="34" charset="0"/>
+                <a:cs typeface="Helvetica" pitchFamily="34" charset="0"/>
+              </a:rPr>
+              <a:t>Estimated </a:t>
+            </a:r>
+            <a:r>
               <a:rPr lang="en-US" sz="3200" dirty="0">
                 <a:solidFill>
                   <a:prstClr val="black"/>
@@ -5642,7 +5708,27 @@
                 <a:latin typeface="Helvetica" pitchFamily="34" charset="0"/>
                 <a:cs typeface="Helvetica" pitchFamily="34" charset="0"/>
               </a:rPr>
-              <a:t>If anything, estimated effect sizes indicated lower 2d4d ratio was associated with </a:t>
+              <a:t>effect </a:t>
+            </a:r>
+            <a:r>
+              <a:rPr lang="en-US" sz="3200" dirty="0" smtClean="0">
+                <a:solidFill>
+                  <a:prstClr val="black"/>
+                </a:solidFill>
+                <a:latin typeface="Helvetica" pitchFamily="34" charset="0"/>
+                <a:cs typeface="Helvetica" pitchFamily="34" charset="0"/>
+              </a:rPr>
+              <a:t>size </a:t>
+            </a:r>
+            <a:r>
+              <a:rPr lang="en-US" sz="3200" dirty="0">
+                <a:solidFill>
+                  <a:prstClr val="black"/>
+                </a:solidFill>
+                <a:latin typeface="Helvetica" pitchFamily="34" charset="0"/>
+                <a:cs typeface="Helvetica" pitchFamily="34" charset="0"/>
+              </a:rPr>
+              <a:t>indicated lower 2d4d ratio was associated with </a:t>
             </a:r>
             <a:r>
               <a:rPr lang="en-US" sz="3200" i="1" dirty="0">
@@ -5735,7 +5821,7 @@
                 <a:latin typeface="Helvetica" pitchFamily="34" charset="0"/>
                 <a:cs typeface="Helvetica" pitchFamily="34" charset="0"/>
               </a:rPr>
-              <a:t>: 1 for the null, left and right </a:t>
+              <a:t>: 1 </a:t>
             </a:r>
             <a:r>
               <a:rPr lang="en-US" sz="3200" dirty="0" smtClean="0">
@@ -5745,7 +5831,17 @@
                 <a:latin typeface="Helvetica" pitchFamily="34" charset="0"/>
                 <a:cs typeface="Helvetica" pitchFamily="34" charset="0"/>
               </a:rPr>
-              <a:t>2d4d</a:t>
+              <a:t>for the </a:t>
+            </a:r>
+            <a:r>
+              <a:rPr lang="en-US" sz="3200" dirty="0">
+                <a:solidFill>
+                  <a:prstClr val="black"/>
+                </a:solidFill>
+                <a:latin typeface="Helvetica" pitchFamily="34" charset="0"/>
+                <a:cs typeface="Helvetica" pitchFamily="34" charset="0"/>
+              </a:rPr>
+              <a:t>null, left and right </a:t>
             </a:r>
             <a:r>
               <a:rPr lang="en-US" sz="3200" dirty="0" smtClean="0">
@@ -5755,7 +5851,7 @@
                 <a:latin typeface="Helvetica" pitchFamily="34" charset="0"/>
                 <a:cs typeface="Helvetica" pitchFamily="34" charset="0"/>
               </a:rPr>
-              <a:t>.</a:t>
+              <a:t>2d4d.</a:t>
             </a:r>
           </a:p>
           <a:p>
@@ -5868,14 +5964,7 @@
                 <a:latin typeface="Garamond" pitchFamily="18" charset="0"/>
                 <a:cs typeface="Helvetica" pitchFamily="34" charset="0"/>
               </a:rPr>
-              <a:t>Small-Study Effects in Previous </a:t>
-            </a:r>
-            <a:r>
-              <a:rPr lang="en-US" sz="4600" b="1" dirty="0" smtClean="0">
-                <a:latin typeface="Garamond" pitchFamily="18" charset="0"/>
-                <a:cs typeface="Helvetica" pitchFamily="34" charset="0"/>
-              </a:rPr>
-              <a:t>Experimental Research</a:t>
+              <a:t>Small-Study Effects in Previous Experimental Research</a:t>
             </a:r>
           </a:p>
           <a:p>
@@ -6068,35 +6157,7 @@
                 <a:latin typeface="Helvetica" panose="020B0604020202020204" pitchFamily="34" charset="0"/>
                 <a:cs typeface="Helvetica" panose="020B0604020202020204" pitchFamily="34" charset="0"/>
               </a:rPr>
-              <a:t>= </a:t>
-            </a:r>
-            <a:r>
-              <a:rPr lang="en-US" sz="3200" dirty="0" smtClean="0">
-                <a:latin typeface="Helvetica" panose="020B0604020202020204" pitchFamily="34" charset="0"/>
-                <a:cs typeface="Helvetica" panose="020B0604020202020204" pitchFamily="34" charset="0"/>
-              </a:rPr>
-              <a:t>.00, .10, and .16 </a:t>
-            </a:r>
-            <a:r>
-              <a:rPr lang="en-US" sz="3200" dirty="0" smtClean="0">
-                <a:latin typeface="Helvetica" panose="020B0604020202020204" pitchFamily="34" charset="0"/>
-                <a:cs typeface="Helvetica" panose="020B0604020202020204" pitchFamily="34" charset="0"/>
-              </a:rPr>
-              <a:t>for aggressive </a:t>
-            </a:r>
-            <a:r>
-              <a:rPr lang="en-US" sz="3200" dirty="0" smtClean="0">
-                <a:latin typeface="Helvetica" panose="020B0604020202020204" pitchFamily="34" charset="0"/>
-                <a:cs typeface="Helvetica" panose="020B0604020202020204" pitchFamily="34" charset="0"/>
-              </a:rPr>
-              <a:t>affect, cognitions, and affect, </a:t>
-            </a:r>
-            <a:r>
-              <a:rPr lang="en-US" sz="3200" dirty="0" smtClean="0">
-                <a:latin typeface="Helvetica" panose="020B0604020202020204" pitchFamily="34" charset="0"/>
-                <a:cs typeface="Helvetica" panose="020B0604020202020204" pitchFamily="34" charset="0"/>
-              </a:rPr>
-              <a:t>respectively.</a:t>
+              <a:t>= .00, .10, and .16 for aggressive affect, cognitions, and affect, respectively.</a:t>
             </a:r>
           </a:p>
           <a:p>
@@ -6156,14 +6217,7 @@
                 <a:latin typeface="Helvetica" panose="020B0604020202020204" pitchFamily="34" charset="0"/>
                 <a:cs typeface="Helvetica" panose="020B0604020202020204" pitchFamily="34" charset="0"/>
               </a:rPr>
-              <a:t>attempting to partial out covariates measured w/ error</a:t>
-            </a:r>
-            <a:r>
-              <a:rPr lang="en-US" sz="3200" dirty="0" smtClean="0">
-                <a:latin typeface="Helvetica" panose="020B0604020202020204" pitchFamily="34" charset="0"/>
-                <a:cs typeface="Helvetica" panose="020B0604020202020204" pitchFamily="34" charset="0"/>
-              </a:rPr>
-              <a:t>) (see </a:t>
+              <a:t>attempting to partial out covariates measured w/ error) (see </a:t>
             </a:r>
             <a:r>
               <a:rPr lang="en-US" sz="3200" dirty="0" err="1" smtClean="0">
@@ -6237,7 +6291,7 @@
         </p:blipFill>
         <p:spPr bwMode="auto">
           <a:xfrm>
-            <a:off x="15354300" y="13063538"/>
+            <a:off x="15354300" y="13478262"/>
             <a:ext cx="9153822" cy="6102548"/>
           </a:xfrm>
           <a:prstGeom prst="rect">
@@ -6263,7 +6317,7 @@
         </p:nvSpPr>
         <p:spPr>
           <a:xfrm>
-            <a:off x="24307800" y="13360212"/>
+            <a:off x="24307800" y="13774936"/>
             <a:ext cx="6105525" cy="5509200"/>
           </a:xfrm>
           <a:prstGeom prst="rect">
@@ -6292,16 +6346,30 @@
                 <a:latin typeface="Helvetica" panose="020B0604020202020204" pitchFamily="34" charset="0"/>
                 <a:cs typeface="Helvetica" panose="020B0604020202020204" pitchFamily="34" charset="0"/>
               </a:rPr>
-              <a:t>Violence: t(249) = 2.36,</a:t>
-            </a:r>
-          </a:p>
-          <a:p>
-            <a:pPr indent="-457200"/>
+              <a:t>Violence: </a:t>
+            </a:r>
+            <a:r>
+              <a:rPr lang="en-US" sz="3200" i="1" dirty="0" smtClean="0">
+                <a:latin typeface="Helvetica" panose="020B0604020202020204" pitchFamily="34" charset="0"/>
+                <a:cs typeface="Helvetica" panose="020B0604020202020204" pitchFamily="34" charset="0"/>
+              </a:rPr>
+              <a:t>t</a:t>
+            </a:r>
             <a:r>
               <a:rPr lang="en-US" sz="3200" dirty="0" smtClean="0">
                 <a:latin typeface="Helvetica" panose="020B0604020202020204" pitchFamily="34" charset="0"/>
                 <a:cs typeface="Helvetica" panose="020B0604020202020204" pitchFamily="34" charset="0"/>
               </a:rPr>
+              <a:t>(249) = 2.36,</a:t>
+            </a:r>
+          </a:p>
+          <a:p>
+            <a:pPr indent="-457200"/>
+            <a:r>
+              <a:rPr lang="en-US" sz="3200" dirty="0" smtClean="0">
+                <a:latin typeface="Helvetica" panose="020B0604020202020204" pitchFamily="34" charset="0"/>
+                <a:cs typeface="Helvetica" panose="020B0604020202020204" pitchFamily="34" charset="0"/>
+              </a:rPr>
               <a:t>            </a:t>
             </a:r>
             <a:r>
@@ -6326,34 +6394,62 @@
                 <a:latin typeface="Helvetica" panose="020B0604020202020204" pitchFamily="34" charset="0"/>
                 <a:cs typeface="Helvetica" panose="020B0604020202020204" pitchFamily="34" charset="0"/>
               </a:rPr>
-              <a:t>Difficulty: t(249) = 2.56,</a:t>
-            </a:r>
-          </a:p>
-          <a:p>
-            <a:pPr indent="-457200"/>
+              <a:t>Difficulty: </a:t>
+            </a:r>
             <a:r>
               <a:rPr lang="en-US" sz="3200" i="1" dirty="0" smtClean="0">
                 <a:latin typeface="Helvetica" panose="020B0604020202020204" pitchFamily="34" charset="0"/>
                 <a:cs typeface="Helvetica" panose="020B0604020202020204" pitchFamily="34" charset="0"/>
               </a:rPr>
-              <a:t>            r</a:t>
+              <a:t>t</a:t>
             </a:r>
             <a:r>
               <a:rPr lang="en-US" sz="3200" dirty="0" smtClean="0">
                 <a:latin typeface="Helvetica" panose="020B0604020202020204" pitchFamily="34" charset="0"/>
                 <a:cs typeface="Helvetica" panose="020B0604020202020204" pitchFamily="34" charset="0"/>
               </a:rPr>
-              <a:t>  = .16 (.04, .28)</a:t>
+              <a:t>(249) = 2.56,</a:t>
             </a:r>
           </a:p>
           <a:p>
             <a:pPr indent="-457200"/>
+            <a:r>
+              <a:rPr lang="en-US" sz="3200" i="1" dirty="0" smtClean="0">
+                <a:latin typeface="Helvetica" panose="020B0604020202020204" pitchFamily="34" charset="0"/>
+                <a:cs typeface="Helvetica" panose="020B0604020202020204" pitchFamily="34" charset="0"/>
+              </a:rPr>
+              <a:t>            r</a:t>
+            </a:r>
             <a:r>
               <a:rPr lang="en-US" sz="3200" dirty="0" smtClean="0">
                 <a:latin typeface="Helvetica" panose="020B0604020202020204" pitchFamily="34" charset="0"/>
                 <a:cs typeface="Helvetica" panose="020B0604020202020204" pitchFamily="34" charset="0"/>
               </a:rPr>
-              <a:t>Interaction: t(249) = -2.48,</a:t>
+              <a:t>  = .16 (.04, .28)</a:t>
+            </a:r>
+          </a:p>
+          <a:p>
+            <a:pPr indent="-457200"/>
+            <a:r>
+              <a:rPr lang="en-US" sz="3200" dirty="0" smtClean="0">
+                <a:latin typeface="Helvetica" panose="020B0604020202020204" pitchFamily="34" charset="0"/>
+                <a:cs typeface="Helvetica" panose="020B0604020202020204" pitchFamily="34" charset="0"/>
+              </a:rPr>
+              <a:t>Interaction: </a:t>
+            </a:r>
+            <a:r>
+              <a:rPr lang="en-US" sz="3200" i="1" dirty="0" smtClean="0">
+                <a:latin typeface="Helvetica" panose="020B0604020202020204" pitchFamily="34" charset="0"/>
+                <a:cs typeface="Helvetica" panose="020B0604020202020204" pitchFamily="34" charset="0"/>
+              </a:rPr>
+              <a:t>t</a:t>
+            </a:r>
+            <a:r>
+              <a:rPr lang="en-US" sz="3200" dirty="0" smtClean="0">
+                <a:latin typeface="Helvetica" panose="020B0604020202020204" pitchFamily="34" charset="0"/>
+                <a:cs typeface="Helvetica" panose="020B0604020202020204" pitchFamily="34" charset="0"/>
+              </a:rPr>
+              <a:t>(249) = -2.48,</a:t>
             </a:r>
           </a:p>
           <a:p>
@@ -6430,88 +6526,6 @@
           </a:p>
         </p:txBody>
       </p:sp>
-      <p:pic>
-        <p:nvPicPr>
-          <p:cNvPr id="21" name="Picture 2" descr="C:\Users\Joe\Documents\GitHub\vg-dissertation\r2d4d_x_violence.png"/>
-          <p:cNvPicPr>
-            <a:picLocks noChangeAspect="1" noChangeArrowheads="1"/>
-          </p:cNvPicPr>
-          <p:nvPr/>
-        </p:nvPicPr>
-        <p:blipFill>
-          <a:blip r:embed="rId7" cstate="print">
-            <a:extLst>
-              <a:ext uri="{28A0092B-C50C-407E-A947-70E740481C1C}">
-                <a14:useLocalDpi xmlns:a14="http://schemas.microsoft.com/office/drawing/2010/main" val="0"/>
-              </a:ext>
-            </a:extLst>
-          </a:blip>
-          <a:srcRect/>
-          <a:stretch>
-            <a:fillRect/>
-          </a:stretch>
-        </p:blipFill>
-        <p:spPr bwMode="auto">
-          <a:xfrm>
-            <a:off x="15415382" y="23472423"/>
-            <a:ext cx="7543800" cy="5388429"/>
-          </a:xfrm>
-          <a:prstGeom prst="rect">
-            <a:avLst/>
-          </a:prstGeom>
-          <a:noFill/>
-          <a:extLst>
-            <a:ext uri="{909E8E84-426E-40DD-AFC4-6F175D3DCCD1}">
-              <a14:hiddenFill xmlns:a14="http://schemas.microsoft.com/office/drawing/2010/main">
-                <a:solidFill>
-                  <a:srgbClr val="FFFFFF"/>
-                </a:solidFill>
-              </a14:hiddenFill>
-            </a:ext>
-          </a:extLst>
-        </p:spPr>
-      </p:pic>
-      <p:pic>
-        <p:nvPicPr>
-          <p:cNvPr id="23" name="Picture 4" descr="C:\Users\Joe\Documents\GitHub\vg-dissertation\l2d4d_x_2x2.png"/>
-          <p:cNvPicPr>
-            <a:picLocks noChangeAspect="1" noChangeArrowheads="1"/>
-          </p:cNvPicPr>
-          <p:nvPr/>
-        </p:nvPicPr>
-        <p:blipFill>
-          <a:blip r:embed="rId8" cstate="print">
-            <a:extLst>
-              <a:ext uri="{28A0092B-C50C-407E-A947-70E740481C1C}">
-                <a14:useLocalDpi xmlns:a14="http://schemas.microsoft.com/office/drawing/2010/main" val="0"/>
-              </a:ext>
-            </a:extLst>
-          </a:blip>
-          <a:srcRect/>
-          <a:stretch>
-            <a:fillRect/>
-          </a:stretch>
-        </p:blipFill>
-        <p:spPr bwMode="auto">
-          <a:xfrm>
-            <a:off x="22760818" y="23472422"/>
-            <a:ext cx="7543800" cy="5388429"/>
-          </a:xfrm>
-          <a:prstGeom prst="rect">
-            <a:avLst/>
-          </a:prstGeom>
-          <a:noFill/>
-          <a:extLst>
-            <a:ext uri="{909E8E84-426E-40DD-AFC4-6F175D3DCCD1}">
-              <a14:hiddenFill xmlns:a14="http://schemas.microsoft.com/office/drawing/2010/main">
-                <a:solidFill>
-                  <a:srgbClr val="FFFFFF"/>
-                </a:solidFill>
-              </a14:hiddenFill>
-            </a:ext>
-          </a:extLst>
-        </p:spPr>
-      </p:pic>
       <p:sp>
         <p:nvSpPr>
           <p:cNvPr id="27" name="TextBox 26"/>
@@ -6520,7 +6534,7 @@
         </p:nvSpPr>
         <p:spPr>
           <a:xfrm>
-            <a:off x="15552664" y="19156916"/>
+            <a:off x="15552664" y="19571640"/>
             <a:ext cx="9593336" cy="615553"/>
           </a:xfrm>
           <a:prstGeom prst="rect">
@@ -6553,35 +6567,14 @@
                 <a:latin typeface="Helvetica" pitchFamily="34" charset="0"/>
                 <a:cs typeface="Helvetica" pitchFamily="34" charset="0"/>
               </a:rPr>
-              <a:t>Figure </a:t>
-            </a:r>
-            <a:r>
-              <a:rPr lang="en-US" sz="3400" i="1" dirty="0" smtClean="0">
-                <a:latin typeface="Helvetica" pitchFamily="34" charset="0"/>
-                <a:cs typeface="Helvetica" pitchFamily="34" charset="0"/>
-              </a:rPr>
-              <a:t>1. </a:t>
+              <a:t>Figure 1. </a:t>
             </a:r>
             <a:r>
               <a:rPr lang="en-US" sz="3400" dirty="0" smtClean="0">
                 <a:latin typeface="Helvetica" pitchFamily="34" charset="0"/>
                 <a:cs typeface="Helvetica" pitchFamily="34" charset="0"/>
               </a:rPr>
-              <a:t>Histogram of </a:t>
-            </a:r>
-            <a:r>
-              <a:rPr lang="en-US" sz="3400" dirty="0" smtClean="0">
-                <a:latin typeface="Helvetica" pitchFamily="34" charset="0"/>
-                <a:cs typeface="Helvetica" pitchFamily="34" charset="0"/>
-              </a:rPr>
-              <a:t>aggression per </a:t>
-            </a:r>
-            <a:r>
-              <a:rPr lang="en-US" sz="3400" dirty="0" smtClean="0">
-                <a:latin typeface="Helvetica" pitchFamily="34" charset="0"/>
-                <a:cs typeface="Helvetica" pitchFamily="34" charset="0"/>
-              </a:rPr>
-              <a:t>condition.</a:t>
+              <a:t>Histogram of aggression per condition.</a:t>
             </a:r>
             <a:endParaRPr lang="en-US" sz="3400" dirty="0">
               <a:latin typeface="Helvetica" pitchFamily="34" charset="0"/>
@@ -6598,7 +6591,7 @@
         </p:nvSpPr>
         <p:spPr>
           <a:xfrm>
-            <a:off x="17522775" y="29123343"/>
+            <a:off x="17522775" y="29979583"/>
             <a:ext cx="10674451" cy="1569660"/>
           </a:xfrm>
           <a:prstGeom prst="rect">
@@ -6632,42 +6625,14 @@
                 <a:latin typeface="Helvetica" pitchFamily="34" charset="0"/>
                 <a:cs typeface="Helvetica" pitchFamily="34" charset="0"/>
               </a:rPr>
-              <a:t>Figure </a:t>
-            </a:r>
-            <a:r>
-              <a:rPr lang="en-US" sz="3200" i="1" dirty="0" smtClean="0">
-                <a:latin typeface="Helvetica" pitchFamily="34" charset="0"/>
-                <a:cs typeface="Helvetica" pitchFamily="34" charset="0"/>
-              </a:rPr>
-              <a:t>2. </a:t>
+              <a:t>Figure 2. </a:t>
             </a:r>
             <a:r>
               <a:rPr lang="en-US" sz="3200" dirty="0" smtClean="0">
                 <a:latin typeface="Helvetica" pitchFamily="34" charset="0"/>
                 <a:cs typeface="Helvetica" pitchFamily="34" charset="0"/>
               </a:rPr>
-              <a:t>2d4d </a:t>
-            </a:r>
-            <a:r>
-              <a:rPr lang="en-US" sz="3200" dirty="0" smtClean="0">
-                <a:latin typeface="Helvetica" pitchFamily="34" charset="0"/>
-                <a:cs typeface="Helvetica" pitchFamily="34" charset="0"/>
-              </a:rPr>
-              <a:t>ratio did not influence aggressive </a:t>
-            </a:r>
-            <a:r>
-              <a:rPr lang="en-US" sz="3200" dirty="0" smtClean="0">
-                <a:latin typeface="Helvetica" pitchFamily="34" charset="0"/>
-                <a:cs typeface="Helvetica" pitchFamily="34" charset="0"/>
-              </a:rPr>
-              <a:t>behavior</a:t>
-            </a:r>
-            <a:r>
-              <a:rPr lang="en-US" sz="3200" dirty="0" smtClean="0">
-                <a:latin typeface="Helvetica" pitchFamily="34" charset="0"/>
-                <a:cs typeface="Helvetica" pitchFamily="34" charset="0"/>
-              </a:rPr>
-              <a:t>.</a:t>
+              <a:t>2d4d ratio did not influence aggressive behavior.</a:t>
             </a:r>
           </a:p>
           <a:p>
@@ -6757,7 +6722,7 @@
           <p:nvPr/>
         </p:nvPicPr>
         <p:blipFill>
-          <a:blip r:embed="rId9">
+          <a:blip r:embed="rId7">
             <a:extLst>
               <a:ext uri="{28A0092B-C50C-407E-A947-70E740481C1C}">
                 <a14:useLocalDpi xmlns:a14="http://schemas.microsoft.com/office/drawing/2010/main" val="0"/>
@@ -6778,6 +6743,11 @@
             <a:avLst/>
           </a:prstGeom>
           <a:noFill/>
+          <a:ln>
+            <a:solidFill>
+              <a:schemeClr val="tx1"/>
+            </a:solidFill>
+          </a:ln>
           <a:extLst>
             <a:ext uri="{909E8E84-426E-40DD-AFC4-6F175D3DCCD1}">
               <a14:hiddenFill xmlns:a14="http://schemas.microsoft.com/office/drawing/2010/main">
@@ -6932,21 +6902,28 @@
                 <a:latin typeface="Helvetica" pitchFamily="34" charset="0"/>
                 <a:cs typeface="Helvetica" pitchFamily="34" charset="0"/>
               </a:rPr>
-              <a:t>Figure </a:t>
-            </a:r>
-            <a:r>
-              <a:rPr lang="en-US" sz="3400" i="1" dirty="0" smtClean="0">
-                <a:latin typeface="Helvetica" pitchFamily="34" charset="0"/>
-                <a:cs typeface="Helvetica" pitchFamily="34" charset="0"/>
-              </a:rPr>
-              <a:t>3. </a:t>
+              <a:t>Figure 3. </a:t>
             </a:r>
             <a:r>
               <a:rPr lang="en-US" sz="3400" dirty="0" smtClean="0">
                 <a:latin typeface="Helvetica" pitchFamily="34" charset="0"/>
                 <a:cs typeface="Helvetica" pitchFamily="34" charset="0"/>
               </a:rPr>
-              <a:t>Funnel plots from Anderson et al. (2010) meta-analysis of violent game effects in experimental research. Top row is “best-practices” experiments, bottom row is all experiments.</a:t>
+              <a:t>Funnel plots </a:t>
+            </a:r>
+            <a:r>
+              <a:rPr lang="en-US" sz="3400" dirty="0" smtClean="0">
+                <a:latin typeface="Helvetica" pitchFamily="34" charset="0"/>
+                <a:cs typeface="Helvetica" pitchFamily="34" charset="0"/>
+              </a:rPr>
+              <a:t>of </a:t>
+            </a:r>
+            <a:r>
+              <a:rPr lang="en-US" sz="3400" dirty="0" smtClean="0">
+                <a:latin typeface="Helvetica" pitchFamily="34" charset="0"/>
+                <a:cs typeface="Helvetica" pitchFamily="34" charset="0"/>
+              </a:rPr>
+              <a:t>Anderson et al. (2010) meta-analysis of violent game effects in experimental research. Top row is “best-practices” experiments, bottom row is all experiments.</a:t>
             </a:r>
             <a:endParaRPr lang="en-US" sz="3400" dirty="0">
               <a:latin typeface="Helvetica" pitchFamily="34" charset="0"/>
@@ -6955,6 +6932,138 @@
           </a:p>
         </p:txBody>
       </p:sp>
+      <p:grpSp>
+        <p:nvGrpSpPr>
+          <p:cNvPr id="2" name="Group 1"/>
+          <p:cNvGrpSpPr/>
+          <p:nvPr/>
+        </p:nvGrpSpPr>
+        <p:grpSpPr>
+          <a:xfrm>
+            <a:off x="15348002" y="23786885"/>
+            <a:ext cx="15023996" cy="5878373"/>
+            <a:chOff x="15510632" y="23068103"/>
+            <a:chExt cx="14793986" cy="5788378"/>
+          </a:xfrm>
+        </p:grpSpPr>
+        <p:pic>
+          <p:nvPicPr>
+            <p:cNvPr id="23" name="Picture 4" descr="C:\Users\Joe\Documents\GitHub\vg-dissertation\l2d4d_x_2x2.png"/>
+            <p:cNvPicPr>
+              <a:picLocks noChangeAspect="1" noChangeArrowheads="1"/>
+            </p:cNvPicPr>
+            <p:nvPr/>
+          </p:nvPicPr>
+          <p:blipFill>
+            <a:blip r:embed="rId8" cstate="print">
+              <a:extLst>
+                <a:ext uri="{28A0092B-C50C-407E-A947-70E740481C1C}">
+                  <a14:useLocalDpi xmlns:a14="http://schemas.microsoft.com/office/drawing/2010/main" val="0"/>
+                </a:ext>
+              </a:extLst>
+            </a:blip>
+            <a:srcRect/>
+            <a:stretch>
+              <a:fillRect/>
+            </a:stretch>
+          </p:blipFill>
+          <p:spPr bwMode="auto">
+            <a:xfrm>
+              <a:off x="22760818" y="23068103"/>
+              <a:ext cx="7543800" cy="5788378"/>
+            </a:xfrm>
+            <a:prstGeom prst="rect">
+              <a:avLst/>
+            </a:prstGeom>
+            <a:noFill/>
+            <a:extLst>
+              <a:ext uri="{909E8E84-426E-40DD-AFC4-6F175D3DCCD1}">
+                <a14:hiddenFill xmlns:a14="http://schemas.microsoft.com/office/drawing/2010/main">
+                  <a:solidFill>
+                    <a:srgbClr val="FFFFFF"/>
+                  </a:solidFill>
+                </a14:hiddenFill>
+              </a:ext>
+            </a:extLst>
+          </p:spPr>
+        </p:pic>
+        <p:pic>
+          <p:nvPicPr>
+            <p:cNvPr id="21" name="Picture 2" descr="C:\Users\Joe\Documents\GitHub\vg-dissertation\r2d4d_x_violence.png"/>
+            <p:cNvPicPr>
+              <a:picLocks noChangeAspect="1" noChangeArrowheads="1"/>
+            </p:cNvPicPr>
+            <p:nvPr/>
+          </p:nvPicPr>
+          <p:blipFill>
+            <a:blip r:embed="rId9" cstate="print">
+              <a:extLst>
+                <a:ext uri="{28A0092B-C50C-407E-A947-70E740481C1C}">
+                  <a14:useLocalDpi xmlns:a14="http://schemas.microsoft.com/office/drawing/2010/main" val="0"/>
+                </a:ext>
+              </a:extLst>
+            </a:blip>
+            <a:srcRect/>
+            <a:stretch>
+              <a:fillRect/>
+            </a:stretch>
+          </p:blipFill>
+          <p:spPr bwMode="auto">
+            <a:xfrm>
+              <a:off x="15510632" y="23068104"/>
+              <a:ext cx="7543800" cy="5788377"/>
+            </a:xfrm>
+            <a:prstGeom prst="rect">
+              <a:avLst/>
+            </a:prstGeom>
+            <a:noFill/>
+            <a:extLst>
+              <a:ext uri="{909E8E84-426E-40DD-AFC4-6F175D3DCCD1}">
+                <a14:hiddenFill xmlns:a14="http://schemas.microsoft.com/office/drawing/2010/main">
+                  <a:solidFill>
+                    <a:srgbClr val="FFFFFF"/>
+                  </a:solidFill>
+                </a14:hiddenFill>
+              </a:ext>
+            </a:extLst>
+          </p:spPr>
+        </p:pic>
+      </p:grpSp>
+      <p:cxnSp>
+        <p:nvCxnSpPr>
+          <p:cNvPr id="15" name="Straight Connector 14"/>
+          <p:cNvCxnSpPr/>
+          <p:nvPr/>
+        </p:nvCxnSpPr>
+        <p:spPr>
+          <a:xfrm>
+            <a:off x="15201900" y="23427124"/>
+            <a:ext cx="15316200" cy="0"/>
+          </a:xfrm>
+          <a:prstGeom prst="line">
+            <a:avLst/>
+          </a:prstGeom>
+          <a:ln w="38100">
+            <a:solidFill>
+              <a:schemeClr val="tx1"/>
+            </a:solidFill>
+          </a:ln>
+        </p:spPr>
+        <p:style>
+          <a:lnRef idx="1">
+            <a:schemeClr val="accent1"/>
+          </a:lnRef>
+          <a:fillRef idx="0">
+            <a:schemeClr val="accent1"/>
+          </a:fillRef>
+          <a:effectRef idx="0">
+            <a:schemeClr val="accent1"/>
+          </a:effectRef>
+          <a:fontRef idx="minor">
+            <a:schemeClr val="tx1"/>
+          </a:fontRef>
+        </p:style>
+      </p:cxnSp>
     </p:spTree>
     <p:extLst>
       <p:ext uri="{BB962C8B-B14F-4D97-AF65-F5344CB8AC3E}">

</xml_diff>